<commit_message>
Third commit on 02-02-2026
</commit_message>
<xml_diff>
--- a/Unit-I/ppt/WhyJava_1.pptx
+++ b/Unit-I/ppt/WhyJava_1.pptx
@@ -20,11 +20,6 @@
     <p:sldId id="260" r:id="rId14"/>
     <p:sldId id="261" r:id="rId15"/>
     <p:sldId id="262" r:id="rId16"/>
-    <p:sldId id="269" r:id="rId17"/>
-    <p:sldId id="266" r:id="rId18"/>
-    <p:sldId id="264" r:id="rId19"/>
-    <p:sldId id="263" r:id="rId20"/>
-    <p:sldId id="265" r:id="rId21"/>
   </p:sldIdLst>
   <p:sldSz cx="12192000" cy="6858000"/>
   <p:notesSz cx="6858000" cy="9144000"/>
@@ -199,7 +194,7 @@
           </a:lstStyle>
           <a:p>
             <a:r>
-              <a:rPr lang="en-US" smtClean="0"/>
+              <a:rPr lang="en-US"/>
               <a:t>Click to edit Master title style</a:t>
             </a:r>
             <a:endParaRPr lang="en-US" dirty="0"/>
@@ -264,7 +259,7 @@
           </a:lstStyle>
           <a:p>
             <a:r>
-              <a:rPr lang="en-US" smtClean="0"/>
+              <a:rPr lang="en-US"/>
               <a:t>Click to edit Master subtitle style</a:t>
             </a:r>
             <a:endParaRPr lang="en-US" dirty="0"/>
@@ -288,7 +283,7 @@
           <a:p>
             <a:fld id="{EDE145A1-8EC9-42F6-9463-837C2067D09A}" type="datetimeFigureOut">
               <a:rPr lang="en-IN" smtClean="0"/>
-              <a:t>04-05-2023</a:t>
+              <a:t>02-02-2026</a:t>
             </a:fld>
             <a:endParaRPr lang="en-IN"/>
           </a:p>
@@ -382,7 +377,7 @@
           <a:lstStyle/>
           <a:p>
             <a:r>
-              <a:rPr lang="en-US" smtClean="0"/>
+              <a:rPr lang="en-US"/>
               <a:t>Click to edit Master title style</a:t>
             </a:r>
             <a:endParaRPr lang="en-US" dirty="0"/>
@@ -406,35 +401,35 @@
           <a:p>
             <a:pPr lvl="0"/>
             <a:r>
-              <a:rPr lang="en-US" smtClean="0"/>
+              <a:rPr lang="en-US"/>
               <a:t>Edit Master text styles</a:t>
             </a:r>
           </a:p>
           <a:p>
             <a:pPr lvl="1"/>
             <a:r>
-              <a:rPr lang="en-US" smtClean="0"/>
+              <a:rPr lang="en-US"/>
               <a:t>Second level</a:t>
             </a:r>
           </a:p>
           <a:p>
             <a:pPr lvl="2"/>
             <a:r>
-              <a:rPr lang="en-US" smtClean="0"/>
+              <a:rPr lang="en-US"/>
               <a:t>Third level</a:t>
             </a:r>
           </a:p>
           <a:p>
             <a:pPr lvl="3"/>
             <a:r>
-              <a:rPr lang="en-US" smtClean="0"/>
+              <a:rPr lang="en-US"/>
               <a:t>Fourth level</a:t>
             </a:r>
           </a:p>
           <a:p>
             <a:pPr lvl="4"/>
             <a:r>
-              <a:rPr lang="en-US" smtClean="0"/>
+              <a:rPr lang="en-US"/>
               <a:t>Fifth level</a:t>
             </a:r>
             <a:endParaRPr lang="en-US" dirty="0"/>
@@ -458,7 +453,7 @@
           <a:p>
             <a:fld id="{EDE145A1-8EC9-42F6-9463-837C2067D09A}" type="datetimeFigureOut">
               <a:rPr lang="en-IN" smtClean="0"/>
-              <a:t>04-05-2023</a:t>
+              <a:t>02-02-2026</a:t>
             </a:fld>
             <a:endParaRPr lang="en-IN"/>
           </a:p>
@@ -557,7 +552,7 @@
           <a:lstStyle/>
           <a:p>
             <a:r>
-              <a:rPr lang="en-US" smtClean="0"/>
+              <a:rPr lang="en-US"/>
               <a:t>Click to edit Master title style</a:t>
             </a:r>
             <a:endParaRPr lang="en-US" dirty="0"/>
@@ -586,35 +581,35 @@
           <a:p>
             <a:pPr lvl="0"/>
             <a:r>
-              <a:rPr lang="en-US" smtClean="0"/>
+              <a:rPr lang="en-US"/>
               <a:t>Edit Master text styles</a:t>
             </a:r>
           </a:p>
           <a:p>
             <a:pPr lvl="1"/>
             <a:r>
-              <a:rPr lang="en-US" smtClean="0"/>
+              <a:rPr lang="en-US"/>
               <a:t>Second level</a:t>
             </a:r>
           </a:p>
           <a:p>
             <a:pPr lvl="2"/>
             <a:r>
-              <a:rPr lang="en-US" smtClean="0"/>
+              <a:rPr lang="en-US"/>
               <a:t>Third level</a:t>
             </a:r>
           </a:p>
           <a:p>
             <a:pPr lvl="3"/>
             <a:r>
-              <a:rPr lang="en-US" smtClean="0"/>
+              <a:rPr lang="en-US"/>
               <a:t>Fourth level</a:t>
             </a:r>
           </a:p>
           <a:p>
             <a:pPr lvl="4"/>
             <a:r>
-              <a:rPr lang="en-US" smtClean="0"/>
+              <a:rPr lang="en-US"/>
               <a:t>Fifth level</a:t>
             </a:r>
             <a:endParaRPr lang="en-US" dirty="0"/>
@@ -638,7 +633,7 @@
           <a:p>
             <a:fld id="{EDE145A1-8EC9-42F6-9463-837C2067D09A}" type="datetimeFigureOut">
               <a:rPr lang="en-IN" smtClean="0"/>
-              <a:t>04-05-2023</a:t>
+              <a:t>02-02-2026</a:t>
             </a:fld>
             <a:endParaRPr lang="en-IN"/>
           </a:p>
@@ -732,7 +727,7 @@
           <a:lstStyle/>
           <a:p>
             <a:r>
-              <a:rPr lang="en-US" smtClean="0"/>
+              <a:rPr lang="en-US"/>
               <a:t>Click to edit Master title style</a:t>
             </a:r>
             <a:endParaRPr lang="en-US" dirty="0"/>
@@ -756,35 +751,35 @@
           <a:p>
             <a:pPr lvl="0"/>
             <a:r>
-              <a:rPr lang="en-US" smtClean="0"/>
+              <a:rPr lang="en-US"/>
               <a:t>Edit Master text styles</a:t>
             </a:r>
           </a:p>
           <a:p>
             <a:pPr lvl="1"/>
             <a:r>
-              <a:rPr lang="en-US" smtClean="0"/>
+              <a:rPr lang="en-US"/>
               <a:t>Second level</a:t>
             </a:r>
           </a:p>
           <a:p>
             <a:pPr lvl="2"/>
             <a:r>
-              <a:rPr lang="en-US" smtClean="0"/>
+              <a:rPr lang="en-US"/>
               <a:t>Third level</a:t>
             </a:r>
           </a:p>
           <a:p>
             <a:pPr lvl="3"/>
             <a:r>
-              <a:rPr lang="en-US" smtClean="0"/>
+              <a:rPr lang="en-US"/>
               <a:t>Fourth level</a:t>
             </a:r>
           </a:p>
           <a:p>
             <a:pPr lvl="4"/>
             <a:r>
-              <a:rPr lang="en-US" smtClean="0"/>
+              <a:rPr lang="en-US"/>
               <a:t>Fifth level</a:t>
             </a:r>
             <a:endParaRPr lang="en-US" dirty="0"/>
@@ -808,7 +803,7 @@
           <a:p>
             <a:fld id="{EDE145A1-8EC9-42F6-9463-837C2067D09A}" type="datetimeFigureOut">
               <a:rPr lang="en-IN" smtClean="0"/>
-              <a:t>04-05-2023</a:t>
+              <a:t>02-02-2026</a:t>
             </a:fld>
             <a:endParaRPr lang="en-IN"/>
           </a:p>
@@ -911,7 +906,7 @@
           </a:lstStyle>
           <a:p>
             <a:r>
-              <a:rPr lang="en-US" smtClean="0"/>
+              <a:rPr lang="en-US"/>
               <a:t>Click to edit Master title style</a:t>
             </a:r>
             <a:endParaRPr lang="en-US" dirty="0"/>
@@ -1031,7 +1026,7 @@
           <a:p>
             <a:pPr lvl="0"/>
             <a:r>
-              <a:rPr lang="en-US" smtClean="0"/>
+              <a:rPr lang="en-US"/>
               <a:t>Edit Master text styles</a:t>
             </a:r>
           </a:p>
@@ -1054,7 +1049,7 @@
           <a:p>
             <a:fld id="{EDE145A1-8EC9-42F6-9463-837C2067D09A}" type="datetimeFigureOut">
               <a:rPr lang="en-IN" smtClean="0"/>
-              <a:t>04-05-2023</a:t>
+              <a:t>02-02-2026</a:t>
             </a:fld>
             <a:endParaRPr lang="en-IN"/>
           </a:p>
@@ -1148,7 +1143,7 @@
           <a:lstStyle/>
           <a:p>
             <a:r>
-              <a:rPr lang="en-US" smtClean="0"/>
+              <a:rPr lang="en-US"/>
               <a:t>Click to edit Master title style</a:t>
             </a:r>
             <a:endParaRPr lang="en-US" dirty="0"/>
@@ -1177,35 +1172,35 @@
           <a:p>
             <a:pPr lvl="0"/>
             <a:r>
-              <a:rPr lang="en-US" smtClean="0"/>
+              <a:rPr lang="en-US"/>
               <a:t>Edit Master text styles</a:t>
             </a:r>
           </a:p>
           <a:p>
             <a:pPr lvl="1"/>
             <a:r>
-              <a:rPr lang="en-US" smtClean="0"/>
+              <a:rPr lang="en-US"/>
               <a:t>Second level</a:t>
             </a:r>
           </a:p>
           <a:p>
             <a:pPr lvl="2"/>
             <a:r>
-              <a:rPr lang="en-US" smtClean="0"/>
+              <a:rPr lang="en-US"/>
               <a:t>Third level</a:t>
             </a:r>
           </a:p>
           <a:p>
             <a:pPr lvl="3"/>
             <a:r>
-              <a:rPr lang="en-US" smtClean="0"/>
+              <a:rPr lang="en-US"/>
               <a:t>Fourth level</a:t>
             </a:r>
           </a:p>
           <a:p>
             <a:pPr lvl="4"/>
             <a:r>
-              <a:rPr lang="en-US" smtClean="0"/>
+              <a:rPr lang="en-US"/>
               <a:t>Fifth level</a:t>
             </a:r>
             <a:endParaRPr lang="en-US" dirty="0"/>
@@ -1234,35 +1229,35 @@
           <a:p>
             <a:pPr lvl="0"/>
             <a:r>
-              <a:rPr lang="en-US" smtClean="0"/>
+              <a:rPr lang="en-US"/>
               <a:t>Edit Master text styles</a:t>
             </a:r>
           </a:p>
           <a:p>
             <a:pPr lvl="1"/>
             <a:r>
-              <a:rPr lang="en-US" smtClean="0"/>
+              <a:rPr lang="en-US"/>
               <a:t>Second level</a:t>
             </a:r>
           </a:p>
           <a:p>
             <a:pPr lvl="2"/>
             <a:r>
-              <a:rPr lang="en-US" smtClean="0"/>
+              <a:rPr lang="en-US"/>
               <a:t>Third level</a:t>
             </a:r>
           </a:p>
           <a:p>
             <a:pPr lvl="3"/>
             <a:r>
-              <a:rPr lang="en-US" smtClean="0"/>
+              <a:rPr lang="en-US"/>
               <a:t>Fourth level</a:t>
             </a:r>
           </a:p>
           <a:p>
             <a:pPr lvl="4"/>
             <a:r>
-              <a:rPr lang="en-US" smtClean="0"/>
+              <a:rPr lang="en-US"/>
               <a:t>Fifth level</a:t>
             </a:r>
             <a:endParaRPr lang="en-US" dirty="0"/>
@@ -1286,7 +1281,7 @@
           <a:p>
             <a:fld id="{EDE145A1-8EC9-42F6-9463-837C2067D09A}" type="datetimeFigureOut">
               <a:rPr lang="en-IN" smtClean="0"/>
-              <a:t>04-05-2023</a:t>
+              <a:t>02-02-2026</a:t>
             </a:fld>
             <a:endParaRPr lang="en-IN"/>
           </a:p>
@@ -1385,7 +1380,7 @@
           <a:lstStyle/>
           <a:p>
             <a:r>
-              <a:rPr lang="en-US" smtClean="0"/>
+              <a:rPr lang="en-US"/>
               <a:t>Click to edit Master title style</a:t>
             </a:r>
             <a:endParaRPr lang="en-US" dirty="0"/>
@@ -1451,7 +1446,7 @@
           <a:p>
             <a:pPr lvl="0"/>
             <a:r>
-              <a:rPr lang="en-US" smtClean="0"/>
+              <a:rPr lang="en-US"/>
               <a:t>Edit Master text styles</a:t>
             </a:r>
           </a:p>
@@ -1479,35 +1474,35 @@
           <a:p>
             <a:pPr lvl="0"/>
             <a:r>
-              <a:rPr lang="en-US" smtClean="0"/>
+              <a:rPr lang="en-US"/>
               <a:t>Edit Master text styles</a:t>
             </a:r>
           </a:p>
           <a:p>
             <a:pPr lvl="1"/>
             <a:r>
-              <a:rPr lang="en-US" smtClean="0"/>
+              <a:rPr lang="en-US"/>
               <a:t>Second level</a:t>
             </a:r>
           </a:p>
           <a:p>
             <a:pPr lvl="2"/>
             <a:r>
-              <a:rPr lang="en-US" smtClean="0"/>
+              <a:rPr lang="en-US"/>
               <a:t>Third level</a:t>
             </a:r>
           </a:p>
           <a:p>
             <a:pPr lvl="3"/>
             <a:r>
-              <a:rPr lang="en-US" smtClean="0"/>
+              <a:rPr lang="en-US"/>
               <a:t>Fourth level</a:t>
             </a:r>
           </a:p>
           <a:p>
             <a:pPr lvl="4"/>
             <a:r>
-              <a:rPr lang="en-US" smtClean="0"/>
+              <a:rPr lang="en-US"/>
               <a:t>Fifth level</a:t>
             </a:r>
             <a:endParaRPr lang="en-US" dirty="0"/>
@@ -1573,7 +1568,7 @@
           <a:p>
             <a:pPr lvl="0"/>
             <a:r>
-              <a:rPr lang="en-US" smtClean="0"/>
+              <a:rPr lang="en-US"/>
               <a:t>Edit Master text styles</a:t>
             </a:r>
           </a:p>
@@ -1601,35 +1596,35 @@
           <a:p>
             <a:pPr lvl="0"/>
             <a:r>
-              <a:rPr lang="en-US" smtClean="0"/>
+              <a:rPr lang="en-US"/>
               <a:t>Edit Master text styles</a:t>
             </a:r>
           </a:p>
           <a:p>
             <a:pPr lvl="1"/>
             <a:r>
-              <a:rPr lang="en-US" smtClean="0"/>
+              <a:rPr lang="en-US"/>
               <a:t>Second level</a:t>
             </a:r>
           </a:p>
           <a:p>
             <a:pPr lvl="2"/>
             <a:r>
-              <a:rPr lang="en-US" smtClean="0"/>
+              <a:rPr lang="en-US"/>
               <a:t>Third level</a:t>
             </a:r>
           </a:p>
           <a:p>
             <a:pPr lvl="3"/>
             <a:r>
-              <a:rPr lang="en-US" smtClean="0"/>
+              <a:rPr lang="en-US"/>
               <a:t>Fourth level</a:t>
             </a:r>
           </a:p>
           <a:p>
             <a:pPr lvl="4"/>
             <a:r>
-              <a:rPr lang="en-US" smtClean="0"/>
+              <a:rPr lang="en-US"/>
               <a:t>Fifth level</a:t>
             </a:r>
             <a:endParaRPr lang="en-US" dirty="0"/>
@@ -1653,7 +1648,7 @@
           <a:p>
             <a:fld id="{EDE145A1-8EC9-42F6-9463-837C2067D09A}" type="datetimeFigureOut">
               <a:rPr lang="en-IN" smtClean="0"/>
-              <a:t>04-05-2023</a:t>
+              <a:t>02-02-2026</a:t>
             </a:fld>
             <a:endParaRPr lang="en-IN"/>
           </a:p>
@@ -1747,7 +1742,7 @@
           <a:lstStyle/>
           <a:p>
             <a:r>
-              <a:rPr lang="en-US" smtClean="0"/>
+              <a:rPr lang="en-US"/>
               <a:t>Click to edit Master title style</a:t>
             </a:r>
             <a:endParaRPr lang="en-US" dirty="0"/>
@@ -1771,7 +1766,7 @@
           <a:p>
             <a:fld id="{EDE145A1-8EC9-42F6-9463-837C2067D09A}" type="datetimeFigureOut">
               <a:rPr lang="en-IN" smtClean="0"/>
-              <a:t>04-05-2023</a:t>
+              <a:t>02-02-2026</a:t>
             </a:fld>
             <a:endParaRPr lang="en-IN"/>
           </a:p>
@@ -1866,7 +1861,7 @@
           <a:p>
             <a:fld id="{EDE145A1-8EC9-42F6-9463-837C2067D09A}" type="datetimeFigureOut">
               <a:rPr lang="en-IN" smtClean="0"/>
-              <a:t>04-05-2023</a:t>
+              <a:t>02-02-2026</a:t>
             </a:fld>
             <a:endParaRPr lang="en-IN"/>
           </a:p>
@@ -1969,7 +1964,7 @@
           </a:lstStyle>
           <a:p>
             <a:r>
-              <a:rPr lang="en-US" smtClean="0"/>
+              <a:rPr lang="en-US"/>
               <a:t>Click to edit Master title style</a:t>
             </a:r>
             <a:endParaRPr lang="en-US" dirty="0"/>
@@ -2026,35 +2021,35 @@
           <a:p>
             <a:pPr lvl="0"/>
             <a:r>
-              <a:rPr lang="en-US" smtClean="0"/>
+              <a:rPr lang="en-US"/>
               <a:t>Edit Master text styles</a:t>
             </a:r>
           </a:p>
           <a:p>
             <a:pPr lvl="1"/>
             <a:r>
-              <a:rPr lang="en-US" smtClean="0"/>
+              <a:rPr lang="en-US"/>
               <a:t>Second level</a:t>
             </a:r>
           </a:p>
           <a:p>
             <a:pPr lvl="2"/>
             <a:r>
-              <a:rPr lang="en-US" smtClean="0"/>
+              <a:rPr lang="en-US"/>
               <a:t>Third level</a:t>
             </a:r>
           </a:p>
           <a:p>
             <a:pPr lvl="3"/>
             <a:r>
-              <a:rPr lang="en-US" smtClean="0"/>
+              <a:rPr lang="en-US"/>
               <a:t>Fourth level</a:t>
             </a:r>
           </a:p>
           <a:p>
             <a:pPr lvl="4"/>
             <a:r>
-              <a:rPr lang="en-US" smtClean="0"/>
+              <a:rPr lang="en-US"/>
               <a:t>Fifth level</a:t>
             </a:r>
             <a:endParaRPr lang="en-US" dirty="0"/>
@@ -2120,7 +2115,7 @@
           <a:p>
             <a:pPr lvl="0"/>
             <a:r>
-              <a:rPr lang="en-US" smtClean="0"/>
+              <a:rPr lang="en-US"/>
               <a:t>Edit Master text styles</a:t>
             </a:r>
           </a:p>
@@ -2143,7 +2138,7 @@
           <a:p>
             <a:fld id="{EDE145A1-8EC9-42F6-9463-837C2067D09A}" type="datetimeFigureOut">
               <a:rPr lang="en-IN" smtClean="0"/>
-              <a:t>04-05-2023</a:t>
+              <a:t>02-02-2026</a:t>
             </a:fld>
             <a:endParaRPr lang="en-IN"/>
           </a:p>
@@ -2246,7 +2241,7 @@
           </a:lstStyle>
           <a:p>
             <a:r>
-              <a:rPr lang="en-US" smtClean="0"/>
+              <a:rPr lang="en-US"/>
               <a:t>Click to edit Master title style</a:t>
             </a:r>
             <a:endParaRPr lang="en-US" dirty="0"/>
@@ -2311,7 +2306,7 @@
           </a:lstStyle>
           <a:p>
             <a:r>
-              <a:rPr lang="en-US" smtClean="0"/>
+              <a:rPr lang="en-US"/>
               <a:t>Click icon to add picture</a:t>
             </a:r>
             <a:endParaRPr lang="en-US" dirty="0"/>
@@ -2377,7 +2372,7 @@
           <a:p>
             <a:pPr lvl="0"/>
             <a:r>
-              <a:rPr lang="en-US" smtClean="0"/>
+              <a:rPr lang="en-US"/>
               <a:t>Edit Master text styles</a:t>
             </a:r>
           </a:p>
@@ -2400,7 +2395,7 @@
           <a:p>
             <a:fld id="{EDE145A1-8EC9-42F6-9463-837C2067D09A}" type="datetimeFigureOut">
               <a:rPr lang="en-IN" smtClean="0"/>
-              <a:t>04-05-2023</a:t>
+              <a:t>02-02-2026</a:t>
             </a:fld>
             <a:endParaRPr lang="en-IN"/>
           </a:p>
@@ -2509,7 +2504,7 @@
           <a:lstStyle/>
           <a:p>
             <a:r>
-              <a:rPr lang="en-US" smtClean="0"/>
+              <a:rPr lang="en-US"/>
               <a:t>Click to edit Master title style</a:t>
             </a:r>
             <a:endParaRPr lang="en-US" dirty="0"/>
@@ -2543,35 +2538,35 @@
           <a:p>
             <a:pPr lvl="0"/>
             <a:r>
-              <a:rPr lang="en-US" smtClean="0"/>
+              <a:rPr lang="en-US"/>
               <a:t>Edit Master text styles</a:t>
             </a:r>
           </a:p>
           <a:p>
             <a:pPr lvl="1"/>
             <a:r>
-              <a:rPr lang="en-US" smtClean="0"/>
+              <a:rPr lang="en-US"/>
               <a:t>Second level</a:t>
             </a:r>
           </a:p>
           <a:p>
             <a:pPr lvl="2"/>
             <a:r>
-              <a:rPr lang="en-US" smtClean="0"/>
+              <a:rPr lang="en-US"/>
               <a:t>Third level</a:t>
             </a:r>
           </a:p>
           <a:p>
             <a:pPr lvl="3"/>
             <a:r>
-              <a:rPr lang="en-US" smtClean="0"/>
+              <a:rPr lang="en-US"/>
               <a:t>Fourth level</a:t>
             </a:r>
           </a:p>
           <a:p>
             <a:pPr lvl="4"/>
             <a:r>
-              <a:rPr lang="en-US" smtClean="0"/>
+              <a:rPr lang="en-US"/>
               <a:t>Fifth level</a:t>
             </a:r>
             <a:endParaRPr lang="en-US" dirty="0"/>
@@ -2613,7 +2608,7 @@
           <a:p>
             <a:fld id="{EDE145A1-8EC9-42F6-9463-837C2067D09A}" type="datetimeFigureOut">
               <a:rPr lang="en-IN" smtClean="0"/>
-              <a:t>04-05-2023</a:t>
+              <a:t>02-02-2026</a:t>
             </a:fld>
             <a:endParaRPr lang="en-IN"/>
           </a:p>
@@ -3122,61 +3117,6 @@
       </p:pic>
       <p:sp>
         <p:nvSpPr>
-          <p:cNvPr id="4" name="TextBox 3"/>
-          <p:cNvSpPr txBox="1"/>
-          <p:nvPr/>
-        </p:nvSpPr>
-        <p:spPr>
-          <a:xfrm>
-            <a:off x="9337639" y="6368527"/>
-            <a:ext cx="2694969" cy="276999"/>
-          </a:xfrm>
-          <a:prstGeom prst="rect">
-            <a:avLst/>
-          </a:prstGeom>
-          <a:noFill/>
-        </p:spPr>
-        <p:txBody>
-          <a:bodyPr wrap="none" rtlCol="0">
-            <a:spAutoFit/>
-          </a:bodyPr>
-          <a:lstStyle/>
-          <a:p>
-            <a:r>
-              <a:rPr lang="en-GB" sz="1200" dirty="0" err="1">
-                <a:solidFill>
-                  <a:srgbClr val="FF0000"/>
-                </a:solidFill>
-                <a:latin typeface="JetBrains Mono" panose="02000009000000000000" pitchFamily="49" charset="0"/>
-                <a:ea typeface="JetBrains Mono" panose="02000009000000000000" pitchFamily="49" charset="0"/>
-                <a:cs typeface="JetBrains Mono" panose="02000009000000000000" pitchFamily="49" charset="0"/>
-              </a:rPr>
-              <a:t>p</a:t>
-            </a:r>
-            <a:r>
-              <a:rPr lang="en-GB" sz="1200" dirty="0" err="1" smtClean="0">
-                <a:solidFill>
-                  <a:srgbClr val="FF0000"/>
-                </a:solidFill>
-                <a:latin typeface="JetBrains Mono" panose="02000009000000000000" pitchFamily="49" charset="0"/>
-                <a:ea typeface="JetBrains Mono" panose="02000009000000000000" pitchFamily="49" charset="0"/>
-                <a:cs typeface="JetBrains Mono" panose="02000009000000000000" pitchFamily="49" charset="0"/>
-              </a:rPr>
-              <a:t>rogramming_heist_professor</a:t>
-            </a:r>
-            <a:endParaRPr lang="en-IN" sz="1200" dirty="0">
-              <a:solidFill>
-                <a:srgbClr val="FF0000"/>
-              </a:solidFill>
-              <a:latin typeface="JetBrains Mono" panose="02000009000000000000" pitchFamily="49" charset="0"/>
-              <a:ea typeface="JetBrains Mono" panose="02000009000000000000" pitchFamily="49" charset="0"/>
-              <a:cs typeface="JetBrains Mono" panose="02000009000000000000" pitchFamily="49" charset="0"/>
-            </a:endParaRPr>
-          </a:p>
-        </p:txBody>
-      </p:sp>
-      <p:sp>
-        <p:nvSpPr>
           <p:cNvPr id="3" name="TextBox 2"/>
           <p:cNvSpPr txBox="1"/>
           <p:nvPr/>
@@ -3198,7 +3138,7 @@
           <a:lstStyle/>
           <a:p>
             <a:r>
-              <a:rPr lang="en-GB" sz="16600" dirty="0" smtClean="0">
+              <a:rPr lang="en-GB" sz="16600" dirty="0">
                 <a:solidFill>
                   <a:srgbClr val="FFFF00"/>
                 </a:solidFill>
@@ -3236,7 +3176,7 @@
           <a:lstStyle/>
           <a:p>
             <a:r>
-              <a:rPr lang="en-GB" sz="3200" dirty="0" smtClean="0">
+              <a:rPr lang="en-GB" sz="3200" dirty="0">
                 <a:solidFill>
                   <a:srgbClr val="FFFF00"/>
                 </a:solidFill>
@@ -3267,13 +3207,6 @@
   <p:clrMapOvr>
     <a:masterClrMapping/>
   </p:clrMapOvr>
-  <p:timing>
-    <p:tnLst>
-      <p:par>
-        <p:cTn id="1" dur="indefinite" restart="never" nodeType="tmRoot"/>
-      </p:par>
-    </p:tnLst>
-  </p:timing>
 </p:sld>
 </file>
 
@@ -3351,7 +3284,7 @@
           <a:lstStyle/>
           <a:p>
             <a:r>
-              <a:rPr lang="en-IN" sz="2800" dirty="0" smtClean="0">
+              <a:rPr lang="en-IN" sz="2800" dirty="0">
                 <a:solidFill>
                   <a:srgbClr val="FFC000"/>
                 </a:solidFill>
@@ -3359,18 +3292,7 @@
                 <a:ea typeface="JetBrains Mono" panose="02000009000000000000" pitchFamily="49" charset="0"/>
                 <a:cs typeface="JetBrains Mono" panose="02000009000000000000" pitchFamily="49" charset="0"/>
               </a:rPr>
-              <a:t>Stage is set for </a:t>
-            </a:r>
-            <a:r>
-              <a:rPr lang="en-IN" sz="2800" dirty="0">
-                <a:solidFill>
-                  <a:srgbClr val="FFC000"/>
-                </a:solidFill>
-                <a:latin typeface="JetBrains Mono" panose="02000009000000000000" pitchFamily="49" charset="0"/>
-                <a:ea typeface="JetBrains Mono" panose="02000009000000000000" pitchFamily="49" charset="0"/>
-                <a:cs typeface="JetBrains Mono" panose="02000009000000000000" pitchFamily="49" charset="0"/>
-              </a:rPr>
-              <a:t>Java?</a:t>
+              <a:t>Stage is set for Java?</a:t>
             </a:r>
           </a:p>
         </p:txBody>
@@ -3488,7 +3410,7 @@
           <a:lstStyle/>
           <a:p>
             <a:r>
-              <a:rPr lang="en-IN" dirty="0" smtClean="0">
+              <a:rPr lang="en-IN" dirty="0">
                 <a:solidFill>
                   <a:schemeClr val="tx1">
                     <a:lumMod val="85000"/>
@@ -3500,16 +3422,6 @@
               </a:rPr>
               <a:t>Before</a:t>
             </a:r>
-            <a:endParaRPr lang="en-IN" dirty="0">
-              <a:solidFill>
-                <a:schemeClr val="tx1">
-                  <a:lumMod val="85000"/>
-                </a:schemeClr>
-              </a:solidFill>
-              <a:latin typeface="JetBrains Mono" panose="02000009000000000000" pitchFamily="49" charset="0"/>
-              <a:ea typeface="JetBrains Mono" panose="02000009000000000000" pitchFamily="49" charset="0"/>
-              <a:cs typeface="JetBrains Mono" panose="02000009000000000000" pitchFamily="49" charset="0"/>
-            </a:endParaRPr>
           </a:p>
         </p:txBody>
       </p:sp>
@@ -3536,7 +3448,7 @@
           <a:lstStyle/>
           <a:p>
             <a:r>
-              <a:rPr lang="en-IN" dirty="0" smtClean="0">
+              <a:rPr lang="en-IN" dirty="0">
                 <a:solidFill>
                   <a:schemeClr val="tx1">
                     <a:lumMod val="85000"/>
@@ -3548,16 +3460,6 @@
               </a:rPr>
               <a:t>Now</a:t>
             </a:r>
-            <a:endParaRPr lang="en-IN" dirty="0">
-              <a:solidFill>
-                <a:schemeClr val="tx1">
-                  <a:lumMod val="85000"/>
-                </a:schemeClr>
-              </a:solidFill>
-              <a:latin typeface="JetBrains Mono" panose="02000009000000000000" pitchFamily="49" charset="0"/>
-              <a:ea typeface="JetBrains Mono" panose="02000009000000000000" pitchFamily="49" charset="0"/>
-              <a:cs typeface="JetBrains Mono" panose="02000009000000000000" pitchFamily="49" charset="0"/>
-            </a:endParaRPr>
           </a:p>
         </p:txBody>
       </p:sp>
@@ -3584,7 +3486,7 @@
           <a:lstStyle/>
           <a:p>
             <a:r>
-              <a:rPr lang="en-IN" dirty="0" smtClean="0">
+              <a:rPr lang="en-IN" dirty="0">
                 <a:solidFill>
                   <a:schemeClr val="tx1">
                     <a:lumMod val="85000"/>
@@ -3596,16 +3498,6 @@
               </a:rPr>
               <a:t>New Tech. Required..</a:t>
             </a:r>
-            <a:endParaRPr lang="en-IN" dirty="0">
-              <a:solidFill>
-                <a:schemeClr val="tx1">
-                  <a:lumMod val="85000"/>
-                </a:schemeClr>
-              </a:solidFill>
-              <a:latin typeface="JetBrains Mono" panose="02000009000000000000" pitchFamily="49" charset="0"/>
-              <a:ea typeface="JetBrains Mono" panose="02000009000000000000" pitchFamily="49" charset="0"/>
-              <a:cs typeface="JetBrains Mono" panose="02000009000000000000" pitchFamily="49" charset="0"/>
-            </a:endParaRPr>
           </a:p>
         </p:txBody>
       </p:sp>
@@ -3647,42 +3539,15 @@
                 <a:ea typeface="JetBrains Mono" panose="02000009000000000000" pitchFamily="49" charset="0"/>
                 <a:cs typeface="JetBrains Mono" panose="02000009000000000000" pitchFamily="49" charset="0"/>
               </a:rPr>
-              <a:t>World Wide Web and </a:t>
-            </a:r>
-            <a:r>
-              <a:rPr lang="en-IN" dirty="0" smtClean="0">
-                <a:solidFill>
-                  <a:srgbClr val="FFC000"/>
-                </a:solidFill>
-                <a:latin typeface="JetBrains Mono" panose="02000009000000000000" pitchFamily="49" charset="0"/>
-                <a:ea typeface="JetBrains Mono" panose="02000009000000000000" pitchFamily="49" charset="0"/>
-                <a:cs typeface="JetBrains Mono" panose="02000009000000000000" pitchFamily="49" charset="0"/>
-              </a:rPr>
-              <a:t>the Internet </a:t>
-            </a:r>
-            <a:r>
-              <a:rPr lang="en-IN" dirty="0">
-                <a:latin typeface="JetBrains Mono" panose="02000009000000000000" pitchFamily="49" charset="0"/>
-                <a:ea typeface="JetBrains Mono" panose="02000009000000000000" pitchFamily="49" charset="0"/>
-                <a:cs typeface="JetBrains Mono" panose="02000009000000000000" pitchFamily="49" charset="0"/>
-              </a:rPr>
-              <a:t>would reach critical mass. This event would </a:t>
-            </a:r>
-            <a:r>
-              <a:rPr lang="en-IN" dirty="0" smtClean="0">
-                <a:latin typeface="JetBrains Mono" panose="02000009000000000000" pitchFamily="49" charset="0"/>
-                <a:ea typeface="JetBrains Mono" panose="02000009000000000000" pitchFamily="49" charset="0"/>
-                <a:cs typeface="JetBrains Mono" panose="02000009000000000000" pitchFamily="49" charset="0"/>
-              </a:rPr>
-              <a:t>push another revolution </a:t>
-            </a:r>
-            <a:r>
-              <a:rPr lang="en-IN" dirty="0">
-                <a:latin typeface="JetBrains Mono" panose="02000009000000000000" pitchFamily="49" charset="0"/>
-                <a:ea typeface="JetBrains Mono" panose="02000009000000000000" pitchFamily="49" charset="0"/>
-                <a:cs typeface="JetBrains Mono" panose="02000009000000000000" pitchFamily="49" charset="0"/>
-              </a:rPr>
-              <a:t>in programming.</a:t>
+              <a:t>World Wide Web and the Internet </a:t>
+            </a:r>
+            <a:r>
+              <a:rPr lang="en-IN" dirty="0">
+                <a:latin typeface="JetBrains Mono" panose="02000009000000000000" pitchFamily="49" charset="0"/>
+                <a:ea typeface="JetBrains Mono" panose="02000009000000000000" pitchFamily="49" charset="0"/>
+                <a:cs typeface="JetBrains Mono" panose="02000009000000000000" pitchFamily="49" charset="0"/>
+              </a:rPr>
+              <a:t>would reach critical mass. This event would push another revolution in programming.</a:t>
             </a:r>
           </a:p>
         </p:txBody>
@@ -3717,53 +3582,15 @@
                 <a:ea typeface="JetBrains Mono" panose="02000009000000000000" pitchFamily="49" charset="0"/>
                 <a:cs typeface="JetBrains Mono" panose="02000009000000000000" pitchFamily="49" charset="0"/>
               </a:rPr>
-              <a:t>with the emergence of the </a:t>
-            </a:r>
-            <a:r>
-              <a:rPr lang="en-IN" dirty="0" smtClean="0">
-                <a:solidFill>
-                  <a:srgbClr val="FFC000"/>
-                </a:solidFill>
-                <a:latin typeface="JetBrains Mono" panose="02000009000000000000" pitchFamily="49" charset="0"/>
-                <a:ea typeface="JetBrains Mono" panose="02000009000000000000" pitchFamily="49" charset="0"/>
-                <a:cs typeface="JetBrains Mono" panose="02000009000000000000" pitchFamily="49" charset="0"/>
-              </a:rPr>
-              <a:t>World Wide </a:t>
-            </a:r>
-            <a:r>
-              <a:rPr lang="en-IN" dirty="0">
-                <a:solidFill>
-                  <a:srgbClr val="FFC000"/>
-                </a:solidFill>
-                <a:latin typeface="JetBrains Mono" panose="02000009000000000000" pitchFamily="49" charset="0"/>
-                <a:ea typeface="JetBrains Mono" panose="02000009000000000000" pitchFamily="49" charset="0"/>
-                <a:cs typeface="JetBrains Mono" panose="02000009000000000000" pitchFamily="49" charset="0"/>
-              </a:rPr>
-              <a:t>Web</a:t>
-            </a:r>
-            <a:r>
-              <a:rPr lang="en-IN" dirty="0">
-                <a:latin typeface="JetBrains Mono" panose="02000009000000000000" pitchFamily="49" charset="0"/>
-                <a:ea typeface="JetBrains Mono" panose="02000009000000000000" pitchFamily="49" charset="0"/>
-                <a:cs typeface="JetBrains Mono" panose="02000009000000000000" pitchFamily="49" charset="0"/>
-              </a:rPr>
-              <a:t>, Java was propelled to the forefront of computer language </a:t>
-            </a:r>
-            <a:r>
-              <a:rPr lang="en-IN" dirty="0" smtClean="0">
-                <a:latin typeface="JetBrains Mono" panose="02000009000000000000" pitchFamily="49" charset="0"/>
-                <a:ea typeface="JetBrains Mono" panose="02000009000000000000" pitchFamily="49" charset="0"/>
-                <a:cs typeface="JetBrains Mono" panose="02000009000000000000" pitchFamily="49" charset="0"/>
-              </a:rPr>
-              <a:t>design, because </a:t>
-            </a:r>
-            <a:r>
-              <a:rPr lang="en-IN" dirty="0">
-                <a:latin typeface="JetBrains Mono" panose="02000009000000000000" pitchFamily="49" charset="0"/>
-                <a:ea typeface="JetBrains Mono" panose="02000009000000000000" pitchFamily="49" charset="0"/>
-                <a:cs typeface="JetBrains Mono" panose="02000009000000000000" pitchFamily="49" charset="0"/>
-              </a:rPr>
-              <a:t>the Web, too, demanded portable programs.</a:t>
+              <a:t>with the emergence of the World Wide Web</a:t>
+            </a:r>
+            <a:r>
+              <a:rPr lang="en-IN" dirty="0">
+                <a:latin typeface="JetBrains Mono" panose="02000009000000000000" pitchFamily="49" charset="0"/>
+                <a:ea typeface="JetBrains Mono" panose="02000009000000000000" pitchFamily="49" charset="0"/>
+                <a:cs typeface="JetBrains Mono" panose="02000009000000000000" pitchFamily="49" charset="0"/>
+              </a:rPr>
+              <a:t>, Java was propelled to the forefront of computer language design, because the Web, too, demanded portable programs.</a:t>
             </a:r>
           </a:p>
         </p:txBody>
@@ -3799,18 +3626,7 @@
                 <a:ea typeface="JetBrains Mono" panose="02000009000000000000" pitchFamily="49" charset="0"/>
                 <a:cs typeface="JetBrains Mono" panose="02000009000000000000" pitchFamily="49" charset="0"/>
               </a:rPr>
-              <a:t>p</a:t>
-            </a:r>
-            <a:r>
-              <a:rPr lang="en-GB" sz="1200" dirty="0" err="1" smtClean="0">
-                <a:solidFill>
-                  <a:srgbClr val="FF0000"/>
-                </a:solidFill>
-                <a:latin typeface="JetBrains Mono" panose="02000009000000000000" pitchFamily="49" charset="0"/>
-                <a:ea typeface="JetBrains Mono" panose="02000009000000000000" pitchFamily="49" charset="0"/>
-                <a:cs typeface="JetBrains Mono" panose="02000009000000000000" pitchFamily="49" charset="0"/>
-              </a:rPr>
-              <a:t>rogramming_heist_professor</a:t>
+              <a:t>programming_heist_professor</a:t>
             </a:r>
             <a:endParaRPr lang="en-IN" sz="1200" dirty="0">
               <a:solidFill>
@@ -4250,7 +4066,7 @@
           <a:p>
             <a:pPr algn="just"/>
             <a:r>
-              <a:rPr lang="en-GB" dirty="0" smtClean="0">
+              <a:rPr lang="en-GB" dirty="0">
                 <a:solidFill>
                   <a:srgbClr val="FFC000"/>
                 </a:solidFill>
@@ -4261,7 +4077,7 @@
               <a:t>Java</a:t>
             </a:r>
             <a:r>
-              <a:rPr lang="en-GB" dirty="0" smtClean="0">
+              <a:rPr lang="en-GB" dirty="0">
                 <a:solidFill>
                   <a:schemeClr val="tx1">
                     <a:lumMod val="75000"/>
@@ -4271,20 +4087,7 @@
                 <a:ea typeface="JetBrains Mono" panose="02000009000000000000" pitchFamily="49" charset="0"/>
                 <a:cs typeface="JetBrains Mono" panose="02000009000000000000" pitchFamily="49" charset="0"/>
               </a:rPr>
-              <a:t> </a:t>
-            </a:r>
-            <a:r>
-              <a:rPr lang="en-GB" dirty="0">
-                <a:solidFill>
-                  <a:schemeClr val="tx1">
-                    <a:lumMod val="75000"/>
-                  </a:schemeClr>
-                </a:solidFill>
-                <a:latin typeface="JetBrains Mono" panose="02000009000000000000" pitchFamily="49" charset="0"/>
-                <a:ea typeface="JetBrains Mono" panose="02000009000000000000" pitchFamily="49" charset="0"/>
-                <a:cs typeface="JetBrains Mono" panose="02000009000000000000" pitchFamily="49" charset="0"/>
-              </a:rPr>
-              <a:t>is a </a:t>
+              <a:t> is a </a:t>
             </a:r>
             <a:r>
               <a:rPr lang="en-GB" dirty="0">
@@ -4401,7 +4204,7 @@
               <a:t>processor or system</a:t>
             </a:r>
             <a:r>
-              <a:rPr lang="en-GB" dirty="0" smtClean="0">
+              <a:rPr lang="en-GB" dirty="0">
                 <a:solidFill>
                   <a:schemeClr val="tx1">
                     <a:lumMod val="75000"/>
@@ -4449,7 +4252,7 @@
           <a:lstStyle/>
           <a:p>
             <a:r>
-              <a:rPr lang="en-GB" sz="2400" dirty="0" smtClean="0">
+              <a:rPr lang="en-GB" sz="2400" dirty="0">
                 <a:solidFill>
                   <a:srgbClr val="FFC000"/>
                 </a:solidFill>
@@ -4507,7 +4310,7 @@
           </a:p>
           <a:p>
             <a:r>
-              <a:rPr lang="en-IN" dirty="0" smtClean="0">
+              <a:rPr lang="en-IN" dirty="0">
                 <a:solidFill>
                   <a:schemeClr val="tx1">
                     <a:lumMod val="85000"/>
@@ -4520,7 +4323,7 @@
               <a:t>	- microprocessor (</a:t>
             </a:r>
             <a:r>
-              <a:rPr lang="en-IN" dirty="0" smtClean="0">
+              <a:rPr lang="en-IN" dirty="0">
                 <a:latin typeface="JetBrains Mono" panose="02000009000000000000" pitchFamily="49" charset="0"/>
                 <a:ea typeface="JetBrains Mono" panose="02000009000000000000" pitchFamily="49" charset="0"/>
                 <a:cs typeface="JetBrains Mono" panose="02000009000000000000" pitchFamily="49" charset="0"/>
@@ -4540,10 +4343,12 @@
                 <a:ea typeface="JetBrains Mono" panose="02000009000000000000" pitchFamily="49" charset="0"/>
                 <a:cs typeface="JetBrains Mono" panose="02000009000000000000" pitchFamily="49" charset="0"/>
               </a:rPr>
-              <a:t>		</a:t>
-            </a:r>
-            <a:r>
-              <a:rPr lang="en-GB" dirty="0" smtClean="0">
+              <a:t>		- (RISC)-based computers use the big-endian approach</a:t>
+            </a:r>
+          </a:p>
+          <a:p>
+            <a:r>
+              <a:rPr lang="en-GB" dirty="0">
                 <a:solidFill>
                   <a:schemeClr val="tx1">
                     <a:lumMod val="85000"/>
@@ -4553,100 +4358,7 @@
                 <a:ea typeface="JetBrains Mono" panose="02000009000000000000" pitchFamily="49" charset="0"/>
                 <a:cs typeface="JetBrains Mono" panose="02000009000000000000" pitchFamily="49" charset="0"/>
               </a:rPr>
-              <a:t>- (</a:t>
-            </a:r>
-            <a:r>
-              <a:rPr lang="en-GB" dirty="0">
-                <a:solidFill>
-                  <a:schemeClr val="tx1">
-                    <a:lumMod val="85000"/>
-                  </a:schemeClr>
-                </a:solidFill>
-                <a:latin typeface="JetBrains Mono" panose="02000009000000000000" pitchFamily="49" charset="0"/>
-                <a:ea typeface="JetBrains Mono" panose="02000009000000000000" pitchFamily="49" charset="0"/>
-                <a:cs typeface="JetBrains Mono" panose="02000009000000000000" pitchFamily="49" charset="0"/>
-              </a:rPr>
-              <a:t>RISC)-based computers use the big-endian </a:t>
-            </a:r>
-            <a:r>
-              <a:rPr lang="en-GB" dirty="0" smtClean="0">
-                <a:solidFill>
-                  <a:schemeClr val="tx1">
-                    <a:lumMod val="85000"/>
-                  </a:schemeClr>
-                </a:solidFill>
-                <a:latin typeface="JetBrains Mono" panose="02000009000000000000" pitchFamily="49" charset="0"/>
-                <a:ea typeface="JetBrains Mono" panose="02000009000000000000" pitchFamily="49" charset="0"/>
-                <a:cs typeface="JetBrains Mono" panose="02000009000000000000" pitchFamily="49" charset="0"/>
-              </a:rPr>
-              <a:t>approach</a:t>
-            </a:r>
-          </a:p>
-          <a:p>
-            <a:r>
-              <a:rPr lang="en-GB" dirty="0">
-                <a:solidFill>
-                  <a:schemeClr val="tx1">
-                    <a:lumMod val="85000"/>
-                  </a:schemeClr>
-                </a:solidFill>
-                <a:latin typeface="JetBrains Mono" panose="02000009000000000000" pitchFamily="49" charset="0"/>
-                <a:ea typeface="JetBrains Mono" panose="02000009000000000000" pitchFamily="49" charset="0"/>
-                <a:cs typeface="JetBrains Mono" panose="02000009000000000000" pitchFamily="49" charset="0"/>
-              </a:rPr>
-              <a:t>	</a:t>
-            </a:r>
-            <a:r>
-              <a:rPr lang="en-GB" dirty="0" smtClean="0">
-                <a:solidFill>
-                  <a:schemeClr val="tx1">
-                    <a:lumMod val="85000"/>
-                  </a:schemeClr>
-                </a:solidFill>
-                <a:latin typeface="JetBrains Mono" panose="02000009000000000000" pitchFamily="49" charset="0"/>
-                <a:ea typeface="JetBrains Mono" panose="02000009000000000000" pitchFamily="49" charset="0"/>
-                <a:cs typeface="JetBrains Mono" panose="02000009000000000000" pitchFamily="49" charset="0"/>
-              </a:rPr>
-              <a:t>	- (CISC</a:t>
-            </a:r>
-            <a:r>
-              <a:rPr lang="en-GB" dirty="0">
-                <a:solidFill>
-                  <a:schemeClr val="tx1">
-                    <a:lumMod val="85000"/>
-                  </a:schemeClr>
-                </a:solidFill>
-                <a:latin typeface="JetBrains Mono" panose="02000009000000000000" pitchFamily="49" charset="0"/>
-                <a:ea typeface="JetBrains Mono" panose="02000009000000000000" pitchFamily="49" charset="0"/>
-                <a:cs typeface="JetBrains Mono" panose="02000009000000000000" pitchFamily="49" charset="0"/>
-              </a:rPr>
-              <a:t>)-based computers use the </a:t>
-            </a:r>
-            <a:r>
-              <a:rPr lang="en-GB" dirty="0" smtClean="0">
-                <a:solidFill>
-                  <a:schemeClr val="tx1">
-                    <a:lumMod val="85000"/>
-                  </a:schemeClr>
-                </a:solidFill>
-                <a:latin typeface="JetBrains Mono" panose="02000009000000000000" pitchFamily="49" charset="0"/>
-                <a:ea typeface="JetBrains Mono" panose="02000009000000000000" pitchFamily="49" charset="0"/>
-                <a:cs typeface="JetBrains Mono" panose="02000009000000000000" pitchFamily="49" charset="0"/>
-              </a:rPr>
-              <a:t>little-endian </a:t>
-            </a:r>
-            <a:r>
-              <a:rPr lang="en-GB" dirty="0">
-                <a:solidFill>
-                  <a:schemeClr val="tx1">
-                    <a:lumMod val="85000"/>
-                  </a:schemeClr>
-                </a:solidFill>
-                <a:latin typeface="JetBrains Mono" panose="02000009000000000000" pitchFamily="49" charset="0"/>
-                <a:ea typeface="JetBrains Mono" panose="02000009000000000000" pitchFamily="49" charset="0"/>
-                <a:cs typeface="JetBrains Mono" panose="02000009000000000000" pitchFamily="49" charset="0"/>
-              </a:rPr>
-              <a:t>approach</a:t>
+              <a:t>		- (CISC)-based computers use the little-endian approach</a:t>
             </a:r>
             <a:endParaRPr lang="en-IN" dirty="0">
               <a:solidFill>
@@ -4661,7 +4373,7 @@
           </a:p>
           <a:p>
             <a:r>
-              <a:rPr lang="en-IN" dirty="0" smtClean="0">
+              <a:rPr lang="en-IN" dirty="0">
                 <a:solidFill>
                   <a:schemeClr val="tx1">
                     <a:lumMod val="85000"/>
@@ -4673,20 +4385,10 @@
               </a:rPr>
               <a:t>	- microcontroller</a:t>
             </a:r>
-            <a:endParaRPr lang="en-IN" dirty="0">
-              <a:solidFill>
-                <a:schemeClr val="tx1">
-                  <a:lumMod val="85000"/>
-                </a:schemeClr>
-              </a:solidFill>
-              <a:latin typeface="JetBrains Mono" panose="02000009000000000000" pitchFamily="49" charset="0"/>
-              <a:ea typeface="JetBrains Mono" panose="02000009000000000000" pitchFamily="49" charset="0"/>
-              <a:cs typeface="JetBrains Mono" panose="02000009000000000000" pitchFamily="49" charset="0"/>
-            </a:endParaRPr>
-          </a:p>
-          <a:p>
-            <a:r>
-              <a:rPr lang="en-IN" dirty="0" smtClean="0">
+          </a:p>
+          <a:p>
+            <a:r>
+              <a:rPr lang="en-IN" dirty="0">
                 <a:solidFill>
                   <a:schemeClr val="tx1">
                     <a:lumMod val="85000"/>
@@ -4696,8 +4398,10 @@
                 <a:ea typeface="JetBrains Mono" panose="02000009000000000000" pitchFamily="49" charset="0"/>
                 <a:cs typeface="JetBrains Mono" panose="02000009000000000000" pitchFamily="49" charset="0"/>
               </a:rPr>
-              <a:t>	- embedded </a:t>
-            </a:r>
+              <a:t>	- embedded processor</a:t>
+            </a:r>
+          </a:p>
+          <a:p>
             <a:r>
               <a:rPr lang="en-IN" dirty="0">
                 <a:solidFill>
@@ -4709,35 +4413,7 @@
                 <a:ea typeface="JetBrains Mono" panose="02000009000000000000" pitchFamily="49" charset="0"/>
                 <a:cs typeface="JetBrains Mono" panose="02000009000000000000" pitchFamily="49" charset="0"/>
               </a:rPr>
-              <a:t>processor</a:t>
-            </a:r>
-          </a:p>
-          <a:p>
-            <a:r>
-              <a:rPr lang="en-IN" dirty="0" smtClean="0">
-                <a:solidFill>
-                  <a:schemeClr val="tx1">
-                    <a:lumMod val="85000"/>
-                  </a:schemeClr>
-                </a:solidFill>
-                <a:latin typeface="JetBrains Mono" panose="02000009000000000000" pitchFamily="49" charset="0"/>
-                <a:ea typeface="JetBrains Mono" panose="02000009000000000000" pitchFamily="49" charset="0"/>
-                <a:cs typeface="JetBrains Mono" panose="02000009000000000000" pitchFamily="49" charset="0"/>
-              </a:rPr>
-              <a:t>	- digital </a:t>
-            </a:r>
-            <a:r>
-              <a:rPr lang="en-IN" dirty="0">
-                <a:solidFill>
-                  <a:schemeClr val="tx1">
-                    <a:lumMod val="85000"/>
-                  </a:schemeClr>
-                </a:solidFill>
-                <a:latin typeface="JetBrains Mono" panose="02000009000000000000" pitchFamily="49" charset="0"/>
-                <a:ea typeface="JetBrains Mono" panose="02000009000000000000" pitchFamily="49" charset="0"/>
-                <a:cs typeface="JetBrains Mono" panose="02000009000000000000" pitchFamily="49" charset="0"/>
-              </a:rPr>
-              <a:t>signal processor</a:t>
+              <a:t>	- digital signal processor</a:t>
             </a:r>
           </a:p>
         </p:txBody>
@@ -4802,61 +4478,6 @@
           </a:prstGeom>
         </p:spPr>
       </p:pic>
-      <p:sp>
-        <p:nvSpPr>
-          <p:cNvPr id="7" name="TextBox 6"/>
-          <p:cNvSpPr txBox="1"/>
-          <p:nvPr/>
-        </p:nvSpPr>
-        <p:spPr>
-          <a:xfrm>
-            <a:off x="9337639" y="6368527"/>
-            <a:ext cx="2694969" cy="276999"/>
-          </a:xfrm>
-          <a:prstGeom prst="rect">
-            <a:avLst/>
-          </a:prstGeom>
-          <a:noFill/>
-        </p:spPr>
-        <p:txBody>
-          <a:bodyPr wrap="none" rtlCol="0">
-            <a:spAutoFit/>
-          </a:bodyPr>
-          <a:lstStyle/>
-          <a:p>
-            <a:r>
-              <a:rPr lang="en-GB" sz="1200" dirty="0" err="1">
-                <a:solidFill>
-                  <a:srgbClr val="FF0000"/>
-                </a:solidFill>
-                <a:latin typeface="JetBrains Mono" panose="02000009000000000000" pitchFamily="49" charset="0"/>
-                <a:ea typeface="JetBrains Mono" panose="02000009000000000000" pitchFamily="49" charset="0"/>
-                <a:cs typeface="JetBrains Mono" panose="02000009000000000000" pitchFamily="49" charset="0"/>
-              </a:rPr>
-              <a:t>p</a:t>
-            </a:r>
-            <a:r>
-              <a:rPr lang="en-GB" sz="1200" dirty="0" err="1" smtClean="0">
-                <a:solidFill>
-                  <a:srgbClr val="FF0000"/>
-                </a:solidFill>
-                <a:latin typeface="JetBrains Mono" panose="02000009000000000000" pitchFamily="49" charset="0"/>
-                <a:ea typeface="JetBrains Mono" panose="02000009000000000000" pitchFamily="49" charset="0"/>
-                <a:cs typeface="JetBrains Mono" panose="02000009000000000000" pitchFamily="49" charset="0"/>
-              </a:rPr>
-              <a:t>rogramming_heist_professor</a:t>
-            </a:r>
-            <a:endParaRPr lang="en-IN" sz="1200" dirty="0">
-              <a:solidFill>
-                <a:srgbClr val="FF0000"/>
-              </a:solidFill>
-              <a:latin typeface="JetBrains Mono" panose="02000009000000000000" pitchFamily="49" charset="0"/>
-              <a:ea typeface="JetBrains Mono" panose="02000009000000000000" pitchFamily="49" charset="0"/>
-              <a:cs typeface="JetBrains Mono" panose="02000009000000000000" pitchFamily="49" charset="0"/>
-            </a:endParaRPr>
-          </a:p>
-        </p:txBody>
-      </p:sp>
     </p:spTree>
     <p:extLst>
       <p:ext uri="{BB962C8B-B14F-4D97-AF65-F5344CB8AC3E}">
@@ -4867,13 +4488,6 @@
   <p:clrMapOvr>
     <a:masterClrMapping/>
   </p:clrMapOvr>
-  <p:timing>
-    <p:tnLst>
-      <p:par>
-        <p:cTn id="1" dur="indefinite" restart="never" nodeType="tmRoot"/>
-      </p:par>
-    </p:tnLst>
-  </p:timing>
 </p:sld>
 </file>
 
@@ -4917,7 +4531,7 @@
           <a:lstStyle/>
           <a:p>
             <a:r>
-              <a:rPr lang="en-GB" sz="2400" dirty="0" smtClean="0">
+              <a:rPr lang="en-GB" sz="2400" dirty="0">
                 <a:solidFill>
                   <a:srgbClr val="FFC000"/>
                 </a:solidFill>
@@ -4928,7 +4542,7 @@
               <a:t>Any </a:t>
             </a:r>
             <a:r>
-              <a:rPr lang="en-GB" sz="2800" dirty="0" smtClean="0">
+              <a:rPr lang="en-GB" sz="2800" dirty="0">
                 <a:solidFill>
                   <a:srgbClr val="FFC000"/>
                 </a:solidFill>
@@ -4939,7 +4553,7 @@
               <a:t>Operating</a:t>
             </a:r>
             <a:r>
-              <a:rPr lang="en-GB" sz="2400" dirty="0" smtClean="0">
+              <a:rPr lang="en-GB" sz="2400" dirty="0">
                 <a:solidFill>
                   <a:srgbClr val="FFC000"/>
                 </a:solidFill>
@@ -4982,71 +4596,42 @@
           <a:lstStyle/>
           <a:p>
             <a:r>
-              <a:rPr lang="en-IN" dirty="0" smtClean="0">
+              <a:rPr lang="en-IN" dirty="0">
                 <a:latin typeface="JetBrains Mono" panose="02000009000000000000" pitchFamily="49" charset="0"/>
                 <a:ea typeface="JetBrains Mono" panose="02000009000000000000" pitchFamily="49" charset="0"/>
                 <a:cs typeface="JetBrains Mono" panose="02000009000000000000" pitchFamily="49" charset="0"/>
               </a:rPr>
               <a:t>- Apple macOS</a:t>
             </a:r>
-            <a:endParaRPr lang="en-IN" dirty="0">
-              <a:latin typeface="JetBrains Mono" panose="02000009000000000000" pitchFamily="49" charset="0"/>
-              <a:ea typeface="JetBrains Mono" panose="02000009000000000000" pitchFamily="49" charset="0"/>
-              <a:cs typeface="JetBrains Mono" panose="02000009000000000000" pitchFamily="49" charset="0"/>
-            </a:endParaRPr>
-          </a:p>
-          <a:p>
-            <a:r>
-              <a:rPr lang="en-IN" dirty="0" smtClean="0">
-                <a:latin typeface="JetBrains Mono" panose="02000009000000000000" pitchFamily="49" charset="0"/>
-                <a:ea typeface="JetBrains Mono" panose="02000009000000000000" pitchFamily="49" charset="0"/>
-                <a:cs typeface="JetBrains Mono" panose="02000009000000000000" pitchFamily="49" charset="0"/>
-              </a:rPr>
-              <a:t>- Microsoft </a:t>
-            </a:r>
-            <a:r>
-              <a:rPr lang="en-IN" dirty="0">
-                <a:latin typeface="JetBrains Mono" panose="02000009000000000000" pitchFamily="49" charset="0"/>
-                <a:ea typeface="JetBrains Mono" panose="02000009000000000000" pitchFamily="49" charset="0"/>
-                <a:cs typeface="JetBrains Mono" panose="02000009000000000000" pitchFamily="49" charset="0"/>
-              </a:rPr>
-              <a:t>Windows</a:t>
-            </a:r>
-          </a:p>
-          <a:p>
-            <a:r>
-              <a:rPr lang="en-IN" dirty="0" smtClean="0">
-                <a:latin typeface="JetBrains Mono" panose="02000009000000000000" pitchFamily="49" charset="0"/>
-                <a:ea typeface="JetBrains Mono" panose="02000009000000000000" pitchFamily="49" charset="0"/>
-                <a:cs typeface="JetBrains Mono" panose="02000009000000000000" pitchFamily="49" charset="0"/>
-              </a:rPr>
-              <a:t>- Google's </a:t>
-            </a:r>
-            <a:r>
-              <a:rPr lang="en-IN" dirty="0">
-                <a:latin typeface="JetBrains Mono" panose="02000009000000000000" pitchFamily="49" charset="0"/>
-                <a:ea typeface="JetBrains Mono" panose="02000009000000000000" pitchFamily="49" charset="0"/>
-                <a:cs typeface="JetBrains Mono" panose="02000009000000000000" pitchFamily="49" charset="0"/>
-              </a:rPr>
-              <a:t>Android OS</a:t>
-            </a:r>
-          </a:p>
-          <a:p>
-            <a:r>
-              <a:rPr lang="en-IN" dirty="0" smtClean="0">
-                <a:latin typeface="JetBrains Mono" panose="02000009000000000000" pitchFamily="49" charset="0"/>
-                <a:ea typeface="JetBrains Mono" panose="02000009000000000000" pitchFamily="49" charset="0"/>
-                <a:cs typeface="JetBrains Mono" panose="02000009000000000000" pitchFamily="49" charset="0"/>
-              </a:rPr>
-              <a:t>- Linux </a:t>
-            </a:r>
-            <a:r>
-              <a:rPr lang="en-IN" dirty="0">
-                <a:latin typeface="JetBrains Mono" panose="02000009000000000000" pitchFamily="49" charset="0"/>
-                <a:ea typeface="JetBrains Mono" panose="02000009000000000000" pitchFamily="49" charset="0"/>
-                <a:cs typeface="JetBrains Mono" panose="02000009000000000000" pitchFamily="49" charset="0"/>
-              </a:rPr>
-              <a:t>Operating System</a:t>
+          </a:p>
+          <a:p>
+            <a:r>
+              <a:rPr lang="en-IN" dirty="0">
+                <a:latin typeface="JetBrains Mono" panose="02000009000000000000" pitchFamily="49" charset="0"/>
+                <a:ea typeface="JetBrains Mono" panose="02000009000000000000" pitchFamily="49" charset="0"/>
+                <a:cs typeface="JetBrains Mono" panose="02000009000000000000" pitchFamily="49" charset="0"/>
+              </a:rPr>
+              <a:t>- Microsoft Windows</a:t>
+            </a:r>
+          </a:p>
+          <a:p>
+            <a:r>
+              <a:rPr lang="en-IN" dirty="0">
+                <a:latin typeface="JetBrains Mono" panose="02000009000000000000" pitchFamily="49" charset="0"/>
+                <a:ea typeface="JetBrains Mono" panose="02000009000000000000" pitchFamily="49" charset="0"/>
+                <a:cs typeface="JetBrains Mono" panose="02000009000000000000" pitchFamily="49" charset="0"/>
+              </a:rPr>
+              <a:t>- Google's Android OS</a:t>
+            </a:r>
+          </a:p>
+          <a:p>
+            <a:r>
+              <a:rPr lang="en-IN" dirty="0">
+                <a:latin typeface="JetBrains Mono" panose="02000009000000000000" pitchFamily="49" charset="0"/>
+                <a:ea typeface="JetBrains Mono" panose="02000009000000000000" pitchFamily="49" charset="0"/>
+                <a:cs typeface="JetBrains Mono" panose="02000009000000000000" pitchFamily="49" charset="0"/>
+              </a:rPr>
+              <a:t>- Linux Operating System</a:t>
             </a:r>
           </a:p>
           <a:p>
@@ -5055,7 +4640,7 @@
               <a:buChar char="-"/>
             </a:pPr>
             <a:r>
-              <a:rPr lang="en-IN" dirty="0" smtClean="0">
+              <a:rPr lang="en-IN" dirty="0">
                 <a:latin typeface="JetBrains Mono" panose="02000009000000000000" pitchFamily="49" charset="0"/>
                 <a:ea typeface="JetBrains Mono" panose="02000009000000000000" pitchFamily="49" charset="0"/>
                 <a:cs typeface="JetBrains Mono" panose="02000009000000000000" pitchFamily="49" charset="0"/>
@@ -5069,7 +4654,7 @@
               <a:buChar char="-"/>
             </a:pPr>
             <a:r>
-              <a:rPr lang="en-GB" dirty="0" smtClean="0">
+              <a:rPr lang="en-GB" dirty="0">
                 <a:latin typeface="JetBrains Mono" panose="02000009000000000000" pitchFamily="49" charset="0"/>
                 <a:ea typeface="JetBrains Mono" panose="02000009000000000000" pitchFamily="49" charset="0"/>
                 <a:cs typeface="JetBrains Mono" panose="02000009000000000000" pitchFamily="49" charset="0"/>
@@ -5107,7 +4692,7 @@
           <a:lstStyle/>
           <a:p>
             <a:r>
-              <a:rPr lang="en-GB" sz="2800" dirty="0" smtClean="0">
+              <a:rPr lang="en-GB" sz="2800" dirty="0">
                 <a:solidFill>
                   <a:srgbClr val="FFC000"/>
                 </a:solidFill>
@@ -5151,7 +4736,7 @@
           <a:lstStyle/>
           <a:p>
             <a:r>
-              <a:rPr lang="en-GB" sz="3600" dirty="0" smtClean="0">
+              <a:rPr lang="en-GB" sz="3600" dirty="0">
                 <a:solidFill>
                   <a:schemeClr val="tx1">
                     <a:lumMod val="95000"/>
@@ -5164,7 +4749,7 @@
               <a:t>Uncountable……… </a:t>
             </a:r>
             <a:r>
-              <a:rPr lang="en-GB" sz="1200" dirty="0" smtClean="0">
+              <a:rPr lang="en-GB" sz="1200" dirty="0">
                 <a:solidFill>
                   <a:schemeClr val="tx1">
                     <a:lumMod val="95000"/>
@@ -5219,61 +4804,6 @@
           </a:prstGeom>
         </p:spPr>
       </p:pic>
-      <p:sp>
-        <p:nvSpPr>
-          <p:cNvPr id="8" name="TextBox 7"/>
-          <p:cNvSpPr txBox="1"/>
-          <p:nvPr/>
-        </p:nvSpPr>
-        <p:spPr>
-          <a:xfrm>
-            <a:off x="9337639" y="6368527"/>
-            <a:ext cx="2694969" cy="276999"/>
-          </a:xfrm>
-          <a:prstGeom prst="rect">
-            <a:avLst/>
-          </a:prstGeom>
-          <a:noFill/>
-        </p:spPr>
-        <p:txBody>
-          <a:bodyPr wrap="none" rtlCol="0">
-            <a:spAutoFit/>
-          </a:bodyPr>
-          <a:lstStyle/>
-          <a:p>
-            <a:r>
-              <a:rPr lang="en-GB" sz="1200" dirty="0" err="1">
-                <a:solidFill>
-                  <a:srgbClr val="FF0000"/>
-                </a:solidFill>
-                <a:latin typeface="JetBrains Mono" panose="02000009000000000000" pitchFamily="49" charset="0"/>
-                <a:ea typeface="JetBrains Mono" panose="02000009000000000000" pitchFamily="49" charset="0"/>
-                <a:cs typeface="JetBrains Mono" panose="02000009000000000000" pitchFamily="49" charset="0"/>
-              </a:rPr>
-              <a:t>p</a:t>
-            </a:r>
-            <a:r>
-              <a:rPr lang="en-GB" sz="1200" dirty="0" err="1" smtClean="0">
-                <a:solidFill>
-                  <a:srgbClr val="FF0000"/>
-                </a:solidFill>
-                <a:latin typeface="JetBrains Mono" panose="02000009000000000000" pitchFamily="49" charset="0"/>
-                <a:ea typeface="JetBrains Mono" panose="02000009000000000000" pitchFamily="49" charset="0"/>
-                <a:cs typeface="JetBrains Mono" panose="02000009000000000000" pitchFamily="49" charset="0"/>
-              </a:rPr>
-              <a:t>rogramming_heist_professor</a:t>
-            </a:r>
-            <a:endParaRPr lang="en-IN" sz="1200" dirty="0">
-              <a:solidFill>
-                <a:srgbClr val="FF0000"/>
-              </a:solidFill>
-              <a:latin typeface="JetBrains Mono" panose="02000009000000000000" pitchFamily="49" charset="0"/>
-              <a:ea typeface="JetBrains Mono" panose="02000009000000000000" pitchFamily="49" charset="0"/>
-              <a:cs typeface="JetBrains Mono" panose="02000009000000000000" pitchFamily="49" charset="0"/>
-            </a:endParaRPr>
-          </a:p>
-        </p:txBody>
-      </p:sp>
     </p:spTree>
     <p:extLst>
       <p:ext uri="{BB962C8B-B14F-4D97-AF65-F5344CB8AC3E}">
@@ -5284,13 +4814,6 @@
   <p:clrMapOvr>
     <a:masterClrMapping/>
   </p:clrMapOvr>
-  <p:timing>
-    <p:tnLst>
-      <p:par>
-        <p:cTn id="1" dur="indefinite" restart="never" nodeType="tmRoot"/>
-      </p:par>
-    </p:tnLst>
-  </p:timing>
 </p:sld>
 </file>
 
@@ -5338,36 +4861,12 @@
               </a:spcAft>
             </a:pPr>
             <a:r>
-              <a:rPr lang="en-US" dirty="0" smtClean="0">
-                <a:latin typeface="JetBrains Mono" panose="02000009000000000000" pitchFamily="49" charset="0"/>
-                <a:ea typeface="JetBrains Mono" panose="02000009000000000000" pitchFamily="49" charset="0"/>
-                <a:cs typeface="JetBrains Mono" panose="02000009000000000000" pitchFamily="49" charset="0"/>
-              </a:rPr>
-              <a:t>Audio </a:t>
-            </a:r>
-            <a:r>
               <a:rPr lang="en-US" dirty="0">
                 <a:latin typeface="JetBrains Mono" panose="02000009000000000000" pitchFamily="49" charset="0"/>
                 <a:ea typeface="JetBrains Mono" panose="02000009000000000000" pitchFamily="49" charset="0"/>
                 <a:cs typeface="JetBrains Mono" panose="02000009000000000000" pitchFamily="49" charset="0"/>
               </a:rPr>
-              <a:t>components fax machines, scanners, printers, cell phones, personal digital assistants, </a:t>
-            </a:r>
-            <a:r>
-              <a:rPr lang="en-US" dirty="0" smtClean="0">
-                <a:latin typeface="JetBrains Mono" panose="02000009000000000000" pitchFamily="49" charset="0"/>
-                <a:ea typeface="JetBrains Mono" panose="02000009000000000000" pitchFamily="49" charset="0"/>
-                <a:cs typeface="JetBrains Mono" panose="02000009000000000000" pitchFamily="49" charset="0"/>
-              </a:rPr>
-              <a:t>mobile phones </a:t>
-            </a:r>
-            <a:r>
-              <a:rPr lang="en-US" dirty="0">
-                <a:latin typeface="JetBrains Mono" panose="02000009000000000000" pitchFamily="49" charset="0"/>
-                <a:ea typeface="JetBrains Mono" panose="02000009000000000000" pitchFamily="49" charset="0"/>
-                <a:cs typeface="JetBrains Mono" panose="02000009000000000000" pitchFamily="49" charset="0"/>
-              </a:rPr>
-              <a:t>and also wrist watches all these devices are enhanced with microprocessors and are becoming the part of the network. </a:t>
+              <a:t>Audio components fax machines, scanners, printers, cell phones, personal digital assistants, mobile phones and also wrist watches all these devices are enhanced with microprocessors and are becoming the part of the network. </a:t>
             </a:r>
             <a:r>
               <a:rPr lang="en-US" dirty="0">
@@ -5553,18 +5052,7 @@
                 <a:ea typeface="JetBrains Mono" panose="02000009000000000000" pitchFamily="49" charset="0"/>
                 <a:cs typeface="JetBrains Mono" panose="02000009000000000000" pitchFamily="49" charset="0"/>
               </a:rPr>
-              <a:t>p</a:t>
-            </a:r>
-            <a:r>
-              <a:rPr lang="en-GB" sz="1200" dirty="0" err="1" smtClean="0">
-                <a:solidFill>
-                  <a:srgbClr val="FF0000"/>
-                </a:solidFill>
-                <a:latin typeface="JetBrains Mono" panose="02000009000000000000" pitchFamily="49" charset="0"/>
-                <a:ea typeface="JetBrains Mono" panose="02000009000000000000" pitchFamily="49" charset="0"/>
-                <a:cs typeface="JetBrains Mono" panose="02000009000000000000" pitchFamily="49" charset="0"/>
-              </a:rPr>
-              <a:t>rogramming_heist_professor</a:t>
+              <a:t>programming_heist_professor</a:t>
             </a:r>
             <a:endParaRPr lang="en-IN" sz="1200" dirty="0">
               <a:solidFill>
@@ -5587,13 +5075,6 @@
   <p:clrMapOvr>
     <a:masterClrMapping/>
   </p:clrMapOvr>
-  <p:timing>
-    <p:tnLst>
-      <p:par>
-        <p:cTn id="1" dur="indefinite" restart="never" nodeType="tmRoot"/>
-      </p:par>
-    </p:tnLst>
-  </p:timing>
 </p:sld>
 </file>
 
@@ -5689,15 +5170,7 @@
                 <a:ea typeface="JetBrains Mono" panose="02000009000000000000" pitchFamily="49" charset="0"/>
                 <a:cs typeface="JetBrains Mono" panose="02000009000000000000" pitchFamily="49" charset="0"/>
               </a:rPr>
-              <a:t>Java architecture is composed of four distinct but interrelated technologies each of which is defined by a separate specification from Sun Microsystems</a:t>
-            </a:r>
-            <a:r>
-              <a:rPr lang="en-US" dirty="0" smtClean="0">
-                <a:latin typeface="JetBrains Mono" panose="02000009000000000000" pitchFamily="49" charset="0"/>
-                <a:ea typeface="JetBrains Mono" panose="02000009000000000000" pitchFamily="49" charset="0"/>
-                <a:cs typeface="JetBrains Mono" panose="02000009000000000000" pitchFamily="49" charset="0"/>
-              </a:rPr>
-              <a:t>.</a:t>
+              <a:t>Java architecture is composed of four distinct but interrelated technologies each of which is defined by a separate specification from Sun Microsystems.</a:t>
             </a:r>
           </a:p>
           <a:p>
@@ -5709,7 +5182,7 @@
                 <a:tab pos="457200" algn="l"/>
               </a:tabLst>
             </a:pPr>
-            <a:endParaRPr lang="en-IN" dirty="0" smtClean="0">
+            <a:endParaRPr lang="en-IN" dirty="0">
               <a:latin typeface="JetBrains Mono" panose="02000009000000000000" pitchFamily="49" charset="0"/>
               <a:ea typeface="JetBrains Mono" panose="02000009000000000000" pitchFamily="49" charset="0"/>
               <a:cs typeface="JetBrains Mono" panose="02000009000000000000" pitchFamily="49" charset="0"/>
@@ -5730,23 +5203,7 @@
                 <a:ea typeface="JetBrains Mono" panose="02000009000000000000" pitchFamily="49" charset="0"/>
                 <a:cs typeface="JetBrains Mono" panose="02000009000000000000" pitchFamily="49" charset="0"/>
               </a:rPr>
-              <a:t> </a:t>
-            </a:r>
-            <a:r>
-              <a:rPr lang="en-IN" dirty="0" smtClean="0">
-                <a:latin typeface="JetBrains Mono" panose="02000009000000000000" pitchFamily="49" charset="0"/>
-                <a:ea typeface="JetBrains Mono" panose="02000009000000000000" pitchFamily="49" charset="0"/>
-                <a:cs typeface="JetBrains Mono" panose="02000009000000000000" pitchFamily="49" charset="0"/>
-              </a:rPr>
-              <a:t>- </a:t>
-            </a:r>
-            <a:r>
-              <a:rPr lang="en-US" dirty="0" smtClean="0">
-                <a:latin typeface="JetBrains Mono" panose="02000009000000000000" pitchFamily="49" charset="0"/>
-                <a:ea typeface="JetBrains Mono" panose="02000009000000000000" pitchFamily="49" charset="0"/>
-                <a:cs typeface="JetBrains Mono" panose="02000009000000000000" pitchFamily="49" charset="0"/>
-              </a:rPr>
-              <a:t>The </a:t>
+              <a:t> - </a:t>
             </a:r>
             <a:r>
               <a:rPr lang="en-US" dirty="0">
@@ -5754,17 +5211,9 @@
                 <a:ea typeface="JetBrains Mono" panose="02000009000000000000" pitchFamily="49" charset="0"/>
                 <a:cs typeface="JetBrains Mono" panose="02000009000000000000" pitchFamily="49" charset="0"/>
               </a:rPr>
-              <a:t>Java programming </a:t>
-            </a:r>
-            <a:r>
-              <a:rPr lang="en-US" dirty="0" smtClean="0">
-                <a:latin typeface="JetBrains Mono" panose="02000009000000000000" pitchFamily="49" charset="0"/>
-                <a:ea typeface="JetBrains Mono" panose="02000009000000000000" pitchFamily="49" charset="0"/>
-                <a:cs typeface="JetBrains Mono" panose="02000009000000000000" pitchFamily="49" charset="0"/>
-              </a:rPr>
-              <a:t>language</a:t>
-            </a:r>
-            <a:endParaRPr lang="en-IN" dirty="0" smtClean="0">
+              <a:t>The Java programming language</a:t>
+            </a:r>
+            <a:endParaRPr lang="en-IN" dirty="0">
               <a:latin typeface="JetBrains Mono" panose="02000009000000000000" pitchFamily="49" charset="0"/>
               <a:ea typeface="JetBrains Mono" panose="02000009000000000000" pitchFamily="49" charset="0"/>
               <a:cs typeface="JetBrains Mono" panose="02000009000000000000" pitchFamily="49" charset="0"/>
@@ -5780,7 +5229,7 @@
               </a:tabLst>
             </a:pPr>
             <a:r>
-              <a:rPr lang="en-US" dirty="0" smtClean="0">
+              <a:rPr lang="en-US" dirty="0">
                 <a:latin typeface="JetBrains Mono" panose="02000009000000000000" pitchFamily="49" charset="0"/>
                 <a:ea typeface="JetBrains Mono" panose="02000009000000000000" pitchFamily="49" charset="0"/>
                 <a:cs typeface="JetBrains Mono" panose="02000009000000000000" pitchFamily="49" charset="0"/>
@@ -5795,11 +5244,6 @@
               </a:rPr>
               <a:t> </a:t>
             </a:r>
-            <a:endParaRPr lang="en-IN" dirty="0" smtClean="0">
-              <a:latin typeface="JetBrains Mono" panose="02000009000000000000" pitchFamily="49" charset="0"/>
-              <a:ea typeface="JetBrains Mono" panose="02000009000000000000" pitchFamily="49" charset="0"/>
-              <a:cs typeface="JetBrains Mono" panose="02000009000000000000" pitchFamily="49" charset="0"/>
-            </a:endParaRPr>
           </a:p>
           <a:p>
             <a:pPr lvl="0" algn="just">
@@ -5816,23 +5260,7 @@
                 <a:ea typeface="JetBrains Mono" panose="02000009000000000000" pitchFamily="49" charset="0"/>
                 <a:cs typeface="JetBrains Mono" panose="02000009000000000000" pitchFamily="49" charset="0"/>
               </a:rPr>
-              <a:t> </a:t>
-            </a:r>
-            <a:r>
-              <a:rPr lang="en-IN" dirty="0" smtClean="0">
-                <a:latin typeface="JetBrains Mono" panose="02000009000000000000" pitchFamily="49" charset="0"/>
-                <a:ea typeface="JetBrains Mono" panose="02000009000000000000" pitchFamily="49" charset="0"/>
-                <a:cs typeface="JetBrains Mono" panose="02000009000000000000" pitchFamily="49" charset="0"/>
-              </a:rPr>
-              <a:t>- </a:t>
-            </a:r>
-            <a:r>
-              <a:rPr lang="en-US" dirty="0" smtClean="0">
-                <a:latin typeface="JetBrains Mono" panose="02000009000000000000" pitchFamily="49" charset="0"/>
-                <a:ea typeface="JetBrains Mono" panose="02000009000000000000" pitchFamily="49" charset="0"/>
-                <a:cs typeface="JetBrains Mono" panose="02000009000000000000" pitchFamily="49" charset="0"/>
-              </a:rPr>
-              <a:t>The </a:t>
+              <a:t> - </a:t>
             </a:r>
             <a:r>
               <a:rPr lang="en-US" dirty="0">
@@ -5840,17 +5268,9 @@
                 <a:ea typeface="JetBrains Mono" panose="02000009000000000000" pitchFamily="49" charset="0"/>
                 <a:cs typeface="JetBrains Mono" panose="02000009000000000000" pitchFamily="49" charset="0"/>
               </a:rPr>
-              <a:t>Java Application Programming </a:t>
-            </a:r>
-            <a:r>
-              <a:rPr lang="en-US" dirty="0" smtClean="0">
-                <a:latin typeface="JetBrains Mono" panose="02000009000000000000" pitchFamily="49" charset="0"/>
-                <a:ea typeface="JetBrains Mono" panose="02000009000000000000" pitchFamily="49" charset="0"/>
-                <a:cs typeface="JetBrains Mono" panose="02000009000000000000" pitchFamily="49" charset="0"/>
-              </a:rPr>
-              <a:t>Interface</a:t>
-            </a:r>
-            <a:endParaRPr lang="en-IN" dirty="0" smtClean="0">
+              <a:t>The Java Application Programming Interface</a:t>
+            </a:r>
+            <a:endParaRPr lang="en-IN" dirty="0">
               <a:latin typeface="JetBrains Mono" panose="02000009000000000000" pitchFamily="49" charset="0"/>
               <a:ea typeface="JetBrains Mono" panose="02000009000000000000" pitchFamily="49" charset="0"/>
               <a:cs typeface="JetBrains Mono" panose="02000009000000000000" pitchFamily="49" charset="0"/>
@@ -5871,23 +5291,7 @@
                 <a:ea typeface="JetBrains Mono" panose="02000009000000000000" pitchFamily="49" charset="0"/>
                 <a:cs typeface="JetBrains Mono" panose="02000009000000000000" pitchFamily="49" charset="0"/>
               </a:rPr>
-              <a:t> </a:t>
-            </a:r>
-            <a:r>
-              <a:rPr lang="en-IN" dirty="0" smtClean="0">
-                <a:latin typeface="JetBrains Mono" panose="02000009000000000000" pitchFamily="49" charset="0"/>
-                <a:ea typeface="JetBrains Mono" panose="02000009000000000000" pitchFamily="49" charset="0"/>
-                <a:cs typeface="JetBrains Mono" panose="02000009000000000000" pitchFamily="49" charset="0"/>
-              </a:rPr>
-              <a:t>- </a:t>
-            </a:r>
-            <a:r>
-              <a:rPr lang="en-US" dirty="0" smtClean="0">
-                <a:latin typeface="JetBrains Mono" panose="02000009000000000000" pitchFamily="49" charset="0"/>
-                <a:ea typeface="JetBrains Mono" panose="02000009000000000000" pitchFamily="49" charset="0"/>
-                <a:cs typeface="JetBrains Mono" panose="02000009000000000000" pitchFamily="49" charset="0"/>
-              </a:rPr>
-              <a:t>The </a:t>
+              <a:t> - </a:t>
             </a:r>
             <a:r>
               <a:rPr lang="en-US" dirty="0">
@@ -5895,7 +5299,7 @@
                 <a:ea typeface="JetBrains Mono" panose="02000009000000000000" pitchFamily="49" charset="0"/>
                 <a:cs typeface="JetBrains Mono" panose="02000009000000000000" pitchFamily="49" charset="0"/>
               </a:rPr>
-              <a:t>Java Virtual Machine</a:t>
+              <a:t>The Java Virtual Machine</a:t>
             </a:r>
             <a:endParaRPr lang="en-IN" dirty="0">
               <a:latin typeface="JetBrains Mono" panose="02000009000000000000" pitchFamily="49" charset="0"/>
@@ -6014,18 +5418,7 @@
                 <a:ea typeface="JetBrains Mono" panose="02000009000000000000" pitchFamily="49" charset="0"/>
                 <a:cs typeface="JetBrains Mono" panose="02000009000000000000" pitchFamily="49" charset="0"/>
               </a:rPr>
-              <a:t>p</a:t>
-            </a:r>
-            <a:r>
-              <a:rPr lang="en-GB" sz="1200" dirty="0" err="1" smtClean="0">
-                <a:solidFill>
-                  <a:srgbClr val="FF0000"/>
-                </a:solidFill>
-                <a:latin typeface="JetBrains Mono" panose="02000009000000000000" pitchFamily="49" charset="0"/>
-                <a:ea typeface="JetBrains Mono" panose="02000009000000000000" pitchFamily="49" charset="0"/>
-                <a:cs typeface="JetBrains Mono" panose="02000009000000000000" pitchFamily="49" charset="0"/>
-              </a:rPr>
-              <a:t>rogramming_heist_professor</a:t>
+              <a:t>programming_heist_professor</a:t>
             </a:r>
             <a:endParaRPr lang="en-IN" sz="1200" dirty="0">
               <a:solidFill>
@@ -6048,13 +5441,6 @@
   <p:clrMapOvr>
     <a:masterClrMapping/>
   </p:clrMapOvr>
-  <p:timing>
-    <p:tnLst>
-      <p:par>
-        <p:cTn id="1" dur="indefinite" restart="never" nodeType="tmRoot"/>
-      </p:par>
-    </p:tnLst>
-  </p:timing>
 </p:sld>
 </file>
 
@@ -6135,29 +5521,7 @@
                 <a:ea typeface="JetBrains Mono" panose="02000009000000000000" pitchFamily="49" charset="0"/>
                 <a:cs typeface="JetBrains Mono" panose="02000009000000000000" pitchFamily="49" charset="0"/>
               </a:rPr>
-              <a:t>Java </a:t>
-            </a:r>
-            <a:r>
-              <a:rPr lang="en-IN" sz="2400" dirty="0" smtClean="0">
-                <a:solidFill>
-                  <a:srgbClr val="FFC000"/>
-                </a:solidFill>
-                <a:latin typeface="JetBrains Mono" panose="02000009000000000000" pitchFamily="49" charset="0"/>
-                <a:ea typeface="JetBrains Mono" panose="02000009000000000000" pitchFamily="49" charset="0"/>
-                <a:cs typeface="JetBrains Mono" panose="02000009000000000000" pitchFamily="49" charset="0"/>
-              </a:rPr>
-              <a:t>Virtual Machine(JVM</a:t>
-            </a:r>
-            <a:r>
-              <a:rPr lang="en-IN" sz="2400" dirty="0">
-                <a:solidFill>
-                  <a:srgbClr val="FFC000"/>
-                </a:solidFill>
-                <a:latin typeface="JetBrains Mono" panose="02000009000000000000" pitchFamily="49" charset="0"/>
-                <a:ea typeface="JetBrains Mono" panose="02000009000000000000" pitchFamily="49" charset="0"/>
-                <a:cs typeface="JetBrains Mono" panose="02000009000000000000" pitchFamily="49" charset="0"/>
-              </a:rPr>
-              <a:t>)</a:t>
+              <a:t>Java Virtual Machine(JVM)</a:t>
             </a:r>
           </a:p>
         </p:txBody>
@@ -6221,7 +5585,7 @@
           <a:lstStyle/>
           <a:p>
             <a:r>
-              <a:rPr lang="en-IN" sz="2400" dirty="0" smtClean="0">
+              <a:rPr lang="en-IN" sz="2400" dirty="0">
                 <a:solidFill>
                   <a:srgbClr val="FFC000"/>
                 </a:solidFill>
@@ -6229,18 +5593,7 @@
                 <a:ea typeface="JetBrains Mono" panose="02000009000000000000" pitchFamily="49" charset="0"/>
                 <a:cs typeface="JetBrains Mono" panose="02000009000000000000" pitchFamily="49" charset="0"/>
               </a:rPr>
-              <a:t>Java </a:t>
-            </a:r>
-            <a:r>
-              <a:rPr lang="en-IN" sz="2400" dirty="0">
-                <a:solidFill>
-                  <a:srgbClr val="FFC000"/>
-                </a:solidFill>
-                <a:latin typeface="JetBrains Mono" panose="02000009000000000000" pitchFamily="49" charset="0"/>
-                <a:ea typeface="JetBrains Mono" panose="02000009000000000000" pitchFamily="49" charset="0"/>
-                <a:cs typeface="JetBrains Mono" panose="02000009000000000000" pitchFamily="49" charset="0"/>
-              </a:rPr>
-              <a:t>Runtime Environment (JRE)</a:t>
+              <a:t>Java Runtime Environment (JRE)</a:t>
             </a:r>
           </a:p>
         </p:txBody>
@@ -6404,18 +5757,7 @@
                 <a:ea typeface="JetBrains Mono" panose="02000009000000000000" pitchFamily="49" charset="0"/>
                 <a:cs typeface="JetBrains Mono" panose="02000009000000000000" pitchFamily="49" charset="0"/>
               </a:rPr>
-              <a:t>p</a:t>
-            </a:r>
-            <a:r>
-              <a:rPr lang="en-GB" sz="1200" dirty="0" err="1" smtClean="0">
-                <a:solidFill>
-                  <a:srgbClr val="FF0000"/>
-                </a:solidFill>
-                <a:latin typeface="JetBrains Mono" panose="02000009000000000000" pitchFamily="49" charset="0"/>
-                <a:ea typeface="JetBrains Mono" panose="02000009000000000000" pitchFamily="49" charset="0"/>
-                <a:cs typeface="JetBrains Mono" panose="02000009000000000000" pitchFamily="49" charset="0"/>
-              </a:rPr>
-              <a:t>rogramming_heist_professor</a:t>
+              <a:t>programming_heist_professor</a:t>
             </a:r>
             <a:endParaRPr lang="en-IN" sz="1200" dirty="0">
               <a:solidFill>
@@ -6438,785 +5780,6 @@
   <p:clrMapOvr>
     <a:masterClrMapping/>
   </p:clrMapOvr>
-  <p:timing>
-    <p:tnLst>
-      <p:par>
-        <p:cTn id="1" dur="indefinite" restart="never" nodeType="tmRoot"/>
-      </p:par>
-    </p:tnLst>
-  </p:timing>
-</p:sld>
-</file>
-
-<file path=ppt/slides/slide16.xml><?xml version="1.0" encoding="utf-8"?>
-<p:sld xmlns:a="http://schemas.openxmlformats.org/drawingml/2006/main" xmlns:r="http://schemas.openxmlformats.org/officeDocument/2006/relationships" xmlns:p="http://schemas.openxmlformats.org/presentationml/2006/main">
-  <p:cSld>
-    <p:spTree>
-      <p:nvGrpSpPr>
-        <p:cNvPr id="1" name=""/>
-        <p:cNvGrpSpPr/>
-        <p:nvPr/>
-      </p:nvGrpSpPr>
-      <p:grpSpPr>
-        <a:xfrm>
-          <a:off x="0" y="0"/>
-          <a:ext cx="0" cy="0"/>
-          <a:chOff x="0" y="0"/>
-          <a:chExt cx="0" cy="0"/>
-        </a:xfrm>
-      </p:grpSpPr>
-      <p:pic>
-        <p:nvPicPr>
-          <p:cNvPr id="2" name="Picture 1"/>
-          <p:cNvPicPr>
-            <a:picLocks noChangeAspect="1"/>
-          </p:cNvPicPr>
-          <p:nvPr/>
-        </p:nvPicPr>
-        <p:blipFill>
-          <a:blip r:embed="rId2">
-            <a:extLst>
-              <a:ext uri="{28A0092B-C50C-407E-A947-70E740481C1C}">
-                <a14:useLocalDpi xmlns:a14="http://schemas.microsoft.com/office/drawing/2010/main" val="0"/>
-              </a:ext>
-            </a:extLst>
-          </a:blip>
-          <a:stretch>
-            <a:fillRect/>
-          </a:stretch>
-        </p:blipFill>
-        <p:spPr>
-          <a:xfrm>
-            <a:off x="2497677" y="1467688"/>
-            <a:ext cx="6990566" cy="4588353"/>
-          </a:xfrm>
-          <a:prstGeom prst="rect">
-            <a:avLst/>
-          </a:prstGeom>
-        </p:spPr>
-      </p:pic>
-      <p:pic>
-        <p:nvPicPr>
-          <p:cNvPr id="3" name="Picture 2"/>
-          <p:cNvPicPr>
-            <a:picLocks noChangeAspect="1"/>
-          </p:cNvPicPr>
-          <p:nvPr/>
-        </p:nvPicPr>
-        <p:blipFill>
-          <a:blip r:embed="rId3">
-            <a:extLst>
-              <a:ext uri="{28A0092B-C50C-407E-A947-70E740481C1C}">
-                <a14:useLocalDpi xmlns:a14="http://schemas.microsoft.com/office/drawing/2010/main" val="0"/>
-              </a:ext>
-            </a:extLst>
-          </a:blip>
-          <a:stretch>
-            <a:fillRect/>
-          </a:stretch>
-        </p:blipFill>
-        <p:spPr>
-          <a:xfrm>
-            <a:off x="966398" y="1467523"/>
-            <a:ext cx="1524000" cy="1524000"/>
-          </a:xfrm>
-          <a:prstGeom prst="rect">
-            <a:avLst/>
-          </a:prstGeom>
-        </p:spPr>
-      </p:pic>
-      <p:sp>
-        <p:nvSpPr>
-          <p:cNvPr id="4" name="TextBox 3"/>
-          <p:cNvSpPr txBox="1"/>
-          <p:nvPr/>
-        </p:nvSpPr>
-        <p:spPr>
-          <a:xfrm>
-            <a:off x="9337639" y="6368527"/>
-            <a:ext cx="2694969" cy="276999"/>
-          </a:xfrm>
-          <a:prstGeom prst="rect">
-            <a:avLst/>
-          </a:prstGeom>
-          <a:noFill/>
-        </p:spPr>
-        <p:txBody>
-          <a:bodyPr wrap="none" rtlCol="0">
-            <a:spAutoFit/>
-          </a:bodyPr>
-          <a:lstStyle/>
-          <a:p>
-            <a:r>
-              <a:rPr lang="en-GB" sz="1200" dirty="0" err="1">
-                <a:solidFill>
-                  <a:srgbClr val="FF0000"/>
-                </a:solidFill>
-                <a:latin typeface="JetBrains Mono" panose="02000009000000000000" pitchFamily="49" charset="0"/>
-                <a:ea typeface="JetBrains Mono" panose="02000009000000000000" pitchFamily="49" charset="0"/>
-                <a:cs typeface="JetBrains Mono" panose="02000009000000000000" pitchFamily="49" charset="0"/>
-              </a:rPr>
-              <a:t>p</a:t>
-            </a:r>
-            <a:r>
-              <a:rPr lang="en-GB" sz="1200" dirty="0" err="1" smtClean="0">
-                <a:solidFill>
-                  <a:srgbClr val="FF0000"/>
-                </a:solidFill>
-                <a:latin typeface="JetBrains Mono" panose="02000009000000000000" pitchFamily="49" charset="0"/>
-                <a:ea typeface="JetBrains Mono" panose="02000009000000000000" pitchFamily="49" charset="0"/>
-                <a:cs typeface="JetBrains Mono" panose="02000009000000000000" pitchFamily="49" charset="0"/>
-              </a:rPr>
-              <a:t>rogramming_heist_professor</a:t>
-            </a:r>
-            <a:endParaRPr lang="en-IN" sz="1200" dirty="0">
-              <a:solidFill>
-                <a:srgbClr val="FF0000"/>
-              </a:solidFill>
-              <a:latin typeface="JetBrains Mono" panose="02000009000000000000" pitchFamily="49" charset="0"/>
-              <a:ea typeface="JetBrains Mono" panose="02000009000000000000" pitchFamily="49" charset="0"/>
-              <a:cs typeface="JetBrains Mono" panose="02000009000000000000" pitchFamily="49" charset="0"/>
-            </a:endParaRPr>
-          </a:p>
-        </p:txBody>
-      </p:sp>
-    </p:spTree>
-    <p:extLst>
-      <p:ext uri="{BB962C8B-B14F-4D97-AF65-F5344CB8AC3E}">
-        <p14:creationId xmlns:p14="http://schemas.microsoft.com/office/powerpoint/2010/main" val="1836845817"/>
-      </p:ext>
-    </p:extLst>
-  </p:cSld>
-  <p:clrMapOvr>
-    <a:masterClrMapping/>
-  </p:clrMapOvr>
-  <p:timing>
-    <p:tnLst>
-      <p:par>
-        <p:cTn id="1" dur="indefinite" restart="never" nodeType="tmRoot"/>
-      </p:par>
-    </p:tnLst>
-  </p:timing>
-</p:sld>
-</file>
-
-<file path=ppt/slides/slide17.xml><?xml version="1.0" encoding="utf-8"?>
-<p:sld xmlns:a="http://schemas.openxmlformats.org/drawingml/2006/main" xmlns:r="http://schemas.openxmlformats.org/officeDocument/2006/relationships" xmlns:p="http://schemas.openxmlformats.org/presentationml/2006/main">
-  <p:cSld>
-    <p:spTree>
-      <p:nvGrpSpPr>
-        <p:cNvPr id="1" name=""/>
-        <p:cNvGrpSpPr/>
-        <p:nvPr/>
-      </p:nvGrpSpPr>
-      <p:grpSpPr>
-        <a:xfrm>
-          <a:off x="0" y="0"/>
-          <a:ext cx="0" cy="0"/>
-          <a:chOff x="0" y="0"/>
-          <a:chExt cx="0" cy="0"/>
-        </a:xfrm>
-      </p:grpSpPr>
-      <p:sp>
-        <p:nvSpPr>
-          <p:cNvPr id="2" name="TextBox 1"/>
-          <p:cNvSpPr txBox="1"/>
-          <p:nvPr/>
-        </p:nvSpPr>
-        <p:spPr>
-          <a:xfrm>
-            <a:off x="849855" y="554019"/>
-            <a:ext cx="10359614" cy="5509200"/>
-          </a:xfrm>
-          <a:prstGeom prst="rect">
-            <a:avLst/>
-          </a:prstGeom>
-          <a:noFill/>
-        </p:spPr>
-        <p:txBody>
-          <a:bodyPr wrap="square" rtlCol="0">
-            <a:spAutoFit/>
-          </a:bodyPr>
-          <a:lstStyle/>
-          <a:p>
-            <a:r>
-              <a:rPr lang="en-GB" sz="8800" dirty="0" smtClean="0">
-                <a:solidFill>
-                  <a:srgbClr val="FFC000"/>
-                </a:solidFill>
-              </a:rPr>
-              <a:t>Three ways to learn a Technology.</a:t>
-            </a:r>
-          </a:p>
-          <a:p>
-            <a:endParaRPr lang="en-GB" sz="8800" dirty="0" smtClean="0">
-              <a:solidFill>
-                <a:srgbClr val="FFC000"/>
-              </a:solidFill>
-            </a:endParaRPr>
-          </a:p>
-          <a:p>
-            <a:r>
-              <a:rPr lang="en-GB" sz="8800" dirty="0" smtClean="0">
-                <a:solidFill>
-                  <a:srgbClr val="FFC000"/>
-                </a:solidFill>
-              </a:rPr>
-              <a:t>Choice is yours</a:t>
-            </a:r>
-            <a:endParaRPr lang="en-IN" sz="8800" dirty="0">
-              <a:solidFill>
-                <a:srgbClr val="FFC000"/>
-              </a:solidFill>
-            </a:endParaRPr>
-          </a:p>
-        </p:txBody>
-      </p:sp>
-      <p:sp>
-        <p:nvSpPr>
-          <p:cNvPr id="3" name="TextBox 2"/>
-          <p:cNvSpPr txBox="1"/>
-          <p:nvPr/>
-        </p:nvSpPr>
-        <p:spPr>
-          <a:xfrm>
-            <a:off x="9337639" y="6368527"/>
-            <a:ext cx="2694969" cy="276999"/>
-          </a:xfrm>
-          <a:prstGeom prst="rect">
-            <a:avLst/>
-          </a:prstGeom>
-          <a:noFill/>
-        </p:spPr>
-        <p:txBody>
-          <a:bodyPr wrap="none" rtlCol="0">
-            <a:spAutoFit/>
-          </a:bodyPr>
-          <a:lstStyle/>
-          <a:p>
-            <a:r>
-              <a:rPr lang="en-GB" sz="1200" dirty="0" err="1">
-                <a:solidFill>
-                  <a:srgbClr val="FF0000"/>
-                </a:solidFill>
-                <a:latin typeface="JetBrains Mono" panose="02000009000000000000" pitchFamily="49" charset="0"/>
-                <a:ea typeface="JetBrains Mono" panose="02000009000000000000" pitchFamily="49" charset="0"/>
-                <a:cs typeface="JetBrains Mono" panose="02000009000000000000" pitchFamily="49" charset="0"/>
-              </a:rPr>
-              <a:t>p</a:t>
-            </a:r>
-            <a:r>
-              <a:rPr lang="en-GB" sz="1200" dirty="0" err="1" smtClean="0">
-                <a:solidFill>
-                  <a:srgbClr val="FF0000"/>
-                </a:solidFill>
-                <a:latin typeface="JetBrains Mono" panose="02000009000000000000" pitchFamily="49" charset="0"/>
-                <a:ea typeface="JetBrains Mono" panose="02000009000000000000" pitchFamily="49" charset="0"/>
-                <a:cs typeface="JetBrains Mono" panose="02000009000000000000" pitchFamily="49" charset="0"/>
-              </a:rPr>
-              <a:t>rogramming_heist_professor</a:t>
-            </a:r>
-            <a:endParaRPr lang="en-IN" sz="1200" dirty="0">
-              <a:solidFill>
-                <a:srgbClr val="FF0000"/>
-              </a:solidFill>
-              <a:latin typeface="JetBrains Mono" panose="02000009000000000000" pitchFamily="49" charset="0"/>
-              <a:ea typeface="JetBrains Mono" panose="02000009000000000000" pitchFamily="49" charset="0"/>
-              <a:cs typeface="JetBrains Mono" panose="02000009000000000000" pitchFamily="49" charset="0"/>
-            </a:endParaRPr>
-          </a:p>
-        </p:txBody>
-      </p:sp>
-    </p:spTree>
-    <p:extLst>
-      <p:ext uri="{BB962C8B-B14F-4D97-AF65-F5344CB8AC3E}">
-        <p14:creationId xmlns:p14="http://schemas.microsoft.com/office/powerpoint/2010/main" val="341962335"/>
-      </p:ext>
-    </p:extLst>
-  </p:cSld>
-  <p:clrMapOvr>
-    <a:masterClrMapping/>
-  </p:clrMapOvr>
-  <p:timing>
-    <p:tnLst>
-      <p:par>
-        <p:cTn id="1" dur="indefinite" restart="never" nodeType="tmRoot"/>
-      </p:par>
-    </p:tnLst>
-  </p:timing>
-</p:sld>
-</file>
-
-<file path=ppt/slides/slide18.xml><?xml version="1.0" encoding="utf-8"?>
-<p:sld xmlns:a="http://schemas.openxmlformats.org/drawingml/2006/main" xmlns:r="http://schemas.openxmlformats.org/officeDocument/2006/relationships" xmlns:p="http://schemas.openxmlformats.org/presentationml/2006/main">
-  <p:cSld>
-    <p:spTree>
-      <p:nvGrpSpPr>
-        <p:cNvPr id="1" name=""/>
-        <p:cNvGrpSpPr/>
-        <p:nvPr/>
-      </p:nvGrpSpPr>
-      <p:grpSpPr>
-        <a:xfrm>
-          <a:off x="0" y="0"/>
-          <a:ext cx="0" cy="0"/>
-          <a:chOff x="0" y="0"/>
-          <a:chExt cx="0" cy="0"/>
-        </a:xfrm>
-      </p:grpSpPr>
-      <p:pic>
-        <p:nvPicPr>
-          <p:cNvPr id="2" name="Picture 1"/>
-          <p:cNvPicPr>
-            <a:picLocks noChangeAspect="1"/>
-          </p:cNvPicPr>
-          <p:nvPr/>
-        </p:nvPicPr>
-        <p:blipFill>
-          <a:blip r:embed="rId2">
-            <a:extLst>
-              <a:ext uri="{28A0092B-C50C-407E-A947-70E740481C1C}">
-                <a14:useLocalDpi xmlns:a14="http://schemas.microsoft.com/office/drawing/2010/main" val="0"/>
-              </a:ext>
-            </a:extLst>
-          </a:blip>
-          <a:stretch>
-            <a:fillRect/>
-          </a:stretch>
-        </p:blipFill>
-        <p:spPr>
-          <a:xfrm>
-            <a:off x="5314280" y="2475690"/>
-            <a:ext cx="4851699" cy="3396189"/>
-          </a:xfrm>
-          <a:prstGeom prst="rect">
-            <a:avLst/>
-          </a:prstGeom>
-        </p:spPr>
-      </p:pic>
-      <p:sp>
-        <p:nvSpPr>
-          <p:cNvPr id="3" name="TextBox 2"/>
-          <p:cNvSpPr txBox="1"/>
-          <p:nvPr/>
-        </p:nvSpPr>
-        <p:spPr>
-          <a:xfrm>
-            <a:off x="424928" y="242048"/>
-            <a:ext cx="11499924" cy="2246769"/>
-          </a:xfrm>
-          <a:prstGeom prst="rect">
-            <a:avLst/>
-          </a:prstGeom>
-          <a:noFill/>
-        </p:spPr>
-        <p:txBody>
-          <a:bodyPr wrap="square" rtlCol="0">
-            <a:spAutoFit/>
-          </a:bodyPr>
-          <a:lstStyle/>
-          <a:p>
-            <a:r>
-              <a:rPr lang="en-GB" sz="3200" dirty="0" smtClean="0">
-                <a:solidFill>
-                  <a:srgbClr val="FFC000"/>
-                </a:solidFill>
-                <a:latin typeface="JetBrains Mono" panose="02000009000000000000" pitchFamily="49" charset="0"/>
-                <a:ea typeface="JetBrains Mono" panose="02000009000000000000" pitchFamily="49" charset="0"/>
-                <a:cs typeface="JetBrains Mono" panose="02000009000000000000" pitchFamily="49" charset="0"/>
-              </a:rPr>
-              <a:t>1. Do this and that will be the output....</a:t>
-            </a:r>
-            <a:endParaRPr lang="en-GB" sz="3200" dirty="0">
-              <a:solidFill>
-                <a:srgbClr val="FFC000"/>
-              </a:solidFill>
-              <a:latin typeface="JetBrains Mono" panose="02000009000000000000" pitchFamily="49" charset="0"/>
-              <a:ea typeface="JetBrains Mono" panose="02000009000000000000" pitchFamily="49" charset="0"/>
-              <a:cs typeface="JetBrains Mono" panose="02000009000000000000" pitchFamily="49" charset="0"/>
-            </a:endParaRPr>
-          </a:p>
-          <a:p>
-            <a:endParaRPr lang="en-GB" dirty="0" smtClean="0">
-              <a:solidFill>
-                <a:srgbClr val="FFC000"/>
-              </a:solidFill>
-              <a:latin typeface="JetBrains Mono" panose="02000009000000000000" pitchFamily="49" charset="0"/>
-              <a:ea typeface="JetBrains Mono" panose="02000009000000000000" pitchFamily="49" charset="0"/>
-              <a:cs typeface="JetBrains Mono" panose="02000009000000000000" pitchFamily="49" charset="0"/>
-            </a:endParaRPr>
-          </a:p>
-          <a:p>
-            <a:r>
-              <a:rPr lang="en-GB" dirty="0" smtClean="0">
-                <a:solidFill>
-                  <a:schemeClr val="tx1">
-                    <a:lumMod val="85000"/>
-                  </a:schemeClr>
-                </a:solidFill>
-                <a:latin typeface="JetBrains Mono" panose="02000009000000000000" pitchFamily="49" charset="0"/>
-                <a:ea typeface="JetBrains Mono" panose="02000009000000000000" pitchFamily="49" charset="0"/>
-                <a:cs typeface="JetBrains Mono" panose="02000009000000000000" pitchFamily="49" charset="0"/>
-              </a:rPr>
-              <a:t>((( Don’t rest on this, move forward and learn to swim)))</a:t>
-            </a:r>
-          </a:p>
-          <a:p>
-            <a:endParaRPr lang="en-GB" dirty="0">
-              <a:solidFill>
-                <a:srgbClr val="FF0000"/>
-              </a:solidFill>
-              <a:latin typeface="JetBrains Mono" panose="02000009000000000000" pitchFamily="49" charset="0"/>
-              <a:ea typeface="JetBrains Mono" panose="02000009000000000000" pitchFamily="49" charset="0"/>
-              <a:cs typeface="JetBrains Mono" panose="02000009000000000000" pitchFamily="49" charset="0"/>
-            </a:endParaRPr>
-          </a:p>
-          <a:p>
-            <a:r>
-              <a:rPr lang="en-GB" dirty="0" smtClean="0">
-                <a:solidFill>
-                  <a:srgbClr val="FF0000"/>
-                </a:solidFill>
-                <a:latin typeface="JetBrains Mono" panose="02000009000000000000" pitchFamily="49" charset="0"/>
-                <a:ea typeface="JetBrains Mono" panose="02000009000000000000" pitchFamily="49" charset="0"/>
-                <a:cs typeface="JetBrains Mono" panose="02000009000000000000" pitchFamily="49" charset="0"/>
-              </a:rPr>
-              <a:t>TILL  DATE, INDIA DO NOT HAVE ANY PATENTED SOFTWARE!!!!!!!!!!</a:t>
-            </a:r>
-          </a:p>
-          <a:p>
-            <a:endParaRPr lang="en-GB" dirty="0">
-              <a:solidFill>
-                <a:srgbClr val="FFC000"/>
-              </a:solidFill>
-              <a:latin typeface="JetBrains Mono" panose="02000009000000000000" pitchFamily="49" charset="0"/>
-              <a:ea typeface="JetBrains Mono" panose="02000009000000000000" pitchFamily="49" charset="0"/>
-              <a:cs typeface="JetBrains Mono" panose="02000009000000000000" pitchFamily="49" charset="0"/>
-            </a:endParaRPr>
-          </a:p>
-          <a:p>
-            <a:endParaRPr lang="en-IN" dirty="0">
-              <a:solidFill>
-                <a:srgbClr val="FFC000"/>
-              </a:solidFill>
-              <a:latin typeface="JetBrains Mono" panose="02000009000000000000" pitchFamily="49" charset="0"/>
-              <a:ea typeface="JetBrains Mono" panose="02000009000000000000" pitchFamily="49" charset="0"/>
-              <a:cs typeface="JetBrains Mono" panose="02000009000000000000" pitchFamily="49" charset="0"/>
-            </a:endParaRPr>
-          </a:p>
-        </p:txBody>
-      </p:sp>
-      <p:pic>
-        <p:nvPicPr>
-          <p:cNvPr id="4" name="Picture 3"/>
-          <p:cNvPicPr>
-            <a:picLocks noChangeAspect="1"/>
-          </p:cNvPicPr>
-          <p:nvPr/>
-        </p:nvPicPr>
-        <p:blipFill>
-          <a:blip r:embed="rId3">
-            <a:extLst>
-              <a:ext uri="{28A0092B-C50C-407E-A947-70E740481C1C}">
-                <a14:useLocalDpi xmlns:a14="http://schemas.microsoft.com/office/drawing/2010/main" val="0"/>
-              </a:ext>
-            </a:extLst>
-          </a:blip>
-          <a:stretch>
-            <a:fillRect/>
-          </a:stretch>
-        </p:blipFill>
-        <p:spPr>
-          <a:xfrm>
-            <a:off x="1027515" y="3171877"/>
-            <a:ext cx="3482429" cy="1330198"/>
-          </a:xfrm>
-          <a:prstGeom prst="rect">
-            <a:avLst/>
-          </a:prstGeom>
-        </p:spPr>
-      </p:pic>
-      <p:sp>
-        <p:nvSpPr>
-          <p:cNvPr id="5" name="TextBox 4"/>
-          <p:cNvSpPr txBox="1"/>
-          <p:nvPr/>
-        </p:nvSpPr>
-        <p:spPr>
-          <a:xfrm>
-            <a:off x="9337639" y="6368527"/>
-            <a:ext cx="2694969" cy="276999"/>
-          </a:xfrm>
-          <a:prstGeom prst="rect">
-            <a:avLst/>
-          </a:prstGeom>
-          <a:noFill/>
-        </p:spPr>
-        <p:txBody>
-          <a:bodyPr wrap="none" rtlCol="0">
-            <a:spAutoFit/>
-          </a:bodyPr>
-          <a:lstStyle/>
-          <a:p>
-            <a:r>
-              <a:rPr lang="en-GB" sz="1200" dirty="0" err="1">
-                <a:solidFill>
-                  <a:srgbClr val="FF0000"/>
-                </a:solidFill>
-                <a:latin typeface="JetBrains Mono" panose="02000009000000000000" pitchFamily="49" charset="0"/>
-                <a:ea typeface="JetBrains Mono" panose="02000009000000000000" pitchFamily="49" charset="0"/>
-                <a:cs typeface="JetBrains Mono" panose="02000009000000000000" pitchFamily="49" charset="0"/>
-              </a:rPr>
-              <a:t>p</a:t>
-            </a:r>
-            <a:r>
-              <a:rPr lang="en-GB" sz="1200" dirty="0" err="1" smtClean="0">
-                <a:solidFill>
-                  <a:srgbClr val="FF0000"/>
-                </a:solidFill>
-                <a:latin typeface="JetBrains Mono" panose="02000009000000000000" pitchFamily="49" charset="0"/>
-                <a:ea typeface="JetBrains Mono" panose="02000009000000000000" pitchFamily="49" charset="0"/>
-                <a:cs typeface="JetBrains Mono" panose="02000009000000000000" pitchFamily="49" charset="0"/>
-              </a:rPr>
-              <a:t>rogramming_heist_professor</a:t>
-            </a:r>
-            <a:endParaRPr lang="en-IN" sz="1200" dirty="0">
-              <a:solidFill>
-                <a:srgbClr val="FF0000"/>
-              </a:solidFill>
-              <a:latin typeface="JetBrains Mono" panose="02000009000000000000" pitchFamily="49" charset="0"/>
-              <a:ea typeface="JetBrains Mono" panose="02000009000000000000" pitchFamily="49" charset="0"/>
-              <a:cs typeface="JetBrains Mono" panose="02000009000000000000" pitchFamily="49" charset="0"/>
-            </a:endParaRPr>
-          </a:p>
-        </p:txBody>
-      </p:sp>
-    </p:spTree>
-    <p:extLst>
-      <p:ext uri="{BB962C8B-B14F-4D97-AF65-F5344CB8AC3E}">
-        <p14:creationId xmlns:p14="http://schemas.microsoft.com/office/powerpoint/2010/main" val="1562242273"/>
-      </p:ext>
-    </p:extLst>
-  </p:cSld>
-  <p:clrMapOvr>
-    <a:masterClrMapping/>
-  </p:clrMapOvr>
-  <p:timing>
-    <p:tnLst>
-      <p:par>
-        <p:cTn id="1" dur="indefinite" restart="never" nodeType="tmRoot"/>
-      </p:par>
-    </p:tnLst>
-  </p:timing>
-</p:sld>
-</file>
-
-<file path=ppt/slides/slide19.xml><?xml version="1.0" encoding="utf-8"?>
-<p:sld xmlns:a="http://schemas.openxmlformats.org/drawingml/2006/main" xmlns:r="http://schemas.openxmlformats.org/officeDocument/2006/relationships" xmlns:p="http://schemas.openxmlformats.org/presentationml/2006/main">
-  <p:cSld>
-    <p:spTree>
-      <p:nvGrpSpPr>
-        <p:cNvPr id="1" name=""/>
-        <p:cNvGrpSpPr/>
-        <p:nvPr/>
-      </p:nvGrpSpPr>
-      <p:grpSpPr>
-        <a:xfrm>
-          <a:off x="0" y="0"/>
-          <a:ext cx="0" cy="0"/>
-          <a:chOff x="0" y="0"/>
-          <a:chExt cx="0" cy="0"/>
-        </a:xfrm>
-      </p:grpSpPr>
-      <p:pic>
-        <p:nvPicPr>
-          <p:cNvPr id="2" name="Picture 1"/>
-          <p:cNvPicPr>
-            <a:picLocks noChangeAspect="1"/>
-          </p:cNvPicPr>
-          <p:nvPr/>
-        </p:nvPicPr>
-        <p:blipFill>
-          <a:blip r:embed="rId2" cstate="print">
-            <a:extLst>
-              <a:ext uri="{28A0092B-C50C-407E-A947-70E740481C1C}">
-                <a14:useLocalDpi xmlns:a14="http://schemas.microsoft.com/office/drawing/2010/main" val="0"/>
-              </a:ext>
-            </a:extLst>
-          </a:blip>
-          <a:stretch>
-            <a:fillRect/>
-          </a:stretch>
-        </p:blipFill>
-        <p:spPr>
-          <a:xfrm>
-            <a:off x="2269865" y="1828800"/>
-            <a:ext cx="6852621" cy="3854599"/>
-          </a:xfrm>
-          <a:prstGeom prst="rect">
-            <a:avLst/>
-          </a:prstGeom>
-        </p:spPr>
-      </p:pic>
-      <p:sp>
-        <p:nvSpPr>
-          <p:cNvPr id="3" name="Rectangle 2"/>
-          <p:cNvSpPr/>
-          <p:nvPr/>
-        </p:nvSpPr>
-        <p:spPr>
-          <a:xfrm>
-            <a:off x="430423" y="291360"/>
-            <a:ext cx="9396688" cy="584775"/>
-          </a:xfrm>
-          <a:prstGeom prst="rect">
-            <a:avLst/>
-          </a:prstGeom>
-        </p:spPr>
-        <p:txBody>
-          <a:bodyPr wrap="square">
-            <a:spAutoFit/>
-          </a:bodyPr>
-          <a:lstStyle/>
-          <a:p>
-            <a:r>
-              <a:rPr lang="en-GB" sz="3200" dirty="0" smtClean="0">
-                <a:solidFill>
-                  <a:srgbClr val="FFC000"/>
-                </a:solidFill>
-                <a:latin typeface="JetBrains Mono" panose="02000009000000000000" pitchFamily="49" charset="0"/>
-                <a:ea typeface="JetBrains Mono" panose="02000009000000000000" pitchFamily="49" charset="0"/>
-                <a:cs typeface="JetBrains Mono" panose="02000009000000000000" pitchFamily="49" charset="0"/>
-              </a:rPr>
-              <a:t>2.Jump </a:t>
-            </a:r>
-            <a:r>
-              <a:rPr lang="en-GB" sz="3200" dirty="0">
-                <a:solidFill>
-                  <a:srgbClr val="FFC000"/>
-                </a:solidFill>
-                <a:latin typeface="JetBrains Mono" panose="02000009000000000000" pitchFamily="49" charset="0"/>
-                <a:ea typeface="JetBrains Mono" panose="02000009000000000000" pitchFamily="49" charset="0"/>
-                <a:cs typeface="JetBrains Mono" panose="02000009000000000000" pitchFamily="49" charset="0"/>
-              </a:rPr>
-              <a:t>in </a:t>
-            </a:r>
-            <a:r>
-              <a:rPr lang="en-GB" sz="3200">
-                <a:solidFill>
-                  <a:srgbClr val="FFC000"/>
-                </a:solidFill>
-                <a:latin typeface="JetBrains Mono" panose="02000009000000000000" pitchFamily="49" charset="0"/>
-                <a:ea typeface="JetBrains Mono" panose="02000009000000000000" pitchFamily="49" charset="0"/>
-                <a:cs typeface="JetBrains Mono" panose="02000009000000000000" pitchFamily="49" charset="0"/>
-              </a:rPr>
-              <a:t>and </a:t>
-            </a:r>
-            <a:r>
-              <a:rPr lang="en-GB" sz="3200" smtClean="0">
-                <a:solidFill>
-                  <a:srgbClr val="FFC000"/>
-                </a:solidFill>
-                <a:latin typeface="JetBrains Mono" panose="02000009000000000000" pitchFamily="49" charset="0"/>
-                <a:ea typeface="JetBrains Mono" panose="02000009000000000000" pitchFamily="49" charset="0"/>
-                <a:cs typeface="JetBrains Mono" panose="02000009000000000000" pitchFamily="49" charset="0"/>
-              </a:rPr>
-              <a:t>loose </a:t>
-            </a:r>
-            <a:r>
-              <a:rPr lang="en-GB" sz="3200" dirty="0">
-                <a:solidFill>
-                  <a:srgbClr val="FFC000"/>
-                </a:solidFill>
-                <a:latin typeface="JetBrains Mono" panose="02000009000000000000" pitchFamily="49" charset="0"/>
-                <a:ea typeface="JetBrains Mono" panose="02000009000000000000" pitchFamily="49" charset="0"/>
-                <a:cs typeface="JetBrains Mono" panose="02000009000000000000" pitchFamily="49" charset="0"/>
-              </a:rPr>
-              <a:t>yourself.</a:t>
-            </a:r>
-            <a:endParaRPr lang="en-IN" sz="3200" dirty="0">
-              <a:solidFill>
-                <a:srgbClr val="FFC000"/>
-              </a:solidFill>
-              <a:latin typeface="JetBrains Mono" panose="02000009000000000000" pitchFamily="49" charset="0"/>
-              <a:ea typeface="JetBrains Mono" panose="02000009000000000000" pitchFamily="49" charset="0"/>
-              <a:cs typeface="JetBrains Mono" panose="02000009000000000000" pitchFamily="49" charset="0"/>
-            </a:endParaRPr>
-          </a:p>
-        </p:txBody>
-      </p:sp>
-      <p:sp>
-        <p:nvSpPr>
-          <p:cNvPr id="4" name="TextBox 3"/>
-          <p:cNvSpPr txBox="1"/>
-          <p:nvPr/>
-        </p:nvSpPr>
-        <p:spPr>
-          <a:xfrm>
-            <a:off x="9337639" y="6368527"/>
-            <a:ext cx="2694969" cy="276999"/>
-          </a:xfrm>
-          <a:prstGeom prst="rect">
-            <a:avLst/>
-          </a:prstGeom>
-          <a:noFill/>
-        </p:spPr>
-        <p:txBody>
-          <a:bodyPr wrap="none" rtlCol="0">
-            <a:spAutoFit/>
-          </a:bodyPr>
-          <a:lstStyle/>
-          <a:p>
-            <a:r>
-              <a:rPr lang="en-GB" sz="1200" dirty="0" err="1">
-                <a:solidFill>
-                  <a:srgbClr val="FF0000"/>
-                </a:solidFill>
-                <a:latin typeface="JetBrains Mono" panose="02000009000000000000" pitchFamily="49" charset="0"/>
-                <a:ea typeface="JetBrains Mono" panose="02000009000000000000" pitchFamily="49" charset="0"/>
-                <a:cs typeface="JetBrains Mono" panose="02000009000000000000" pitchFamily="49" charset="0"/>
-              </a:rPr>
-              <a:t>p</a:t>
-            </a:r>
-            <a:r>
-              <a:rPr lang="en-GB" sz="1200" dirty="0" err="1" smtClean="0">
-                <a:solidFill>
-                  <a:srgbClr val="FF0000"/>
-                </a:solidFill>
-                <a:latin typeface="JetBrains Mono" panose="02000009000000000000" pitchFamily="49" charset="0"/>
-                <a:ea typeface="JetBrains Mono" panose="02000009000000000000" pitchFamily="49" charset="0"/>
-                <a:cs typeface="JetBrains Mono" panose="02000009000000000000" pitchFamily="49" charset="0"/>
-              </a:rPr>
-              <a:t>rogramming_heist_professor</a:t>
-            </a:r>
-            <a:endParaRPr lang="en-IN" sz="1200" dirty="0">
-              <a:solidFill>
-                <a:srgbClr val="FF0000"/>
-              </a:solidFill>
-              <a:latin typeface="JetBrains Mono" panose="02000009000000000000" pitchFamily="49" charset="0"/>
-              <a:ea typeface="JetBrains Mono" panose="02000009000000000000" pitchFamily="49" charset="0"/>
-              <a:cs typeface="JetBrains Mono" panose="02000009000000000000" pitchFamily="49" charset="0"/>
-            </a:endParaRPr>
-          </a:p>
-        </p:txBody>
-      </p:sp>
-    </p:spTree>
-    <p:extLst>
-      <p:ext uri="{BB962C8B-B14F-4D97-AF65-F5344CB8AC3E}">
-        <p14:creationId xmlns:p14="http://schemas.microsoft.com/office/powerpoint/2010/main" val="2357424393"/>
-      </p:ext>
-    </p:extLst>
-  </p:cSld>
-  <p:clrMapOvr>
-    <a:masterClrMapping/>
-  </p:clrMapOvr>
-  <p:timing>
-    <p:tnLst>
-      <p:par>
-        <p:cTn id="1" dur="indefinite" restart="never" nodeType="tmRoot"/>
-      </p:par>
-    </p:tnLst>
-  </p:timing>
 </p:sld>
 </file>
 
@@ -7330,83 +5893,25 @@
                 <a:ea typeface="JetBrains Mono" panose="02000009000000000000" pitchFamily="49" charset="0"/>
                 <a:cs typeface="JetBrains Mono" panose="02000009000000000000" pitchFamily="49" charset="0"/>
               </a:rPr>
-              <a:t>can be used to produce highly </a:t>
-            </a:r>
-            <a:r>
-              <a:rPr lang="en-IN" dirty="0" smtClean="0">
-                <a:latin typeface="JetBrains Mono" panose="02000009000000000000" pitchFamily="49" charset="0"/>
-                <a:ea typeface="JetBrains Mono" panose="02000009000000000000" pitchFamily="49" charset="0"/>
-                <a:cs typeface="JetBrains Mono" panose="02000009000000000000" pitchFamily="49" charset="0"/>
-              </a:rPr>
-              <a:t>efficient programs</a:t>
-            </a:r>
-            <a:r>
-              <a:rPr lang="en-IN" dirty="0">
-                <a:latin typeface="JetBrains Mono" panose="02000009000000000000" pitchFamily="49" charset="0"/>
-                <a:ea typeface="JetBrains Mono" panose="02000009000000000000" pitchFamily="49" charset="0"/>
-                <a:cs typeface="JetBrains Mono" panose="02000009000000000000" pitchFamily="49" charset="0"/>
-              </a:rPr>
-              <a:t>, but it is not easy to learn or use effectively. </a:t>
-            </a:r>
-            <a:endParaRPr lang="en-IN" dirty="0" smtClean="0">
-              <a:latin typeface="JetBrains Mono" panose="02000009000000000000" pitchFamily="49" charset="0"/>
-              <a:ea typeface="JetBrains Mono" panose="02000009000000000000" pitchFamily="49" charset="0"/>
-              <a:cs typeface="JetBrains Mono" panose="02000009000000000000" pitchFamily="49" charset="0"/>
-            </a:endParaRPr>
-          </a:p>
-          <a:p>
-            <a:endParaRPr lang="en-IN" dirty="0" smtClean="0">
-              <a:latin typeface="JetBrains Mono" panose="02000009000000000000" pitchFamily="49" charset="0"/>
-              <a:ea typeface="JetBrains Mono" panose="02000009000000000000" pitchFamily="49" charset="0"/>
-              <a:cs typeface="JetBrains Mono" panose="02000009000000000000" pitchFamily="49" charset="0"/>
-            </a:endParaRPr>
-          </a:p>
-          <a:p>
-            <a:r>
-              <a:rPr lang="en-IN" dirty="0" smtClean="0">
-                <a:latin typeface="JetBrains Mono" panose="02000009000000000000" pitchFamily="49" charset="0"/>
-                <a:ea typeface="JetBrains Mono" panose="02000009000000000000" pitchFamily="49" charset="0"/>
-                <a:cs typeface="JetBrains Mono" panose="02000009000000000000" pitchFamily="49" charset="0"/>
-              </a:rPr>
-              <a:t>Further</a:t>
-            </a:r>
-            <a:r>
-              <a:rPr lang="en-IN" dirty="0">
-                <a:latin typeface="JetBrains Mono" panose="02000009000000000000" pitchFamily="49" charset="0"/>
-                <a:ea typeface="JetBrains Mono" panose="02000009000000000000" pitchFamily="49" charset="0"/>
-                <a:cs typeface="JetBrains Mono" panose="02000009000000000000" pitchFamily="49" charset="0"/>
-              </a:rPr>
-              <a:t>, </a:t>
-            </a:r>
-            <a:r>
-              <a:rPr lang="en-IN" dirty="0" smtClean="0">
-                <a:latin typeface="JetBrains Mono" panose="02000009000000000000" pitchFamily="49" charset="0"/>
-                <a:ea typeface="JetBrains Mono" panose="02000009000000000000" pitchFamily="49" charset="0"/>
-                <a:cs typeface="JetBrains Mono" panose="02000009000000000000" pitchFamily="49" charset="0"/>
-              </a:rPr>
-              <a:t>debugging assembly </a:t>
-            </a:r>
-            <a:r>
-              <a:rPr lang="en-IN" dirty="0">
-                <a:latin typeface="JetBrains Mono" panose="02000009000000000000" pitchFamily="49" charset="0"/>
-                <a:ea typeface="JetBrains Mono" panose="02000009000000000000" pitchFamily="49" charset="0"/>
-                <a:cs typeface="JetBrains Mono" panose="02000009000000000000" pitchFamily="49" charset="0"/>
-              </a:rPr>
-              <a:t>code can be quite difficult</a:t>
-            </a:r>
-            <a:r>
-              <a:rPr lang="en-IN" dirty="0" smtClean="0">
-                <a:latin typeface="JetBrains Mono" panose="02000009000000000000" pitchFamily="49" charset="0"/>
-                <a:ea typeface="JetBrains Mono" panose="02000009000000000000" pitchFamily="49" charset="0"/>
-                <a:cs typeface="JetBrains Mono" panose="02000009000000000000" pitchFamily="49" charset="0"/>
-              </a:rPr>
-              <a:t>.</a:t>
-            </a:r>
+              <a:t>can be used to produce highly efficient programs, but it is not easy to learn or use effectively. </a:t>
+            </a:r>
+          </a:p>
+          <a:p>
             <a:endParaRPr lang="en-IN" dirty="0">
               <a:latin typeface="JetBrains Mono" panose="02000009000000000000" pitchFamily="49" charset="0"/>
               <a:ea typeface="JetBrains Mono" panose="02000009000000000000" pitchFamily="49" charset="0"/>
               <a:cs typeface="JetBrains Mono" panose="02000009000000000000" pitchFamily="49" charset="0"/>
             </a:endParaRPr>
+          </a:p>
+          <a:p>
+            <a:r>
+              <a:rPr lang="en-IN" dirty="0">
+                <a:latin typeface="JetBrains Mono" panose="02000009000000000000" pitchFamily="49" charset="0"/>
+                <a:ea typeface="JetBrains Mono" panose="02000009000000000000" pitchFamily="49" charset="0"/>
+                <a:cs typeface="JetBrains Mono" panose="02000009000000000000" pitchFamily="49" charset="0"/>
+              </a:rPr>
+              <a:t>Further, debugging assembly code can be quite difficult.</a:t>
+            </a:r>
           </a:p>
         </p:txBody>
       </p:sp>
@@ -7651,61 +6156,6 @@
               </a:rPr>
               <a:t>}</a:t>
             </a:r>
-          </a:p>
-        </p:txBody>
-      </p:sp>
-      <p:sp>
-        <p:nvSpPr>
-          <p:cNvPr id="8" name="TextBox 7"/>
-          <p:cNvSpPr txBox="1"/>
-          <p:nvPr/>
-        </p:nvSpPr>
-        <p:spPr>
-          <a:xfrm>
-            <a:off x="9337639" y="6368527"/>
-            <a:ext cx="2694969" cy="276999"/>
-          </a:xfrm>
-          <a:prstGeom prst="rect">
-            <a:avLst/>
-          </a:prstGeom>
-          <a:noFill/>
-        </p:spPr>
-        <p:txBody>
-          <a:bodyPr wrap="none" rtlCol="0">
-            <a:spAutoFit/>
-          </a:bodyPr>
-          <a:lstStyle/>
-          <a:p>
-            <a:r>
-              <a:rPr lang="en-GB" sz="1200" dirty="0" err="1">
-                <a:solidFill>
-                  <a:srgbClr val="FF0000"/>
-                </a:solidFill>
-                <a:latin typeface="JetBrains Mono" panose="02000009000000000000" pitchFamily="49" charset="0"/>
-                <a:ea typeface="JetBrains Mono" panose="02000009000000000000" pitchFamily="49" charset="0"/>
-                <a:cs typeface="JetBrains Mono" panose="02000009000000000000" pitchFamily="49" charset="0"/>
-              </a:rPr>
-              <a:t>p</a:t>
-            </a:r>
-            <a:r>
-              <a:rPr lang="en-GB" sz="1200" dirty="0" err="1" smtClean="0">
-                <a:solidFill>
-                  <a:srgbClr val="FF0000"/>
-                </a:solidFill>
-                <a:latin typeface="JetBrains Mono" panose="02000009000000000000" pitchFamily="49" charset="0"/>
-                <a:ea typeface="JetBrains Mono" panose="02000009000000000000" pitchFamily="49" charset="0"/>
-                <a:cs typeface="JetBrains Mono" panose="02000009000000000000" pitchFamily="49" charset="0"/>
-              </a:rPr>
-              <a:t>rogramming_heist_professor</a:t>
-            </a:r>
-            <a:endParaRPr lang="en-IN" sz="1200" dirty="0">
-              <a:solidFill>
-                <a:srgbClr val="FF0000"/>
-              </a:solidFill>
-              <a:latin typeface="JetBrains Mono" panose="02000009000000000000" pitchFamily="49" charset="0"/>
-              <a:ea typeface="JetBrains Mono" panose="02000009000000000000" pitchFamily="49" charset="0"/>
-              <a:cs typeface="JetBrains Mono" panose="02000009000000000000" pitchFamily="49" charset="0"/>
-            </a:endParaRPr>
           </a:p>
         </p:txBody>
       </p:sp>
@@ -7892,225 +6342,6 @@
 </p:sld>
 </file>
 
-<file path=ppt/slides/slide20.xml><?xml version="1.0" encoding="utf-8"?>
-<p:sld xmlns:a="http://schemas.openxmlformats.org/drawingml/2006/main" xmlns:r="http://schemas.openxmlformats.org/officeDocument/2006/relationships" xmlns:p="http://schemas.openxmlformats.org/presentationml/2006/main">
-  <p:cSld>
-    <p:spTree>
-      <p:nvGrpSpPr>
-        <p:cNvPr id="1" name=""/>
-        <p:cNvGrpSpPr/>
-        <p:nvPr/>
-      </p:nvGrpSpPr>
-      <p:grpSpPr>
-        <a:xfrm>
-          <a:off x="0" y="0"/>
-          <a:ext cx="0" cy="0"/>
-          <a:chOff x="0" y="0"/>
-          <a:chExt cx="0" cy="0"/>
-        </a:xfrm>
-      </p:grpSpPr>
-      <p:pic>
-        <p:nvPicPr>
-          <p:cNvPr id="3" name="Picture 2"/>
-          <p:cNvPicPr>
-            <a:picLocks noChangeAspect="1"/>
-          </p:cNvPicPr>
-          <p:nvPr/>
-        </p:nvPicPr>
-        <p:blipFill>
-          <a:blip r:embed="rId2" cstate="print">
-            <a:extLst>
-              <a:ext uri="{28A0092B-C50C-407E-A947-70E740481C1C}">
-                <a14:useLocalDpi xmlns:a14="http://schemas.microsoft.com/office/drawing/2010/main" val="0"/>
-              </a:ext>
-            </a:extLst>
-          </a:blip>
-          <a:stretch>
-            <a:fillRect/>
-          </a:stretch>
-        </p:blipFill>
-        <p:spPr>
-          <a:xfrm>
-            <a:off x="2339791" y="1691640"/>
-            <a:ext cx="6009940" cy="3380591"/>
-          </a:xfrm>
-          <a:prstGeom prst="rect">
-            <a:avLst/>
-          </a:prstGeom>
-        </p:spPr>
-      </p:pic>
-      <p:sp>
-        <p:nvSpPr>
-          <p:cNvPr id="4" name="Rectangle 3"/>
-          <p:cNvSpPr/>
-          <p:nvPr/>
-        </p:nvSpPr>
-        <p:spPr>
-          <a:xfrm>
-            <a:off x="245632" y="233543"/>
-            <a:ext cx="11603916" cy="1077218"/>
-          </a:xfrm>
-          <a:prstGeom prst="rect">
-            <a:avLst/>
-          </a:prstGeom>
-        </p:spPr>
-        <p:txBody>
-          <a:bodyPr wrap="square">
-            <a:spAutoFit/>
-          </a:bodyPr>
-          <a:lstStyle/>
-          <a:p>
-            <a:r>
-              <a:rPr lang="en-GB" sz="3200" dirty="0" smtClean="0">
-                <a:solidFill>
-                  <a:srgbClr val="FFC000"/>
-                </a:solidFill>
-                <a:latin typeface="JetBrains Mono Light" panose="02000009000000000000" pitchFamily="49" charset="0"/>
-                <a:ea typeface="JetBrains Mono Light" panose="02000009000000000000" pitchFamily="49" charset="0"/>
-                <a:cs typeface="JetBrains Mono Light" panose="02000009000000000000" pitchFamily="49" charset="0"/>
-              </a:rPr>
-              <a:t>3.When </a:t>
-            </a:r>
-            <a:r>
-              <a:rPr lang="en-GB" sz="3200" dirty="0">
-                <a:solidFill>
-                  <a:srgbClr val="FFC000"/>
-                </a:solidFill>
-                <a:latin typeface="JetBrains Mono Light" panose="02000009000000000000" pitchFamily="49" charset="0"/>
-                <a:ea typeface="JetBrains Mono Light" panose="02000009000000000000" pitchFamily="49" charset="0"/>
-                <a:cs typeface="JetBrains Mono Light" panose="02000009000000000000" pitchFamily="49" charset="0"/>
-              </a:rPr>
-              <a:t>you want something, all the universe conspires in helping you to achieve it.</a:t>
-            </a:r>
-            <a:endParaRPr lang="en-IN" sz="3200" dirty="0">
-              <a:solidFill>
-                <a:srgbClr val="FFC000"/>
-              </a:solidFill>
-              <a:latin typeface="JetBrains Mono Light" panose="02000009000000000000" pitchFamily="49" charset="0"/>
-              <a:ea typeface="JetBrains Mono Light" panose="02000009000000000000" pitchFamily="49" charset="0"/>
-              <a:cs typeface="JetBrains Mono Light" panose="02000009000000000000" pitchFamily="49" charset="0"/>
-            </a:endParaRPr>
-          </a:p>
-        </p:txBody>
-      </p:sp>
-      <p:sp>
-        <p:nvSpPr>
-          <p:cNvPr id="5" name="Rectangle 4"/>
-          <p:cNvSpPr/>
-          <p:nvPr/>
-        </p:nvSpPr>
-        <p:spPr>
-          <a:xfrm>
-            <a:off x="215154" y="5278880"/>
-            <a:ext cx="11672046" cy="830997"/>
-          </a:xfrm>
-          <a:prstGeom prst="rect">
-            <a:avLst/>
-          </a:prstGeom>
-        </p:spPr>
-        <p:txBody>
-          <a:bodyPr wrap="square">
-            <a:spAutoFit/>
-          </a:bodyPr>
-          <a:lstStyle/>
-          <a:p>
-            <a:r>
-              <a:rPr lang="en-GB" sz="2400" dirty="0">
-                <a:solidFill>
-                  <a:srgbClr val="FFC000"/>
-                </a:solidFill>
-                <a:latin typeface="JetBrains Mono Light" panose="02000009000000000000" pitchFamily="49" charset="0"/>
-                <a:ea typeface="JetBrains Mono Light" panose="02000009000000000000" pitchFamily="49" charset="0"/>
-                <a:cs typeface="JetBrains Mono Light" panose="02000009000000000000" pitchFamily="49" charset="0"/>
-              </a:rPr>
-              <a:t>People are capable, at any time in their lives, of doing what they dream of.</a:t>
-            </a:r>
-            <a:endParaRPr lang="en-IN" sz="2400" dirty="0">
-              <a:solidFill>
-                <a:srgbClr val="FFC000"/>
-              </a:solidFill>
-              <a:latin typeface="JetBrains Mono Light" panose="02000009000000000000" pitchFamily="49" charset="0"/>
-              <a:ea typeface="JetBrains Mono Light" panose="02000009000000000000" pitchFamily="49" charset="0"/>
-              <a:cs typeface="JetBrains Mono Light" panose="02000009000000000000" pitchFamily="49" charset="0"/>
-            </a:endParaRPr>
-          </a:p>
-        </p:txBody>
-      </p:sp>
-      <p:sp>
-        <p:nvSpPr>
-          <p:cNvPr id="6" name="TextBox 5"/>
-          <p:cNvSpPr txBox="1"/>
-          <p:nvPr/>
-        </p:nvSpPr>
-        <p:spPr>
-          <a:xfrm>
-            <a:off x="9337639" y="6368527"/>
-            <a:ext cx="2694969" cy="276999"/>
-          </a:xfrm>
-          <a:prstGeom prst="rect">
-            <a:avLst/>
-          </a:prstGeom>
-          <a:noFill/>
-        </p:spPr>
-        <p:txBody>
-          <a:bodyPr wrap="none" rtlCol="0">
-            <a:spAutoFit/>
-          </a:bodyPr>
-          <a:lstStyle/>
-          <a:p>
-            <a:r>
-              <a:rPr lang="en-GB" sz="1200" dirty="0" err="1">
-                <a:solidFill>
-                  <a:srgbClr val="FF0000"/>
-                </a:solidFill>
-                <a:latin typeface="JetBrains Mono" panose="02000009000000000000" pitchFamily="49" charset="0"/>
-                <a:ea typeface="JetBrains Mono" panose="02000009000000000000" pitchFamily="49" charset="0"/>
-                <a:cs typeface="JetBrains Mono" panose="02000009000000000000" pitchFamily="49" charset="0"/>
-              </a:rPr>
-              <a:t>p</a:t>
-            </a:r>
-            <a:r>
-              <a:rPr lang="en-GB" sz="1200" dirty="0" err="1" smtClean="0">
-                <a:solidFill>
-                  <a:srgbClr val="FF0000"/>
-                </a:solidFill>
-                <a:latin typeface="JetBrains Mono" panose="02000009000000000000" pitchFamily="49" charset="0"/>
-                <a:ea typeface="JetBrains Mono" panose="02000009000000000000" pitchFamily="49" charset="0"/>
-                <a:cs typeface="JetBrains Mono" panose="02000009000000000000" pitchFamily="49" charset="0"/>
-              </a:rPr>
-              <a:t>rogramming_heist_professor</a:t>
-            </a:r>
-            <a:endParaRPr lang="en-IN" sz="1200" dirty="0">
-              <a:solidFill>
-                <a:srgbClr val="FF0000"/>
-              </a:solidFill>
-              <a:latin typeface="JetBrains Mono" panose="02000009000000000000" pitchFamily="49" charset="0"/>
-              <a:ea typeface="JetBrains Mono" panose="02000009000000000000" pitchFamily="49" charset="0"/>
-              <a:cs typeface="JetBrains Mono" panose="02000009000000000000" pitchFamily="49" charset="0"/>
-            </a:endParaRPr>
-          </a:p>
-        </p:txBody>
-      </p:sp>
-    </p:spTree>
-    <p:extLst>
-      <p:ext uri="{BB962C8B-B14F-4D97-AF65-F5344CB8AC3E}">
-        <p14:creationId xmlns:p14="http://schemas.microsoft.com/office/powerpoint/2010/main" val="27394038"/>
-      </p:ext>
-    </p:extLst>
-  </p:cSld>
-  <p:clrMapOvr>
-    <a:masterClrMapping/>
-  </p:clrMapOvr>
-  <p:timing>
-    <p:tnLst>
-      <p:par>
-        <p:cTn id="1" dur="indefinite" restart="never" nodeType="tmRoot"/>
-      </p:par>
-    </p:tnLst>
-  </p:timing>
-</p:sld>
-</file>
-
 <file path=ppt/slides/slide3.xml><?xml version="1.0" encoding="utf-8"?>
 <p:sld xmlns:a="http://schemas.openxmlformats.org/drawingml/2006/main" xmlns:r="http://schemas.openxmlformats.org/officeDocument/2006/relationships" xmlns:p="http://schemas.openxmlformats.org/presentationml/2006/main">
   <p:cSld>
@@ -8279,23 +6510,7 @@
                 <a:ea typeface="JetBrains Mono" panose="02000009000000000000" pitchFamily="49" charset="0"/>
                 <a:cs typeface="JetBrains Mono" panose="02000009000000000000" pitchFamily="49" charset="0"/>
               </a:rPr>
-              <a:t> </a:t>
-            </a:r>
-            <a:r>
-              <a:rPr lang="en-IN" dirty="0" smtClean="0">
-                <a:latin typeface="JetBrains Mono" panose="02000009000000000000" pitchFamily="49" charset="0"/>
-                <a:ea typeface="JetBrains Mono" panose="02000009000000000000" pitchFamily="49" charset="0"/>
-                <a:cs typeface="JetBrains Mono" panose="02000009000000000000" pitchFamily="49" charset="0"/>
-              </a:rPr>
-              <a:t>: was </a:t>
-            </a:r>
-            <a:r>
-              <a:rPr lang="en-IN" dirty="0">
-                <a:latin typeface="JetBrains Mono" panose="02000009000000000000" pitchFamily="49" charset="0"/>
-                <a:ea typeface="JetBrains Mono" panose="02000009000000000000" pitchFamily="49" charset="0"/>
-                <a:cs typeface="JetBrains Mono" panose="02000009000000000000" pitchFamily="49" charset="0"/>
-              </a:rPr>
-              <a:t>easy to learn, it wasn’t very powerful, and its lack of structure made its usefulness questionable for large programs.</a:t>
+              <a:t> : was easy to learn, it wasn’t very powerful, and its lack of structure made its usefulness questionable for large programs.</a:t>
             </a:r>
           </a:p>
         </p:txBody>
@@ -8322,7 +6537,7 @@
           <a:lstStyle/>
           <a:p>
             <a:r>
-              <a:rPr lang="en-GB" sz="1400" dirty="0" smtClean="0">
+              <a:rPr lang="en-GB" sz="1400" dirty="0">
                 <a:solidFill>
                   <a:srgbClr val="92D050"/>
                 </a:solidFill>
@@ -8335,14 +6550,14 @@
           </a:p>
           <a:p>
             <a:r>
-              <a:rPr lang="en-GB" sz="1400" dirty="0" smtClean="0">
+              <a:rPr lang="en-GB" sz="1400" dirty="0">
                 <a:latin typeface="JetBrains Mono" panose="02000009000000000000" pitchFamily="49" charset="0"/>
                 <a:ea typeface="JetBrains Mono" panose="02000009000000000000" pitchFamily="49" charset="0"/>
                 <a:cs typeface="JetBrains Mono" panose="02000009000000000000" pitchFamily="49" charset="0"/>
               </a:rPr>
               <a:t>----------------------</a:t>
             </a:r>
-            <a:endParaRPr lang="en-IN" sz="1400" dirty="0" smtClean="0">
+            <a:endParaRPr lang="en-IN" sz="1400" dirty="0">
               <a:latin typeface="JetBrains Mono" panose="02000009000000000000" pitchFamily="49" charset="0"/>
               <a:ea typeface="JetBrains Mono" panose="02000009000000000000" pitchFamily="49" charset="0"/>
               <a:cs typeface="JetBrains Mono" panose="02000009000000000000" pitchFamily="49" charset="0"/>
@@ -8350,7 +6565,7 @@
           </a:p>
           <a:p>
             <a:r>
-              <a:rPr lang="en-IN" sz="1400" dirty="0" smtClean="0">
+              <a:rPr lang="en-IN" sz="1400" dirty="0">
                 <a:latin typeface="JetBrains Mono" panose="02000009000000000000" pitchFamily="49" charset="0"/>
                 <a:ea typeface="JetBrains Mono" panose="02000009000000000000" pitchFamily="49" charset="0"/>
                 <a:cs typeface="JetBrains Mono" panose="02000009000000000000" pitchFamily="49" charset="0"/>
@@ -8494,7 +6709,7 @@
           <a:lstStyle/>
           <a:p>
             <a:r>
-              <a:rPr lang="en-GB" sz="1400" dirty="0" smtClean="0">
+              <a:rPr lang="en-GB" sz="1400" dirty="0">
                 <a:solidFill>
                   <a:srgbClr val="92D050"/>
                 </a:solidFill>
@@ -8507,14 +6722,14 @@
           </a:p>
           <a:p>
             <a:r>
-              <a:rPr lang="en-GB" sz="1400" dirty="0" smtClean="0">
+              <a:rPr lang="en-GB" sz="1400" dirty="0">
                 <a:latin typeface="JetBrains Mono" panose="02000009000000000000" pitchFamily="49" charset="0"/>
                 <a:ea typeface="JetBrains Mono" panose="02000009000000000000" pitchFamily="49" charset="0"/>
                 <a:cs typeface="JetBrains Mono" panose="02000009000000000000" pitchFamily="49" charset="0"/>
               </a:rPr>
               <a:t>------------------------------</a:t>
             </a:r>
-            <a:endParaRPr lang="en-IN" sz="1400" dirty="0" smtClean="0">
+            <a:endParaRPr lang="en-IN" sz="1400" dirty="0">
               <a:latin typeface="JetBrains Mono" panose="02000009000000000000" pitchFamily="49" charset="0"/>
               <a:ea typeface="JetBrains Mono" panose="02000009000000000000" pitchFamily="49" charset="0"/>
               <a:cs typeface="JetBrains Mono" panose="02000009000000000000" pitchFamily="49" charset="0"/>
@@ -8522,20 +6737,12 @@
           </a:p>
           <a:p>
             <a:r>
-              <a:rPr lang="en-IN" sz="1400" dirty="0" smtClean="0">
-                <a:latin typeface="JetBrains Mono" panose="02000009000000000000" pitchFamily="49" charset="0"/>
-                <a:ea typeface="JetBrains Mono" panose="02000009000000000000" pitchFamily="49" charset="0"/>
-                <a:cs typeface="JetBrains Mono" panose="02000009000000000000" pitchFamily="49" charset="0"/>
-              </a:rPr>
-              <a:t>INPUT </a:t>
-            </a:r>
-            <a:r>
               <a:rPr lang="en-IN" sz="1400" dirty="0">
                 <a:latin typeface="JetBrains Mono" panose="02000009000000000000" pitchFamily="49" charset="0"/>
                 <a:ea typeface="JetBrains Mono" panose="02000009000000000000" pitchFamily="49" charset="0"/>
                 <a:cs typeface="JetBrains Mono" panose="02000009000000000000" pitchFamily="49" charset="0"/>
               </a:rPr>
-              <a:t>"Please type your first name &gt; ", </a:t>
+              <a:t>INPUT "Please type your first name &gt; ", </a:t>
             </a:r>
             <a:r>
               <a:rPr lang="en-IN" sz="1400" dirty="0" err="1">
@@ -8655,61 +6862,6 @@
               </a:rPr>
               <a:t>$</a:t>
             </a:r>
-          </a:p>
-        </p:txBody>
-      </p:sp>
-      <p:sp>
-        <p:nvSpPr>
-          <p:cNvPr id="8" name="TextBox 7"/>
-          <p:cNvSpPr txBox="1"/>
-          <p:nvPr/>
-        </p:nvSpPr>
-        <p:spPr>
-          <a:xfrm>
-            <a:off x="9337639" y="6368527"/>
-            <a:ext cx="2694969" cy="276999"/>
-          </a:xfrm>
-          <a:prstGeom prst="rect">
-            <a:avLst/>
-          </a:prstGeom>
-          <a:noFill/>
-        </p:spPr>
-        <p:txBody>
-          <a:bodyPr wrap="none" rtlCol="0">
-            <a:spAutoFit/>
-          </a:bodyPr>
-          <a:lstStyle/>
-          <a:p>
-            <a:r>
-              <a:rPr lang="en-GB" sz="1200" dirty="0" err="1">
-                <a:solidFill>
-                  <a:srgbClr val="FF0000"/>
-                </a:solidFill>
-                <a:latin typeface="JetBrains Mono" panose="02000009000000000000" pitchFamily="49" charset="0"/>
-                <a:ea typeface="JetBrains Mono" panose="02000009000000000000" pitchFamily="49" charset="0"/>
-                <a:cs typeface="JetBrains Mono" panose="02000009000000000000" pitchFamily="49" charset="0"/>
-              </a:rPr>
-              <a:t>p</a:t>
-            </a:r>
-            <a:r>
-              <a:rPr lang="en-GB" sz="1200" dirty="0" err="1" smtClean="0">
-                <a:solidFill>
-                  <a:srgbClr val="FF0000"/>
-                </a:solidFill>
-                <a:latin typeface="JetBrains Mono" panose="02000009000000000000" pitchFamily="49" charset="0"/>
-                <a:ea typeface="JetBrains Mono" panose="02000009000000000000" pitchFamily="49" charset="0"/>
-                <a:cs typeface="JetBrains Mono" panose="02000009000000000000" pitchFamily="49" charset="0"/>
-              </a:rPr>
-              <a:t>rogramming_heist_professor</a:t>
-            </a:r>
-            <a:endParaRPr lang="en-IN" sz="1200" dirty="0">
-              <a:solidFill>
-                <a:srgbClr val="FF0000"/>
-              </a:solidFill>
-              <a:latin typeface="JetBrains Mono" panose="02000009000000000000" pitchFamily="49" charset="0"/>
-              <a:ea typeface="JetBrains Mono" panose="02000009000000000000" pitchFamily="49" charset="0"/>
-              <a:cs typeface="JetBrains Mono" panose="02000009000000000000" pitchFamily="49" charset="0"/>
-            </a:endParaRPr>
           </a:p>
         </p:txBody>
       </p:sp>
@@ -8981,7 +7133,7 @@
           <a:lstStyle/>
           <a:p>
             <a:r>
-              <a:rPr lang="en-IN" sz="2800" dirty="0" smtClean="0">
+              <a:rPr lang="en-IN" sz="2800" dirty="0">
                 <a:solidFill>
                   <a:srgbClr val="FFC000"/>
                 </a:solidFill>
@@ -8989,18 +7141,7 @@
                 <a:ea typeface="JetBrains Mono" panose="02000009000000000000" pitchFamily="49" charset="0"/>
                 <a:cs typeface="JetBrains Mono" panose="02000009000000000000" pitchFamily="49" charset="0"/>
               </a:rPr>
-              <a:t>Now </a:t>
-            </a:r>
-            <a:r>
-              <a:rPr lang="en-IN" sz="2800" dirty="0">
-                <a:solidFill>
-                  <a:srgbClr val="FFC000"/>
-                </a:solidFill>
-                <a:latin typeface="JetBrains Mono" panose="02000009000000000000" pitchFamily="49" charset="0"/>
-                <a:ea typeface="JetBrains Mono" panose="02000009000000000000" pitchFamily="49" charset="0"/>
-                <a:cs typeface="JetBrains Mono" panose="02000009000000000000" pitchFamily="49" charset="0"/>
-              </a:rPr>
-              <a:t>C language</a:t>
+              <a:t>Now C language</a:t>
             </a:r>
           </a:p>
         </p:txBody>
@@ -9051,23 +7192,7 @@
                 <a:ea typeface="JetBrains Mono" panose="02000009000000000000" pitchFamily="49" charset="0"/>
                 <a:cs typeface="JetBrains Mono" panose="02000009000000000000" pitchFamily="49" charset="0"/>
               </a:rPr>
-              <a:t>, the computer revolution was beginning </a:t>
-            </a:r>
-            <a:r>
-              <a:rPr lang="en-IN" dirty="0" smtClean="0">
-                <a:latin typeface="JetBrains Mono" panose="02000009000000000000" pitchFamily="49" charset="0"/>
-                <a:ea typeface="JetBrains Mono" panose="02000009000000000000" pitchFamily="49" charset="0"/>
-                <a:cs typeface="JetBrains Mono" panose="02000009000000000000" pitchFamily="49" charset="0"/>
-              </a:rPr>
-              <a:t>, </a:t>
-            </a:r>
-            <a:r>
-              <a:rPr lang="en-IN" dirty="0">
-                <a:latin typeface="JetBrains Mono" panose="02000009000000000000" pitchFamily="49" charset="0"/>
-                <a:ea typeface="JetBrains Mono" panose="02000009000000000000" pitchFamily="49" charset="0"/>
-                <a:cs typeface="JetBrains Mono" panose="02000009000000000000" pitchFamily="49" charset="0"/>
-              </a:rPr>
-              <a:t>and the </a:t>
+              <a:t>, the computer revolution was beginning , and the </a:t>
             </a:r>
             <a:r>
               <a:rPr lang="en-IN" dirty="0">
@@ -9078,80 +7203,32 @@
                 <a:ea typeface="JetBrains Mono" panose="02000009000000000000" pitchFamily="49" charset="0"/>
                 <a:cs typeface="JetBrains Mono" panose="02000009000000000000" pitchFamily="49" charset="0"/>
               </a:rPr>
-              <a:t>demand for </a:t>
-            </a:r>
-            <a:r>
-              <a:rPr lang="en-IN" dirty="0" smtClean="0">
-                <a:solidFill>
-                  <a:srgbClr val="92D050"/>
-                </a:solidFill>
-                <a:latin typeface="JetBrains Mono" panose="02000009000000000000" pitchFamily="49" charset="0"/>
-                <a:ea typeface="JetBrains Mono" panose="02000009000000000000" pitchFamily="49" charset="0"/>
-                <a:cs typeface="JetBrains Mono" panose="02000009000000000000" pitchFamily="49" charset="0"/>
-              </a:rPr>
-              <a:t>new software</a:t>
-            </a:r>
-            <a:r>
-              <a:rPr lang="en-IN" dirty="0" smtClean="0">
-                <a:latin typeface="JetBrains Mono" panose="02000009000000000000" pitchFamily="49" charset="0"/>
-                <a:ea typeface="JetBrains Mono" panose="02000009000000000000" pitchFamily="49" charset="0"/>
-                <a:cs typeface="JetBrains Mono" panose="02000009000000000000" pitchFamily="49" charset="0"/>
-              </a:rPr>
-              <a:t> was, before programmers</a:t>
-            </a:r>
-            <a:r>
-              <a:rPr lang="en-IN" dirty="0">
-                <a:latin typeface="JetBrains Mono" panose="02000009000000000000" pitchFamily="49" charset="0"/>
-                <a:ea typeface="JetBrains Mono" panose="02000009000000000000" pitchFamily="49" charset="0"/>
-                <a:cs typeface="JetBrains Mono" panose="02000009000000000000" pitchFamily="49" charset="0"/>
-              </a:rPr>
-              <a:t>’ </a:t>
-            </a:r>
-            <a:r>
-              <a:rPr lang="en-IN" dirty="0" smtClean="0">
-                <a:latin typeface="JetBrains Mono" panose="02000009000000000000" pitchFamily="49" charset="0"/>
-                <a:ea typeface="JetBrains Mono" panose="02000009000000000000" pitchFamily="49" charset="0"/>
-                <a:cs typeface="JetBrains Mono" panose="02000009000000000000" pitchFamily="49" charset="0"/>
-              </a:rPr>
-              <a:t>to produce </a:t>
-            </a:r>
-            <a:r>
-              <a:rPr lang="en-IN" dirty="0">
-                <a:latin typeface="JetBrains Mono" panose="02000009000000000000" pitchFamily="49" charset="0"/>
-                <a:ea typeface="JetBrains Mono" panose="02000009000000000000" pitchFamily="49" charset="0"/>
-                <a:cs typeface="JetBrains Mono" panose="02000009000000000000" pitchFamily="49" charset="0"/>
-              </a:rPr>
-              <a:t>it. </a:t>
-            </a:r>
-            <a:endParaRPr lang="en-IN" dirty="0" smtClean="0">
+              <a:t>demand for new software</a:t>
+            </a:r>
+            <a:r>
+              <a:rPr lang="en-IN" dirty="0">
+                <a:latin typeface="JetBrains Mono" panose="02000009000000000000" pitchFamily="49" charset="0"/>
+                <a:ea typeface="JetBrains Mono" panose="02000009000000000000" pitchFamily="49" charset="0"/>
+                <a:cs typeface="JetBrains Mono" panose="02000009000000000000" pitchFamily="49" charset="0"/>
+              </a:rPr>
+              <a:t> was, before programmers’ to produce it. </a:t>
+            </a:r>
+          </a:p>
+          <a:p>
+            <a:endParaRPr lang="en-IN" dirty="0">
               <a:latin typeface="JetBrains Mono" panose="02000009000000000000" pitchFamily="49" charset="0"/>
               <a:ea typeface="JetBrains Mono" panose="02000009000000000000" pitchFamily="49" charset="0"/>
               <a:cs typeface="JetBrains Mono" panose="02000009000000000000" pitchFamily="49" charset="0"/>
             </a:endParaRPr>
           </a:p>
           <a:p>
-            <a:endParaRPr lang="en-IN" dirty="0" smtClean="0">
-              <a:latin typeface="JetBrains Mono" panose="02000009000000000000" pitchFamily="49" charset="0"/>
-              <a:ea typeface="JetBrains Mono" panose="02000009000000000000" pitchFamily="49" charset="0"/>
-              <a:cs typeface="JetBrains Mono" panose="02000009000000000000" pitchFamily="49" charset="0"/>
-            </a:endParaRPr>
-          </a:p>
-          <a:p>
-            <a:r>
-              <a:rPr lang="en-IN" dirty="0" smtClean="0">
-                <a:latin typeface="JetBrains Mono" panose="02000009000000000000" pitchFamily="49" charset="0"/>
-                <a:ea typeface="JetBrains Mono" panose="02000009000000000000" pitchFamily="49" charset="0"/>
-                <a:cs typeface="JetBrains Mono" panose="02000009000000000000" pitchFamily="49" charset="0"/>
-              </a:rPr>
-              <a:t>A </a:t>
-            </a:r>
-            <a:r>
-              <a:rPr lang="en-IN" dirty="0">
-                <a:latin typeface="JetBrains Mono" panose="02000009000000000000" pitchFamily="49" charset="0"/>
-                <a:ea typeface="JetBrains Mono" panose="02000009000000000000" pitchFamily="49" charset="0"/>
-                <a:cs typeface="JetBrains Mono" panose="02000009000000000000" pitchFamily="49" charset="0"/>
-              </a:rPr>
-              <a:t>great deal of effort was being expended in academic circles in an attempt </a:t>
+            <a:r>
+              <a:rPr lang="en-IN" dirty="0">
+                <a:latin typeface="JetBrains Mono" panose="02000009000000000000" pitchFamily="49" charset="0"/>
+                <a:ea typeface="JetBrains Mono" panose="02000009000000000000" pitchFamily="49" charset="0"/>
+                <a:cs typeface="JetBrains Mono" panose="02000009000000000000" pitchFamily="49" charset="0"/>
+              </a:rPr>
+              <a:t>A great deal of effort was being expended in academic circles in an attempt </a:t>
             </a:r>
             <a:r>
               <a:rPr lang="en-IN" dirty="0">
@@ -9202,31 +7279,7 @@
                 <a:ea typeface="JetBrains Mono" panose="02000009000000000000" pitchFamily="49" charset="0"/>
                 <a:cs typeface="JetBrains Mono" panose="02000009000000000000" pitchFamily="49" charset="0"/>
               </a:rPr>
-              <a:t>Computer hardware was finally </a:t>
-            </a:r>
-            <a:r>
-              <a:rPr lang="en-IN" dirty="0" smtClean="0">
-                <a:latin typeface="JetBrains Mono" panose="02000009000000000000" pitchFamily="49" charset="0"/>
-                <a:ea typeface="JetBrains Mono" panose="02000009000000000000" pitchFamily="49" charset="0"/>
-                <a:cs typeface="JetBrains Mono" panose="02000009000000000000" pitchFamily="49" charset="0"/>
-              </a:rPr>
-              <a:t>available for general masses. </a:t>
-            </a:r>
-            <a:r>
-              <a:rPr lang="en-IN" dirty="0">
-                <a:latin typeface="JetBrains Mono" panose="02000009000000000000" pitchFamily="49" charset="0"/>
-                <a:ea typeface="JetBrains Mono" panose="02000009000000000000" pitchFamily="49" charset="0"/>
-                <a:cs typeface="JetBrains Mono" panose="02000009000000000000" pitchFamily="49" charset="0"/>
-              </a:rPr>
-              <a:t>No longer were computers kept behind locked doors</a:t>
-            </a:r>
-            <a:r>
-              <a:rPr lang="en-IN" dirty="0" smtClean="0">
-                <a:latin typeface="JetBrains Mono" panose="02000009000000000000" pitchFamily="49" charset="0"/>
-                <a:ea typeface="JetBrains Mono" panose="02000009000000000000" pitchFamily="49" charset="0"/>
-                <a:cs typeface="JetBrains Mono" panose="02000009000000000000" pitchFamily="49" charset="0"/>
-              </a:rPr>
-              <a:t>. </a:t>
+              <a:t>Computer hardware was finally available for general masses. No longer were computers kept behind locked doors. </a:t>
             </a:r>
             <a:r>
               <a:rPr lang="en-GB" dirty="0">
@@ -9385,61 +7438,6 @@
           </a:extLst>
         </p:spPr>
       </p:pic>
-      <p:sp>
-        <p:nvSpPr>
-          <p:cNvPr id="7" name="TextBox 6"/>
-          <p:cNvSpPr txBox="1"/>
-          <p:nvPr/>
-        </p:nvSpPr>
-        <p:spPr>
-          <a:xfrm>
-            <a:off x="9337639" y="6368527"/>
-            <a:ext cx="2694969" cy="276999"/>
-          </a:xfrm>
-          <a:prstGeom prst="rect">
-            <a:avLst/>
-          </a:prstGeom>
-          <a:noFill/>
-        </p:spPr>
-        <p:txBody>
-          <a:bodyPr wrap="none" rtlCol="0">
-            <a:spAutoFit/>
-          </a:bodyPr>
-          <a:lstStyle/>
-          <a:p>
-            <a:r>
-              <a:rPr lang="en-GB" sz="1200" dirty="0" err="1">
-                <a:solidFill>
-                  <a:srgbClr val="FF0000"/>
-                </a:solidFill>
-                <a:latin typeface="JetBrains Mono" panose="02000009000000000000" pitchFamily="49" charset="0"/>
-                <a:ea typeface="JetBrains Mono" panose="02000009000000000000" pitchFamily="49" charset="0"/>
-                <a:cs typeface="JetBrains Mono" panose="02000009000000000000" pitchFamily="49" charset="0"/>
-              </a:rPr>
-              <a:t>p</a:t>
-            </a:r>
-            <a:r>
-              <a:rPr lang="en-GB" sz="1200" dirty="0" err="1" smtClean="0">
-                <a:solidFill>
-                  <a:srgbClr val="FF0000"/>
-                </a:solidFill>
-                <a:latin typeface="JetBrains Mono" panose="02000009000000000000" pitchFamily="49" charset="0"/>
-                <a:ea typeface="JetBrains Mono" panose="02000009000000000000" pitchFamily="49" charset="0"/>
-                <a:cs typeface="JetBrains Mono" panose="02000009000000000000" pitchFamily="49" charset="0"/>
-              </a:rPr>
-              <a:t>rogramming_heist_professor</a:t>
-            </a:r>
-            <a:endParaRPr lang="en-IN" sz="1200" dirty="0">
-              <a:solidFill>
-                <a:srgbClr val="FF0000"/>
-              </a:solidFill>
-              <a:latin typeface="JetBrains Mono" panose="02000009000000000000" pitchFamily="49" charset="0"/>
-              <a:ea typeface="JetBrains Mono" panose="02000009000000000000" pitchFamily="49" charset="0"/>
-              <a:cs typeface="JetBrains Mono" panose="02000009000000000000" pitchFamily="49" charset="0"/>
-            </a:endParaRPr>
-          </a:p>
-        </p:txBody>
-      </p:sp>
     </p:spTree>
     <p:extLst>
       <p:ext uri="{BB962C8B-B14F-4D97-AF65-F5344CB8AC3E}">
@@ -9697,7 +7695,7 @@
               <a:t>During the late </a:t>
             </a:r>
             <a:r>
-              <a:rPr lang="en-IN" dirty="0" smtClean="0">
+              <a:rPr lang="en-IN" dirty="0">
                 <a:solidFill>
                   <a:srgbClr val="FFC000"/>
                 </a:solidFill>
@@ -9705,74 +7703,15 @@
                 <a:ea typeface="JetBrains Mono" panose="02000009000000000000" pitchFamily="49" charset="0"/>
                 <a:cs typeface="JetBrains Mono" panose="02000009000000000000" pitchFamily="49" charset="0"/>
               </a:rPr>
-              <a:t>1972 </a:t>
-            </a:r>
-            <a:r>
-              <a:rPr lang="en-IN" dirty="0">
-                <a:solidFill>
-                  <a:srgbClr val="FFC000"/>
-                </a:solidFill>
-                <a:latin typeface="JetBrains Mono" panose="02000009000000000000" pitchFamily="49" charset="0"/>
-                <a:ea typeface="JetBrains Mono" panose="02000009000000000000" pitchFamily="49" charset="0"/>
-                <a:cs typeface="JetBrains Mono" panose="02000009000000000000" pitchFamily="49" charset="0"/>
-              </a:rPr>
-              <a:t>and early 1980s</a:t>
-            </a:r>
-            <a:r>
-              <a:rPr lang="en-IN" dirty="0">
-                <a:latin typeface="JetBrains Mono" panose="02000009000000000000" pitchFamily="49" charset="0"/>
-                <a:ea typeface="JetBrains Mono" panose="02000009000000000000" pitchFamily="49" charset="0"/>
-                <a:cs typeface="JetBrains Mono" panose="02000009000000000000" pitchFamily="49" charset="0"/>
-              </a:rPr>
-              <a:t>, C became the dominant </a:t>
-            </a:r>
-            <a:r>
-              <a:rPr lang="en-IN" dirty="0" smtClean="0">
-                <a:latin typeface="JetBrains Mono" panose="02000009000000000000" pitchFamily="49" charset="0"/>
-                <a:ea typeface="JetBrains Mono" panose="02000009000000000000" pitchFamily="49" charset="0"/>
-                <a:cs typeface="JetBrains Mono" panose="02000009000000000000" pitchFamily="49" charset="0"/>
-              </a:rPr>
-              <a:t>computer programming </a:t>
-            </a:r>
-            <a:r>
-              <a:rPr lang="en-IN" dirty="0">
-                <a:latin typeface="JetBrains Mono" panose="02000009000000000000" pitchFamily="49" charset="0"/>
-                <a:ea typeface="JetBrains Mono" panose="02000009000000000000" pitchFamily="49" charset="0"/>
-                <a:cs typeface="JetBrains Mono" panose="02000009000000000000" pitchFamily="49" charset="0"/>
-              </a:rPr>
-              <a:t>language, and it is still widely used today. </a:t>
-            </a:r>
-            <a:r>
-              <a:rPr lang="en-IN" dirty="0" smtClean="0">
-                <a:latin typeface="JetBrains Mono" panose="02000009000000000000" pitchFamily="49" charset="0"/>
-                <a:ea typeface="JetBrains Mono" panose="02000009000000000000" pitchFamily="49" charset="0"/>
-                <a:cs typeface="JetBrains Mono" panose="02000009000000000000" pitchFamily="49" charset="0"/>
-              </a:rPr>
-              <a:t> Since then - C </a:t>
-            </a:r>
-            <a:r>
-              <a:rPr lang="en-IN" dirty="0">
-                <a:latin typeface="JetBrains Mono" panose="02000009000000000000" pitchFamily="49" charset="0"/>
-                <a:ea typeface="JetBrains Mono" panose="02000009000000000000" pitchFamily="49" charset="0"/>
-                <a:cs typeface="JetBrains Mono" panose="02000009000000000000" pitchFamily="49" charset="0"/>
-              </a:rPr>
-              <a:t>is a </a:t>
-            </a:r>
-            <a:r>
-              <a:rPr lang="en-IN" dirty="0" smtClean="0">
-                <a:latin typeface="JetBrains Mono" panose="02000009000000000000" pitchFamily="49" charset="0"/>
-                <a:ea typeface="JetBrains Mono" panose="02000009000000000000" pitchFamily="49" charset="0"/>
-                <a:cs typeface="JetBrains Mono" panose="02000009000000000000" pitchFamily="49" charset="0"/>
-              </a:rPr>
-              <a:t>successful and </a:t>
-            </a:r>
-            <a:r>
-              <a:rPr lang="en-IN" dirty="0">
-                <a:latin typeface="JetBrains Mono" panose="02000009000000000000" pitchFamily="49" charset="0"/>
-                <a:ea typeface="JetBrains Mono" panose="02000009000000000000" pitchFamily="49" charset="0"/>
-                <a:cs typeface="JetBrains Mono" panose="02000009000000000000" pitchFamily="49" charset="0"/>
-              </a:rPr>
-              <a:t>useful language, </a:t>
+              <a:t>1972 and early 1980s</a:t>
+            </a:r>
+            <a:r>
+              <a:rPr lang="en-IN" dirty="0">
+                <a:latin typeface="JetBrains Mono" panose="02000009000000000000" pitchFamily="49" charset="0"/>
+                <a:ea typeface="JetBrains Mono" panose="02000009000000000000" pitchFamily="49" charset="0"/>
+                <a:cs typeface="JetBrains Mono" panose="02000009000000000000" pitchFamily="49" charset="0"/>
+              </a:rPr>
+              <a:t>, C became the dominant computer programming language, and it is still widely used today.  Since then - C is a successful and useful language, </a:t>
             </a:r>
           </a:p>
         </p:txBody>
@@ -9799,7 +7738,7 @@
           <a:lstStyle/>
           <a:p>
             <a:r>
-              <a:rPr lang="en-IN" sz="2800" dirty="0" smtClean="0">
+              <a:rPr lang="en-IN" sz="2800" dirty="0">
                 <a:solidFill>
                   <a:srgbClr val="FFC000"/>
                 </a:solidFill>
@@ -9956,23 +7895,15 @@
           <a:lstStyle/>
           <a:p>
             <a:r>
-              <a:rPr lang="en-IN" dirty="0" smtClean="0">
-                <a:latin typeface="JetBrains Mono" panose="02000009000000000000" pitchFamily="49" charset="0"/>
-                <a:ea typeface="JetBrains Mono" panose="02000009000000000000" pitchFamily="49" charset="0"/>
-                <a:cs typeface="JetBrains Mono" panose="02000009000000000000" pitchFamily="49" charset="0"/>
-              </a:rPr>
-              <a:t>To solve </a:t>
-            </a:r>
-            <a:r>
-              <a:rPr lang="en-IN" dirty="0">
-                <a:latin typeface="JetBrains Mono" panose="02000009000000000000" pitchFamily="49" charset="0"/>
-                <a:ea typeface="JetBrains Mono" panose="02000009000000000000" pitchFamily="49" charset="0"/>
-                <a:cs typeface="JetBrains Mono" panose="02000009000000000000" pitchFamily="49" charset="0"/>
-              </a:rPr>
-              <a:t>this problem, a new way to program was invented, called </a:t>
-            </a:r>
-            <a:r>
-              <a:rPr lang="en-IN" dirty="0" smtClean="0">
+              <a:rPr lang="en-IN" dirty="0">
+                <a:latin typeface="JetBrains Mono" panose="02000009000000000000" pitchFamily="49" charset="0"/>
+                <a:ea typeface="JetBrains Mono" panose="02000009000000000000" pitchFamily="49" charset="0"/>
+                <a:cs typeface="JetBrains Mono" panose="02000009000000000000" pitchFamily="49" charset="0"/>
+              </a:rPr>
+              <a:t>To solve this problem, a new way to program was invented, called </a:t>
+            </a:r>
+            <a:r>
+              <a:rPr lang="en-IN" dirty="0">
                 <a:solidFill>
                   <a:srgbClr val="00B050"/>
                 </a:solidFill>
@@ -9980,74 +7911,8 @@
                 <a:ea typeface="JetBrains Mono" panose="02000009000000000000" pitchFamily="49" charset="0"/>
                 <a:cs typeface="JetBrains Mono" panose="02000009000000000000" pitchFamily="49" charset="0"/>
               </a:rPr>
-              <a:t>object-oriented programming </a:t>
-            </a:r>
-            <a:r>
-              <a:rPr lang="en-IN" dirty="0">
-                <a:solidFill>
-                  <a:srgbClr val="00B050"/>
-                </a:solidFill>
-                <a:latin typeface="JetBrains Mono" panose="02000009000000000000" pitchFamily="49" charset="0"/>
-                <a:ea typeface="JetBrains Mono" panose="02000009000000000000" pitchFamily="49" charset="0"/>
-                <a:cs typeface="JetBrains Mono" panose="02000009000000000000" pitchFamily="49" charset="0"/>
-              </a:rPr>
-              <a:t>(OOP).</a:t>
-            </a:r>
-          </a:p>
-        </p:txBody>
-      </p:sp>
-      <p:sp>
-        <p:nvSpPr>
-          <p:cNvPr id="7" name="TextBox 6"/>
-          <p:cNvSpPr txBox="1"/>
-          <p:nvPr/>
-        </p:nvSpPr>
-        <p:spPr>
-          <a:xfrm>
-            <a:off x="9337639" y="6368527"/>
-            <a:ext cx="2694969" cy="276999"/>
-          </a:xfrm>
-          <a:prstGeom prst="rect">
-            <a:avLst/>
-          </a:prstGeom>
-          <a:noFill/>
-        </p:spPr>
-        <p:txBody>
-          <a:bodyPr wrap="none" rtlCol="0">
-            <a:spAutoFit/>
-          </a:bodyPr>
-          <a:lstStyle/>
-          <a:p>
-            <a:r>
-              <a:rPr lang="en-GB" sz="1200" dirty="0" err="1">
-                <a:solidFill>
-                  <a:srgbClr val="FF0000"/>
-                </a:solidFill>
-                <a:latin typeface="JetBrains Mono" panose="02000009000000000000" pitchFamily="49" charset="0"/>
-                <a:ea typeface="JetBrains Mono" panose="02000009000000000000" pitchFamily="49" charset="0"/>
-                <a:cs typeface="JetBrains Mono" panose="02000009000000000000" pitchFamily="49" charset="0"/>
-              </a:rPr>
-              <a:t>p</a:t>
-            </a:r>
-            <a:r>
-              <a:rPr lang="en-GB" sz="1200" dirty="0" err="1" smtClean="0">
-                <a:solidFill>
-                  <a:srgbClr val="FF0000"/>
-                </a:solidFill>
-                <a:latin typeface="JetBrains Mono" panose="02000009000000000000" pitchFamily="49" charset="0"/>
-                <a:ea typeface="JetBrains Mono" panose="02000009000000000000" pitchFamily="49" charset="0"/>
-                <a:cs typeface="JetBrains Mono" panose="02000009000000000000" pitchFamily="49" charset="0"/>
-              </a:rPr>
-              <a:t>rogramming_heist_professor</a:t>
-            </a:r>
-            <a:endParaRPr lang="en-IN" sz="1200" dirty="0">
-              <a:solidFill>
-                <a:srgbClr val="FF0000"/>
-              </a:solidFill>
-              <a:latin typeface="JetBrains Mono" panose="02000009000000000000" pitchFamily="49" charset="0"/>
-              <a:ea typeface="JetBrains Mono" panose="02000009000000000000" pitchFamily="49" charset="0"/>
-              <a:cs typeface="JetBrains Mono" panose="02000009000000000000" pitchFamily="49" charset="0"/>
-            </a:endParaRPr>
+              <a:t>object-oriented programming (OOP).</a:t>
+            </a:r>
           </a:p>
         </p:txBody>
       </p:sp>
@@ -10319,7 +8184,7 @@
           <a:lstStyle/>
           <a:p>
             <a:r>
-              <a:rPr lang="en-IN" sz="2800" dirty="0" smtClean="0">
+              <a:rPr lang="en-IN" sz="2800" dirty="0">
                 <a:solidFill>
                   <a:srgbClr val="FFC000"/>
                 </a:solidFill>
@@ -10360,34 +8225,10 @@
                 <a:ea typeface="JetBrains Mono" panose="02000009000000000000" pitchFamily="49" charset="0"/>
                 <a:cs typeface="JetBrains Mono" panose="02000009000000000000" pitchFamily="49" charset="0"/>
               </a:rPr>
-              <a:t>C++ </a:t>
-            </a:r>
-            <a:r>
-              <a:rPr lang="en-IN" dirty="0" smtClean="0">
-                <a:latin typeface="JetBrains Mono" panose="02000009000000000000" pitchFamily="49" charset="0"/>
-                <a:ea typeface="JetBrains Mono" panose="02000009000000000000" pitchFamily="49" charset="0"/>
-                <a:cs typeface="JetBrains Mono" panose="02000009000000000000" pitchFamily="49" charset="0"/>
-              </a:rPr>
-              <a:t>added features </a:t>
-            </a:r>
-            <a:r>
-              <a:rPr lang="en-IN" dirty="0">
-                <a:latin typeface="JetBrains Mono" panose="02000009000000000000" pitchFamily="49" charset="0"/>
-                <a:ea typeface="JetBrains Mono" panose="02000009000000000000" pitchFamily="49" charset="0"/>
-                <a:cs typeface="JetBrains Mono" panose="02000009000000000000" pitchFamily="49" charset="0"/>
-              </a:rPr>
-              <a:t>that enabled this threshold to be broken, allowing programmers </a:t>
-            </a:r>
-            <a:r>
-              <a:rPr lang="en-IN" dirty="0" smtClean="0">
-                <a:latin typeface="JetBrains Mono" panose="02000009000000000000" pitchFamily="49" charset="0"/>
-                <a:ea typeface="JetBrains Mono" panose="02000009000000000000" pitchFamily="49" charset="0"/>
-                <a:cs typeface="JetBrains Mono" panose="02000009000000000000" pitchFamily="49" charset="0"/>
-              </a:rPr>
-              <a:t>to </a:t>
-            </a:r>
-            <a:r>
-              <a:rPr lang="en-IN" dirty="0" smtClean="0">
+              <a:t>C++ added features that enabled this threshold to be broken, allowing programmers to </a:t>
+            </a:r>
+            <a:r>
+              <a:rPr lang="en-IN" dirty="0">
                 <a:solidFill>
                   <a:srgbClr val="FFC000"/>
                 </a:solidFill>
@@ -10395,18 +8236,7 @@
                 <a:ea typeface="JetBrains Mono" panose="02000009000000000000" pitchFamily="49" charset="0"/>
                 <a:cs typeface="JetBrains Mono" panose="02000009000000000000" pitchFamily="49" charset="0"/>
               </a:rPr>
-              <a:t>comprehend </a:t>
-            </a:r>
-            <a:r>
-              <a:rPr lang="en-IN" dirty="0">
-                <a:solidFill>
-                  <a:srgbClr val="FFC000"/>
-                </a:solidFill>
-                <a:latin typeface="JetBrains Mono" panose="02000009000000000000" pitchFamily="49" charset="0"/>
-                <a:ea typeface="JetBrains Mono" panose="02000009000000000000" pitchFamily="49" charset="0"/>
-                <a:cs typeface="JetBrains Mono" panose="02000009000000000000" pitchFamily="49" charset="0"/>
-              </a:rPr>
-              <a:t>and manage larger programs</a:t>
+              <a:t>comprehend and manage larger programs</a:t>
             </a:r>
             <a:r>
               <a:rPr lang="en-IN" dirty="0">
@@ -10556,31 +8386,7 @@
                 <a:ea typeface="JetBrains Mono" panose="02000009000000000000" pitchFamily="49" charset="0"/>
                 <a:cs typeface="JetBrains Mono" panose="02000009000000000000" pitchFamily="49" charset="0"/>
               </a:rPr>
-              <a:t>The invention </a:t>
-            </a:r>
-            <a:r>
-              <a:rPr lang="en-IN" dirty="0" smtClean="0">
-                <a:latin typeface="JetBrains Mono" panose="02000009000000000000" pitchFamily="49" charset="0"/>
-                <a:ea typeface="JetBrains Mono" panose="02000009000000000000" pitchFamily="49" charset="0"/>
-                <a:cs typeface="JetBrains Mono" panose="02000009000000000000" pitchFamily="49" charset="0"/>
-              </a:rPr>
-              <a:t>of C</a:t>
-            </a:r>
-            <a:r>
-              <a:rPr lang="en-IN" dirty="0">
-                <a:latin typeface="JetBrains Mono" panose="02000009000000000000" pitchFamily="49" charset="0"/>
-                <a:ea typeface="JetBrains Mono" panose="02000009000000000000" pitchFamily="49" charset="0"/>
-                <a:cs typeface="JetBrains Mono" panose="02000009000000000000" pitchFamily="49" charset="0"/>
-              </a:rPr>
-              <a:t>++ was not an attempt to create a completely new programming language</a:t>
-            </a:r>
-            <a:r>
-              <a:rPr lang="en-IN" dirty="0" smtClean="0">
-                <a:latin typeface="JetBrains Mono" panose="02000009000000000000" pitchFamily="49" charset="0"/>
-                <a:ea typeface="JetBrains Mono" panose="02000009000000000000" pitchFamily="49" charset="0"/>
-                <a:cs typeface="JetBrains Mono" panose="02000009000000000000" pitchFamily="49" charset="0"/>
-              </a:rPr>
-              <a:t>.</a:t>
+              <a:t>The invention of C++ was not an attempt to create a completely new programming language.</a:t>
             </a:r>
           </a:p>
           <a:p>
@@ -10600,7 +8406,7 @@
               <a:t>Instead, </a:t>
             </a:r>
             <a:r>
-              <a:rPr lang="en-IN" dirty="0" smtClean="0">
+              <a:rPr lang="en-IN" dirty="0">
                 <a:solidFill>
                   <a:srgbClr val="FFC000"/>
                 </a:solidFill>
@@ -10608,18 +8414,7 @@
                 <a:ea typeface="JetBrains Mono" panose="02000009000000000000" pitchFamily="49" charset="0"/>
                 <a:cs typeface="JetBrains Mono" panose="02000009000000000000" pitchFamily="49" charset="0"/>
               </a:rPr>
-              <a:t>C++ </a:t>
-            </a:r>
-            <a:r>
-              <a:rPr lang="en-IN" dirty="0">
-                <a:solidFill>
-                  <a:srgbClr val="FFC000"/>
-                </a:solidFill>
-                <a:latin typeface="JetBrains Mono" panose="02000009000000000000" pitchFamily="49" charset="0"/>
-                <a:ea typeface="JetBrains Mono" panose="02000009000000000000" pitchFamily="49" charset="0"/>
-                <a:cs typeface="JetBrains Mono" panose="02000009000000000000" pitchFamily="49" charset="0"/>
-              </a:rPr>
-              <a:t>was an enhancement to an already highly successful one</a:t>
+              <a:t>C++ was an enhancement to an already highly successful one</a:t>
             </a:r>
             <a:r>
               <a:rPr lang="en-IN" dirty="0">
@@ -10629,61 +8424,6 @@
               </a:rPr>
               <a:t>.</a:t>
             </a:r>
-          </a:p>
-        </p:txBody>
-      </p:sp>
-      <p:sp>
-        <p:nvSpPr>
-          <p:cNvPr id="7" name="TextBox 6"/>
-          <p:cNvSpPr txBox="1"/>
-          <p:nvPr/>
-        </p:nvSpPr>
-        <p:spPr>
-          <a:xfrm>
-            <a:off x="9337639" y="6368527"/>
-            <a:ext cx="2694969" cy="276999"/>
-          </a:xfrm>
-          <a:prstGeom prst="rect">
-            <a:avLst/>
-          </a:prstGeom>
-          <a:noFill/>
-        </p:spPr>
-        <p:txBody>
-          <a:bodyPr wrap="none" rtlCol="0">
-            <a:spAutoFit/>
-          </a:bodyPr>
-          <a:lstStyle/>
-          <a:p>
-            <a:r>
-              <a:rPr lang="en-GB" sz="1200" dirty="0" err="1">
-                <a:solidFill>
-                  <a:srgbClr val="FF0000"/>
-                </a:solidFill>
-                <a:latin typeface="JetBrains Mono" panose="02000009000000000000" pitchFamily="49" charset="0"/>
-                <a:ea typeface="JetBrains Mono" panose="02000009000000000000" pitchFamily="49" charset="0"/>
-                <a:cs typeface="JetBrains Mono" panose="02000009000000000000" pitchFamily="49" charset="0"/>
-              </a:rPr>
-              <a:t>p</a:t>
-            </a:r>
-            <a:r>
-              <a:rPr lang="en-GB" sz="1200" dirty="0" err="1" smtClean="0">
-                <a:solidFill>
-                  <a:srgbClr val="FF0000"/>
-                </a:solidFill>
-                <a:latin typeface="JetBrains Mono" panose="02000009000000000000" pitchFamily="49" charset="0"/>
-                <a:ea typeface="JetBrains Mono" panose="02000009000000000000" pitchFamily="49" charset="0"/>
-                <a:cs typeface="JetBrains Mono" panose="02000009000000000000" pitchFamily="49" charset="0"/>
-              </a:rPr>
-              <a:t>rogramming_heist_professor</a:t>
-            </a:r>
-            <a:endParaRPr lang="en-IN" sz="1200" dirty="0">
-              <a:solidFill>
-                <a:srgbClr val="FF0000"/>
-              </a:solidFill>
-              <a:latin typeface="JetBrains Mono" panose="02000009000000000000" pitchFamily="49" charset="0"/>
-              <a:ea typeface="JetBrains Mono" panose="02000009000000000000" pitchFamily="49" charset="0"/>
-              <a:cs typeface="JetBrains Mono" panose="02000009000000000000" pitchFamily="49" charset="0"/>
-            </a:endParaRPr>
           </a:p>
         </p:txBody>
       </p:sp>
@@ -10944,7 +8684,7 @@
               <a:t>From </a:t>
             </a:r>
             <a:r>
-              <a:rPr lang="en-IN" dirty="0" smtClean="0">
+              <a:rPr lang="en-IN" dirty="0">
                 <a:solidFill>
                   <a:srgbClr val="FFC000"/>
                 </a:solidFill>
@@ -10952,18 +8692,7 @@
                 <a:ea typeface="JetBrains Mono" panose="02000009000000000000" pitchFamily="49" charset="0"/>
                 <a:cs typeface="JetBrains Mono" panose="02000009000000000000" pitchFamily="49" charset="0"/>
               </a:rPr>
-              <a:t>1972 </a:t>
-            </a:r>
-            <a:r>
-              <a:rPr lang="en-IN" dirty="0">
-                <a:solidFill>
-                  <a:srgbClr val="FFC000"/>
-                </a:solidFill>
-                <a:latin typeface="JetBrains Mono" panose="02000009000000000000" pitchFamily="49" charset="0"/>
-                <a:ea typeface="JetBrains Mono" panose="02000009000000000000" pitchFamily="49" charset="0"/>
-                <a:cs typeface="JetBrains Mono" panose="02000009000000000000" pitchFamily="49" charset="0"/>
-              </a:rPr>
-              <a:t>- 1980s</a:t>
+              <a:t>1972 - 1980s</a:t>
             </a:r>
             <a:r>
               <a:rPr lang="en-IN" dirty="0">
@@ -11045,21 +8774,8 @@
                 <a:ea typeface="JetBrains Mono" panose="02000009000000000000" pitchFamily="49" charset="0"/>
                 <a:cs typeface="JetBrains Mono" panose="02000009000000000000" pitchFamily="49" charset="0"/>
               </a:rPr>
-              <a:t>took </a:t>
-            </a:r>
-            <a:r>
-              <a:rPr lang="en-IN" dirty="0" smtClean="0">
-                <a:latin typeface="JetBrains Mono" panose="02000009000000000000" pitchFamily="49" charset="0"/>
-                <a:ea typeface="JetBrains Mono" panose="02000009000000000000" pitchFamily="49" charset="0"/>
-                <a:cs typeface="JetBrains Mono" panose="02000009000000000000" pitchFamily="49" charset="0"/>
-              </a:rPr>
-              <a:t>hold.</a:t>
-            </a:r>
-            <a:endParaRPr lang="en-IN" dirty="0">
-              <a:latin typeface="JetBrains Mono" panose="02000009000000000000" pitchFamily="49" charset="0"/>
-              <a:ea typeface="JetBrains Mono" panose="02000009000000000000" pitchFamily="49" charset="0"/>
-              <a:cs typeface="JetBrains Mono" panose="02000009000000000000" pitchFamily="49" charset="0"/>
-            </a:endParaRPr>
+              <a:t>took hold.</a:t>
+            </a:r>
           </a:p>
         </p:txBody>
       </p:sp>
@@ -11085,7 +8801,7 @@
           <a:lstStyle/>
           <a:p>
             <a:r>
-              <a:rPr lang="en-IN" sz="2800" dirty="0" smtClean="0">
+              <a:rPr lang="en-IN" sz="2800" dirty="0">
                 <a:solidFill>
                   <a:srgbClr val="FFC000"/>
                 </a:solidFill>
@@ -11095,14 +8811,6 @@
               </a:rPr>
               <a:t>Why and When Java?</a:t>
             </a:r>
-            <a:endParaRPr lang="en-IN" sz="2800" dirty="0">
-              <a:solidFill>
-                <a:srgbClr val="FFC000"/>
-              </a:solidFill>
-              <a:latin typeface="JetBrains Mono" panose="02000009000000000000" pitchFamily="49" charset="0"/>
-              <a:ea typeface="JetBrains Mono" panose="02000009000000000000" pitchFamily="49" charset="0"/>
-              <a:cs typeface="JetBrains Mono" panose="02000009000000000000" pitchFamily="49" charset="0"/>
-            </a:endParaRPr>
           </a:p>
         </p:txBody>
       </p:sp>
@@ -11442,61 +9150,6 @@
           </a:extLst>
         </p:spPr>
       </p:pic>
-      <p:sp>
-        <p:nvSpPr>
-          <p:cNvPr id="8" name="TextBox 7"/>
-          <p:cNvSpPr txBox="1"/>
-          <p:nvPr/>
-        </p:nvSpPr>
-        <p:spPr>
-          <a:xfrm>
-            <a:off x="9337639" y="6368527"/>
-            <a:ext cx="2694969" cy="276999"/>
-          </a:xfrm>
-          <a:prstGeom prst="rect">
-            <a:avLst/>
-          </a:prstGeom>
-          <a:noFill/>
-        </p:spPr>
-        <p:txBody>
-          <a:bodyPr wrap="none" rtlCol="0">
-            <a:spAutoFit/>
-          </a:bodyPr>
-          <a:lstStyle/>
-          <a:p>
-            <a:r>
-              <a:rPr lang="en-GB" sz="1200" dirty="0" err="1">
-                <a:solidFill>
-                  <a:srgbClr val="FF0000"/>
-                </a:solidFill>
-                <a:latin typeface="JetBrains Mono" panose="02000009000000000000" pitchFamily="49" charset="0"/>
-                <a:ea typeface="JetBrains Mono" panose="02000009000000000000" pitchFamily="49" charset="0"/>
-                <a:cs typeface="JetBrains Mono" panose="02000009000000000000" pitchFamily="49" charset="0"/>
-              </a:rPr>
-              <a:t>p</a:t>
-            </a:r>
-            <a:r>
-              <a:rPr lang="en-GB" sz="1200" dirty="0" err="1" smtClean="0">
-                <a:solidFill>
-                  <a:srgbClr val="FF0000"/>
-                </a:solidFill>
-                <a:latin typeface="JetBrains Mono" panose="02000009000000000000" pitchFamily="49" charset="0"/>
-                <a:ea typeface="JetBrains Mono" panose="02000009000000000000" pitchFamily="49" charset="0"/>
-                <a:cs typeface="JetBrains Mono" panose="02000009000000000000" pitchFamily="49" charset="0"/>
-              </a:rPr>
-              <a:t>rogramming_heist_professor</a:t>
-            </a:r>
-            <a:endParaRPr lang="en-IN" sz="1200" dirty="0">
-              <a:solidFill>
-                <a:srgbClr val="FF0000"/>
-              </a:solidFill>
-              <a:latin typeface="JetBrains Mono" panose="02000009000000000000" pitchFamily="49" charset="0"/>
-              <a:ea typeface="JetBrains Mono" panose="02000009000000000000" pitchFamily="49" charset="0"/>
-              <a:cs typeface="JetBrains Mono" panose="02000009000000000000" pitchFamily="49" charset="0"/>
-            </a:endParaRPr>
-          </a:p>
-        </p:txBody>
-      </p:sp>
     </p:spTree>
     <p:extLst>
       <p:ext uri="{BB962C8B-B14F-4D97-AF65-F5344CB8AC3E}">
@@ -11782,27 +9435,8 @@
                 <a:ea typeface="JetBrains Mono" panose="02000009000000000000" pitchFamily="49" charset="0"/>
                 <a:cs typeface="JetBrains Mono" panose="02000009000000000000" pitchFamily="49" charset="0"/>
               </a:rPr>
-              <a:t>The Creation of </a:t>
-            </a:r>
-            <a:r>
-              <a:rPr lang="en-IN" sz="2800" dirty="0" smtClean="0">
-                <a:solidFill>
-                  <a:srgbClr val="FFC000"/>
-                </a:solidFill>
-                <a:latin typeface="JetBrains Mono" panose="02000009000000000000" pitchFamily="49" charset="0"/>
-                <a:ea typeface="JetBrains Mono" panose="02000009000000000000" pitchFamily="49" charset="0"/>
-                <a:cs typeface="JetBrains Mono" panose="02000009000000000000" pitchFamily="49" charset="0"/>
-              </a:rPr>
-              <a:t>Java</a:t>
-            </a:r>
-            <a:endParaRPr lang="en-IN" sz="2800" dirty="0">
-              <a:solidFill>
-                <a:srgbClr val="FFC000"/>
-              </a:solidFill>
-              <a:latin typeface="JetBrains Mono" panose="02000009000000000000" pitchFamily="49" charset="0"/>
-              <a:ea typeface="JetBrains Mono" panose="02000009000000000000" pitchFamily="49" charset="0"/>
-              <a:cs typeface="JetBrains Mono" panose="02000009000000000000" pitchFamily="49" charset="0"/>
-            </a:endParaRPr>
+              <a:t>The Creation of Java</a:t>
+            </a:r>
           </a:p>
         </p:txBody>
       </p:sp>
@@ -12002,7 +9636,7 @@
           <a:lstStyle/>
           <a:p>
             <a:r>
-              <a:rPr lang="en-IN" dirty="0" smtClean="0">
+              <a:rPr lang="en-IN" dirty="0">
                 <a:solidFill>
                   <a:srgbClr val="FFC000"/>
                 </a:solidFill>
@@ -12010,29 +9644,7 @@
                 <a:ea typeface="JetBrains Mono" panose="02000009000000000000" pitchFamily="49" charset="0"/>
                 <a:cs typeface="JetBrains Mono" panose="02000009000000000000" pitchFamily="49" charset="0"/>
               </a:rPr>
-              <a:t>Original goal </a:t>
-            </a:r>
-            <a:r>
-              <a:rPr lang="en-IN" dirty="0">
-                <a:solidFill>
-                  <a:srgbClr val="FFC000"/>
-                </a:solidFill>
-                <a:latin typeface="JetBrains Mono" panose="02000009000000000000" pitchFamily="49" charset="0"/>
-                <a:ea typeface="JetBrains Mono" panose="02000009000000000000" pitchFamily="49" charset="0"/>
-                <a:cs typeface="JetBrains Mono" panose="02000009000000000000" pitchFamily="49" charset="0"/>
-              </a:rPr>
-              <a:t>for Java was not the Internet</a:t>
-            </a:r>
-            <a:r>
-              <a:rPr lang="en-IN" dirty="0" smtClean="0">
-                <a:solidFill>
-                  <a:srgbClr val="FFC000"/>
-                </a:solidFill>
-                <a:latin typeface="JetBrains Mono" panose="02000009000000000000" pitchFamily="49" charset="0"/>
-                <a:ea typeface="JetBrains Mono" panose="02000009000000000000" pitchFamily="49" charset="0"/>
-                <a:cs typeface="JetBrains Mono" panose="02000009000000000000" pitchFamily="49" charset="0"/>
-              </a:rPr>
-              <a:t>!</a:t>
+              <a:t>Original goal for Java was not the Internet!</a:t>
             </a:r>
           </a:p>
           <a:p>
@@ -12049,39 +9661,7 @@
                 <a:ea typeface="JetBrains Mono" panose="02000009000000000000" pitchFamily="49" charset="0"/>
                 <a:cs typeface="JetBrains Mono" panose="02000009000000000000" pitchFamily="49" charset="0"/>
               </a:rPr>
-              <a:t>Instead, the primary motivation was the need for a platform-independent (</a:t>
-            </a:r>
-            <a:r>
-              <a:rPr lang="en-IN" dirty="0" smtClean="0">
-                <a:latin typeface="JetBrains Mono" panose="02000009000000000000" pitchFamily="49" charset="0"/>
-                <a:ea typeface="JetBrains Mono" panose="02000009000000000000" pitchFamily="49" charset="0"/>
-                <a:cs typeface="JetBrains Mono" panose="02000009000000000000" pitchFamily="49" charset="0"/>
-              </a:rPr>
-              <a:t>that is</a:t>
-            </a:r>
-            <a:r>
-              <a:rPr lang="en-IN" dirty="0">
-                <a:latin typeface="JetBrains Mono" panose="02000009000000000000" pitchFamily="49" charset="0"/>
-                <a:ea typeface="JetBrains Mono" panose="02000009000000000000" pitchFamily="49" charset="0"/>
-                <a:cs typeface="JetBrains Mono" panose="02000009000000000000" pitchFamily="49" charset="0"/>
-              </a:rPr>
-              <a:t>, architecture-neutral) language that could be used to create software to </a:t>
-            </a:r>
-            <a:r>
-              <a:rPr lang="en-IN" dirty="0" smtClean="0">
-                <a:latin typeface="JetBrains Mono" panose="02000009000000000000" pitchFamily="49" charset="0"/>
-                <a:ea typeface="JetBrains Mono" panose="02000009000000000000" pitchFamily="49" charset="0"/>
-                <a:cs typeface="JetBrains Mono" panose="02000009000000000000" pitchFamily="49" charset="0"/>
-              </a:rPr>
-              <a:t>be embedded </a:t>
-            </a:r>
-            <a:r>
-              <a:rPr lang="en-IN" dirty="0">
-                <a:latin typeface="JetBrains Mono" panose="02000009000000000000" pitchFamily="49" charset="0"/>
-                <a:ea typeface="JetBrains Mono" panose="02000009000000000000" pitchFamily="49" charset="0"/>
-                <a:cs typeface="JetBrains Mono" panose="02000009000000000000" pitchFamily="49" charset="0"/>
-              </a:rPr>
-              <a:t>in various consumer electronic devices, such as microwave ovens</a:t>
+              <a:t>Instead, the primary motivation was the need for a platform-independent (that is, architecture-neutral) language that could be used to create software to be embedded in various consumer electronic devices, such as microwave ovens</a:t>
             </a:r>
           </a:p>
           <a:p>
@@ -12093,61 +9673,6 @@
               </a:rPr>
               <a:t>and remote controls.</a:t>
             </a:r>
-          </a:p>
-        </p:txBody>
-      </p:sp>
-      <p:sp>
-        <p:nvSpPr>
-          <p:cNvPr id="6" name="TextBox 5"/>
-          <p:cNvSpPr txBox="1"/>
-          <p:nvPr/>
-        </p:nvSpPr>
-        <p:spPr>
-          <a:xfrm>
-            <a:off x="9337639" y="6368527"/>
-            <a:ext cx="2694969" cy="276999"/>
-          </a:xfrm>
-          <a:prstGeom prst="rect">
-            <a:avLst/>
-          </a:prstGeom>
-          <a:noFill/>
-        </p:spPr>
-        <p:txBody>
-          <a:bodyPr wrap="none" rtlCol="0">
-            <a:spAutoFit/>
-          </a:bodyPr>
-          <a:lstStyle/>
-          <a:p>
-            <a:r>
-              <a:rPr lang="en-GB" sz="1200" dirty="0" err="1">
-                <a:solidFill>
-                  <a:srgbClr val="FF0000"/>
-                </a:solidFill>
-                <a:latin typeface="JetBrains Mono" panose="02000009000000000000" pitchFamily="49" charset="0"/>
-                <a:ea typeface="JetBrains Mono" panose="02000009000000000000" pitchFamily="49" charset="0"/>
-                <a:cs typeface="JetBrains Mono" panose="02000009000000000000" pitchFamily="49" charset="0"/>
-              </a:rPr>
-              <a:t>p</a:t>
-            </a:r>
-            <a:r>
-              <a:rPr lang="en-GB" sz="1200" dirty="0" err="1" smtClean="0">
-                <a:solidFill>
-                  <a:srgbClr val="FF0000"/>
-                </a:solidFill>
-                <a:latin typeface="JetBrains Mono" panose="02000009000000000000" pitchFamily="49" charset="0"/>
-                <a:ea typeface="JetBrains Mono" panose="02000009000000000000" pitchFamily="49" charset="0"/>
-                <a:cs typeface="JetBrains Mono" panose="02000009000000000000" pitchFamily="49" charset="0"/>
-              </a:rPr>
-              <a:t>rogramming_heist_professor</a:t>
-            </a:r>
-            <a:endParaRPr lang="en-IN" sz="1200" dirty="0">
-              <a:solidFill>
-                <a:srgbClr val="FF0000"/>
-              </a:solidFill>
-              <a:latin typeface="JetBrains Mono" panose="02000009000000000000" pitchFamily="49" charset="0"/>
-              <a:ea typeface="JetBrains Mono" panose="02000009000000000000" pitchFamily="49" charset="0"/>
-              <a:cs typeface="JetBrains Mono" panose="02000009000000000000" pitchFamily="49" charset="0"/>
-            </a:endParaRPr>
           </a:p>
         </p:txBody>
       </p:sp>
@@ -12455,7 +9980,7 @@
           <a:lstStyle/>
           <a:p>
             <a:r>
-              <a:rPr lang="en-IN" sz="2800" dirty="0" smtClean="0">
+              <a:rPr lang="en-IN" sz="2800" dirty="0">
                 <a:solidFill>
                   <a:srgbClr val="FFC000"/>
                 </a:solidFill>
@@ -12463,18 +9988,7 @@
                 <a:ea typeface="JetBrains Mono" panose="02000009000000000000" pitchFamily="49" charset="0"/>
                 <a:cs typeface="JetBrains Mono" panose="02000009000000000000" pitchFamily="49" charset="0"/>
               </a:rPr>
-              <a:t>Microwave </a:t>
-            </a:r>
-            <a:r>
-              <a:rPr lang="en-IN" sz="2800" dirty="0">
-                <a:solidFill>
-                  <a:srgbClr val="FFC000"/>
-                </a:solidFill>
-                <a:latin typeface="JetBrains Mono" panose="02000009000000000000" pitchFamily="49" charset="0"/>
-                <a:ea typeface="JetBrains Mono" panose="02000009000000000000" pitchFamily="49" charset="0"/>
-                <a:cs typeface="JetBrains Mono" panose="02000009000000000000" pitchFamily="49" charset="0"/>
-              </a:rPr>
-              <a:t>oven</a:t>
+              <a:t>Microwave oven</a:t>
             </a:r>
           </a:p>
         </p:txBody>
@@ -12561,7 +10075,7 @@
           <a:lstStyle/>
           <a:p>
             <a:r>
-              <a:rPr lang="en-IN" sz="2800" dirty="0" smtClean="0">
+              <a:rPr lang="en-IN" sz="2800" dirty="0">
                 <a:solidFill>
                   <a:srgbClr val="FFC000"/>
                 </a:solidFill>
@@ -12569,18 +10083,7 @@
                 <a:ea typeface="JetBrains Mono" panose="02000009000000000000" pitchFamily="49" charset="0"/>
                 <a:cs typeface="JetBrains Mono" panose="02000009000000000000" pitchFamily="49" charset="0"/>
               </a:rPr>
-              <a:t>Remote </a:t>
-            </a:r>
-            <a:r>
-              <a:rPr lang="en-IN" sz="2800" dirty="0">
-                <a:solidFill>
-                  <a:srgbClr val="FFC000"/>
-                </a:solidFill>
-                <a:latin typeface="JetBrains Mono" panose="02000009000000000000" pitchFamily="49" charset="0"/>
-                <a:ea typeface="JetBrains Mono" panose="02000009000000000000" pitchFamily="49" charset="0"/>
-                <a:cs typeface="JetBrains Mono" panose="02000009000000000000" pitchFamily="49" charset="0"/>
-              </a:rPr>
-              <a:t>control</a:t>
+              <a:t>Remote control</a:t>
             </a:r>
             <a:r>
               <a:rPr lang="en-IN" dirty="0"/>
@@ -12641,7 +10144,7 @@
           <a:lstStyle/>
           <a:p>
             <a:r>
-              <a:rPr lang="en-IN" sz="2800" dirty="0" smtClean="0">
+              <a:rPr lang="en-IN" sz="2800" dirty="0">
                 <a:solidFill>
                   <a:srgbClr val="FFC000"/>
                 </a:solidFill>
@@ -12649,74 +10152,8 @@
                 <a:ea typeface="JetBrains Mono" panose="02000009000000000000" pitchFamily="49" charset="0"/>
                 <a:cs typeface="JetBrains Mono" panose="02000009000000000000" pitchFamily="49" charset="0"/>
               </a:rPr>
-              <a:t>Washing </a:t>
-            </a:r>
-            <a:r>
-              <a:rPr lang="en-IN" sz="2800" dirty="0">
-                <a:solidFill>
-                  <a:srgbClr val="FFC000"/>
-                </a:solidFill>
-                <a:latin typeface="JetBrains Mono" panose="02000009000000000000" pitchFamily="49" charset="0"/>
-                <a:ea typeface="JetBrains Mono" panose="02000009000000000000" pitchFamily="49" charset="0"/>
-                <a:cs typeface="JetBrains Mono" panose="02000009000000000000" pitchFamily="49" charset="0"/>
-              </a:rPr>
-              <a:t>machine</a:t>
-            </a:r>
-          </a:p>
-        </p:txBody>
-      </p:sp>
-      <p:sp>
-        <p:nvSpPr>
-          <p:cNvPr id="9" name="TextBox 8"/>
-          <p:cNvSpPr txBox="1"/>
-          <p:nvPr/>
-        </p:nvSpPr>
-        <p:spPr>
-          <a:xfrm>
-            <a:off x="9337639" y="6368527"/>
-            <a:ext cx="2694969" cy="276999"/>
-          </a:xfrm>
-          <a:prstGeom prst="rect">
-            <a:avLst/>
-          </a:prstGeom>
-          <a:noFill/>
-        </p:spPr>
-        <p:txBody>
-          <a:bodyPr wrap="none" rtlCol="0">
-            <a:spAutoFit/>
-          </a:bodyPr>
-          <a:lstStyle/>
-          <a:p>
-            <a:r>
-              <a:rPr lang="en-GB" sz="1200" dirty="0" err="1">
-                <a:solidFill>
-                  <a:srgbClr val="FF0000"/>
-                </a:solidFill>
-                <a:latin typeface="JetBrains Mono" panose="02000009000000000000" pitchFamily="49" charset="0"/>
-                <a:ea typeface="JetBrains Mono" panose="02000009000000000000" pitchFamily="49" charset="0"/>
-                <a:cs typeface="JetBrains Mono" panose="02000009000000000000" pitchFamily="49" charset="0"/>
-              </a:rPr>
-              <a:t>p</a:t>
-            </a:r>
-            <a:r>
-              <a:rPr lang="en-GB" sz="1200" dirty="0" err="1" smtClean="0">
-                <a:solidFill>
-                  <a:srgbClr val="FF0000"/>
-                </a:solidFill>
-                <a:latin typeface="JetBrains Mono" panose="02000009000000000000" pitchFamily="49" charset="0"/>
-                <a:ea typeface="JetBrains Mono" panose="02000009000000000000" pitchFamily="49" charset="0"/>
-                <a:cs typeface="JetBrains Mono" panose="02000009000000000000" pitchFamily="49" charset="0"/>
-              </a:rPr>
-              <a:t>rogramming_heist_professor</a:t>
-            </a:r>
-            <a:endParaRPr lang="en-IN" sz="1200" dirty="0">
-              <a:solidFill>
-                <a:srgbClr val="FF0000"/>
-              </a:solidFill>
-              <a:latin typeface="JetBrains Mono" panose="02000009000000000000" pitchFamily="49" charset="0"/>
-              <a:ea typeface="JetBrains Mono" panose="02000009000000000000" pitchFamily="49" charset="0"/>
-              <a:cs typeface="JetBrains Mono" panose="02000009000000000000" pitchFamily="49" charset="0"/>
-            </a:endParaRPr>
+              <a:t>Washing machine</a:t>
+            </a:r>
           </a:p>
         </p:txBody>
       </p:sp>

</xml_diff>

<commit_message>
Fourth commit on 02-02-2026
</commit_message>
<xml_diff>
--- a/Unit-I/ppt/WhyJava_1.pptx
+++ b/Unit-I/ppt/WhyJava_1.pptx
@@ -3115,88 +3115,6 @@
           </a:prstGeom>
         </p:spPr>
       </p:pic>
-      <p:sp>
-        <p:nvSpPr>
-          <p:cNvPr id="3" name="TextBox 2"/>
-          <p:cNvSpPr txBox="1"/>
-          <p:nvPr/>
-        </p:nvSpPr>
-        <p:spPr>
-          <a:xfrm>
-            <a:off x="4566620" y="4303059"/>
-            <a:ext cx="2673276" cy="2646878"/>
-          </a:xfrm>
-          <a:prstGeom prst="rect">
-            <a:avLst/>
-          </a:prstGeom>
-          <a:noFill/>
-        </p:spPr>
-        <p:txBody>
-          <a:bodyPr wrap="square" rtlCol="0">
-            <a:spAutoFit/>
-          </a:bodyPr>
-          <a:lstStyle/>
-          <a:p>
-            <a:r>
-              <a:rPr lang="en-GB" sz="16600" dirty="0">
-                <a:solidFill>
-                  <a:srgbClr val="FFFF00"/>
-                </a:solidFill>
-              </a:rPr>
-              <a:t>2</a:t>
-            </a:r>
-            <a:endParaRPr lang="en-IN" sz="6600" dirty="0">
-              <a:solidFill>
-                <a:srgbClr val="FFFF00"/>
-              </a:solidFill>
-            </a:endParaRPr>
-          </a:p>
-        </p:txBody>
-      </p:sp>
-      <p:sp>
-        <p:nvSpPr>
-          <p:cNvPr id="6" name="TextBox 5"/>
-          <p:cNvSpPr txBox="1"/>
-          <p:nvPr/>
-        </p:nvSpPr>
-        <p:spPr>
-          <a:xfrm>
-            <a:off x="2481773" y="3369714"/>
-            <a:ext cx="6603090" cy="584775"/>
-          </a:xfrm>
-          <a:prstGeom prst="rect">
-            <a:avLst/>
-          </a:prstGeom>
-          <a:noFill/>
-        </p:spPr>
-        <p:txBody>
-          <a:bodyPr wrap="none" rtlCol="0">
-            <a:spAutoFit/>
-          </a:bodyPr>
-          <a:lstStyle/>
-          <a:p>
-            <a:r>
-              <a:rPr lang="en-GB" sz="3200" dirty="0">
-                <a:solidFill>
-                  <a:srgbClr val="FFFF00"/>
-                </a:solidFill>
-                <a:latin typeface="JetBrains Mono" panose="02000009000000000000" pitchFamily="49" charset="0"/>
-                <a:ea typeface="JetBrains Mono" panose="02000009000000000000" pitchFamily="49" charset="0"/>
-                <a:cs typeface="JetBrains Mono" panose="02000009000000000000" pitchFamily="49" charset="0"/>
-              </a:rPr>
-              <a:t>Running First java program</a:t>
-            </a:r>
-            <a:endParaRPr lang="en-IN" sz="3200" dirty="0">
-              <a:solidFill>
-                <a:srgbClr val="FFFF00"/>
-              </a:solidFill>
-              <a:latin typeface="JetBrains Mono" panose="02000009000000000000" pitchFamily="49" charset="0"/>
-              <a:ea typeface="JetBrains Mono" panose="02000009000000000000" pitchFamily="49" charset="0"/>
-              <a:cs typeface="JetBrains Mono" panose="02000009000000000000" pitchFamily="49" charset="0"/>
-            </a:endParaRPr>
-          </a:p>
-        </p:txBody>
-      </p:sp>
     </p:spTree>
     <p:extLst>
       <p:ext uri="{BB962C8B-B14F-4D97-AF65-F5344CB8AC3E}">

</xml_diff>